<commit_message>
added red text to point out where under construction starts
</commit_message>
<xml_diff>
--- a/05-creating-custom-profiles.pptx
+++ b/05-creating-custom-profiles.pptx
@@ -307,7 +307,7 @@
               <a:pPr>
                 <a:defRPr/>
               </a:pPr>
-              <a:t>2015-12-29</a:t>
+              <a:t>2016-01-19</a:t>
             </a:fld>
             <a:endParaRPr lang="en-US" dirty="0"/>
           </a:p>
@@ -490,7 +490,7 @@
               <a:pPr>
                 <a:defRPr/>
               </a:pPr>
-              <a:t>2015-12-29</a:t>
+              <a:t>2016-01-19</a:t>
             </a:fld>
             <a:endParaRPr lang="en-US" dirty="0"/>
           </a:p>
@@ -1388,6 +1388,68 @@
               <a:rPr lang="en-US" baseline="0" dirty="0" smtClean="0"/>
               <a:t> use `ls -l` to confirm its creation.</a:t>
             </a:r>
+          </a:p>
+          <a:p>
+            <a:pPr marL="0" marR="0" indent="0" algn="l" defTabSz="1217613" rtl="0" eaLnBrk="1" fontAlgn="base" latinLnBrk="0" hangingPunct="1">
+              <a:lnSpc>
+                <a:spcPct val="90000"/>
+              </a:lnSpc>
+              <a:spcBef>
+                <a:spcPct val="30000"/>
+              </a:spcBef>
+              <a:spcAft>
+                <a:spcPts val="450"/>
+              </a:spcAft>
+              <a:buClrTx/>
+              <a:buSzTx/>
+              <a:buFontTx/>
+              <a:buNone/>
+              <a:tabLst/>
+              <a:defRPr/>
+            </a:pPr>
+            <a:endParaRPr lang="en-US" baseline="0" dirty="0" smtClean="0"/>
+          </a:p>
+          <a:p>
+            <a:pPr marL="0" marR="0" indent="0" algn="l" defTabSz="1217613" rtl="0" eaLnBrk="1" fontAlgn="base" latinLnBrk="0" hangingPunct="1">
+              <a:lnSpc>
+                <a:spcPct val="90000"/>
+              </a:lnSpc>
+              <a:spcBef>
+                <a:spcPct val="30000"/>
+              </a:spcBef>
+              <a:spcAft>
+                <a:spcPts val="450"/>
+              </a:spcAft>
+              <a:buClrTx/>
+              <a:buSzTx/>
+              <a:buFontTx/>
+              <a:buNone/>
+              <a:tabLst/>
+              <a:defRPr/>
+            </a:pPr>
+            <a:r>
+              <a:rPr lang="en-US" baseline="0" dirty="0" smtClean="0"/>
+              <a:t>TBD- a. will there be a 'generate profile` command?</a:t>
+            </a:r>
+          </a:p>
+          <a:p>
+            <a:pPr marL="0" marR="0" indent="0" algn="l" defTabSz="1217613" rtl="0" eaLnBrk="1" fontAlgn="base" latinLnBrk="0" hangingPunct="1">
+              <a:lnSpc>
+                <a:spcPct val="90000"/>
+              </a:lnSpc>
+              <a:spcBef>
+                <a:spcPct val="30000"/>
+              </a:spcBef>
+              <a:spcAft>
+                <a:spcPts val="450"/>
+              </a:spcAft>
+              <a:buClrTx/>
+              <a:buSzTx/>
+              <a:buFontTx/>
+              <a:buNone/>
+              <a:tabLst/>
+              <a:defRPr/>
+            </a:pPr>
             <a:endParaRPr lang="en-US" dirty="0" smtClean="0"/>
           </a:p>
         </p:txBody>
@@ -5073,7 +5135,10 @@
           </a:bodyPr>
           <a:lstStyle/>
           <a:p>
-            <a:endParaRPr lang="en-US" dirty="0" smtClean="0"/>
+            <a:r>
+              <a:rPr lang="en-US" dirty="0" smtClean="0"/>
+              <a:t>TBD: now do lab for windows too.</a:t>
+            </a:r>
           </a:p>
           <a:p>
             <a:endParaRPr lang="en-US" dirty="0" smtClean="0"/>
@@ -6878,7 +6943,7 @@
             </a:r>
             <a:r>
               <a:rPr lang="en-US" baseline="0" dirty="0" smtClean="0"/>
-              <a:t> issue.</a:t>
+              <a:t> issue.  (TBD - did we change metadata file name?)</a:t>
             </a:r>
           </a:p>
           <a:p>
@@ -15015,7 +15080,7 @@
               <a:defRPr/>
             </a:pPr>
             <a:r>
-              <a:rPr lang="en-US" smtClean="0">
+              <a:rPr lang="en-US" dirty="0" smtClean="0">
                 <a:solidFill>
                   <a:srgbClr val="7F7F7F"/>
                 </a:solidFill>
@@ -15023,10 +15088,10 @@
                 <a:ea typeface="+mn-ea"/>
                 <a:cs typeface="+mn-cs"/>
               </a:rPr>
-              <a:t>4-</a:t>
+              <a:t>5-</a:t>
             </a:r>
             <a:fld id="{F0B79B2F-E1DD-4D43-95B3-EA08C411D807}" type="slidenum">
-              <a:rPr lang="en-US">
+              <a:rPr lang="en-US" smtClean="0">
                 <a:solidFill>
                   <a:srgbClr val="7F7F7F"/>
                 </a:solidFill>
@@ -15775,7 +15840,7 @@
               <a:defRPr/>
             </a:pPr>
             <a:r>
-              <a:rPr lang="en-US" smtClean="0">
+              <a:rPr lang="en-US" dirty="0" smtClean="0">
                 <a:solidFill>
                   <a:srgbClr val="7F7F7F"/>
                 </a:solidFill>
@@ -15783,10 +15848,10 @@
                 <a:ea typeface="+mn-ea"/>
                 <a:cs typeface="+mn-cs"/>
               </a:rPr>
-              <a:t>4-</a:t>
+              <a:t>5-</a:t>
             </a:r>
             <a:fld id="{F0B79B2F-E1DD-4D43-95B3-EA08C411D807}" type="slidenum">
-              <a:rPr lang="en-US">
+              <a:rPr lang="en-US" smtClean="0">
                 <a:solidFill>
                   <a:srgbClr val="7F7F7F"/>
                 </a:solidFill>
@@ -20252,10 +20317,18 @@
               <a:t>GE: </a:t>
             </a:r>
             <a:r>
-              <a:rPr lang="en-US" dirty="0" smtClean="0"/>
-              <a:t>TBD</a:t>
-            </a:r>
-            <a:endParaRPr lang="en-US" dirty="0"/>
+              <a:rPr lang="en-US" smtClean="0">
+                <a:solidFill>
+                  <a:srgbClr val="FF0000"/>
+                </a:solidFill>
+              </a:rPr>
+              <a:t>TBD from here to end</a:t>
+            </a:r>
+            <a:endParaRPr lang="en-US" dirty="0">
+              <a:solidFill>
+                <a:srgbClr val="FF0000"/>
+              </a:solidFill>
+            </a:endParaRPr>
           </a:p>
         </p:txBody>
       </p:sp>
@@ -20282,6 +20355,20 @@
             <a:r>
               <a:rPr lang="en-US" dirty="0" smtClean="0"/>
               <a:t>Show how this is populated by /rb file - see next slide</a:t>
+            </a:r>
+          </a:p>
+          <a:p>
+            <a:r>
+              <a:rPr lang="en-US" dirty="0" smtClean="0"/>
+              <a:t>TBD- Show side by side metadata and </a:t>
+            </a:r>
+            <a:r>
+              <a:rPr lang="en-US" dirty="0" err="1" smtClean="0"/>
+              <a:t>Compl</a:t>
+            </a:r>
+            <a:r>
+              <a:rPr lang="en-US" dirty="0" smtClean="0"/>
+              <a:t> UI profile name to illustrate how the name field is populated.</a:t>
             </a:r>
           </a:p>
           <a:p>
@@ -20345,8 +20432,8 @@
         </p:blipFill>
         <p:spPr>
           <a:xfrm>
-            <a:off x="9007812" y="5638825"/>
-            <a:ext cx="6126451" cy="2123028"/>
+            <a:off x="2098894" y="3244645"/>
+            <a:ext cx="13035369" cy="4517208"/>
           </a:xfrm>
           <a:prstGeom prst="rect">
             <a:avLst/>
@@ -24840,6 +24927,15 @@
 </file>
 
 <file path=customXml/item1.xml><?xml version="1.0" encoding="utf-8"?>
+<?mso-contentType ?>
+<FormTemplates xmlns="http://schemas.microsoft.com/sharepoint/v3/contenttype/forms">
+  <Display>DocumentLibraryForm</Display>
+  <Edit>DocumentLibraryForm</Edit>
+  <New>DocumentLibraryForm</New>
+</FormTemplates>
+</file>
+
+<file path=customXml/item2.xml><?xml version="1.0" encoding="utf-8"?>
 <p:properties xmlns:p="http://schemas.microsoft.com/office/2006/metadata/properties" xmlns:xsi="http://www.w3.org/2001/XMLSchema-instance" xmlns:pc="http://schemas.microsoft.com/office/infopath/2007/PartnerControls">
   <documentManagement>
     <_dlc_DocId xmlns="7bb5d761-a2ea-4873-95f7-7a6658fb3ef0">M4CWTKMW727E-592-73</_dlc_DocId>
@@ -24851,7 +24947,7 @@
 </p:properties>
 </file>
 
-<file path=customXml/item2.xml><?xml version="1.0" encoding="utf-8"?>
+<file path=customXml/item3.xml><?xml version="1.0" encoding="utf-8"?>
 <ct:contentTypeSchema xmlns:ct="http://schemas.microsoft.com/office/2006/metadata/contentType" xmlns:ma="http://schemas.microsoft.com/office/2006/metadata/properties/metaAttributes" ct:_="" ma:_="" ma:contentTypeName="Document" ma:contentTypeID="0x0101000812F700BE7F874999720E88173FE491" ma:contentTypeVersion="0" ma:contentTypeDescription="Create a new document." ma:contentTypeScope="" ma:versionID="3f79f408e2ca720b7aba6e0e32464d0c">
   <xsd:schema xmlns:xsd="http://www.w3.org/2001/XMLSchema" xmlns:xs="http://www.w3.org/2001/XMLSchema" xmlns:p="http://schemas.microsoft.com/office/2006/metadata/properties" xmlns:ns2="7bb5d761-a2ea-4873-95f7-7a6658fb3ef0" targetNamespace="http://schemas.microsoft.com/office/2006/metadata/properties" ma:root="true" ma:fieldsID="1e062cd38ba31e406bfc4340fbc7f87a" ns2:_="">
     <xsd:import namespace="7bb5d761-a2ea-4873-95f7-7a6658fb3ef0"/>
@@ -24996,7 +25092,7 @@
 </ct:contentTypeSchema>
 </file>
 
-<file path=customXml/item3.xml><?xml version="1.0" encoding="utf-8"?>
+<file path=customXml/item4.xml><?xml version="1.0" encoding="utf-8"?>
 <?mso-contentType ?>
 <spe:Receivers xmlns:spe="http://schemas.microsoft.com/sharepoint/events">
   <Receiver>
@@ -25042,16 +25138,15 @@
 </spe:Receivers>
 </file>
 
-<file path=customXml/item4.xml><?xml version="1.0" encoding="utf-8"?>
-<?mso-contentType ?>
-<FormTemplates xmlns="http://schemas.microsoft.com/sharepoint/v3/contenttype/forms">
-  <Display>DocumentLibraryForm</Display>
-  <Edit>DocumentLibraryForm</Edit>
-  <New>DocumentLibraryForm</New>
-</FormTemplates>
+<file path=customXml/itemProps1.xml><?xml version="1.0" encoding="utf-8"?>
+<ds:datastoreItem xmlns:ds="http://schemas.openxmlformats.org/officeDocument/2006/customXml" ds:itemID="{5CDEB364-43EC-4510-9881-539C2A3FCE9E}">
+  <ds:schemaRefs>
+    <ds:schemaRef ds:uri="http://schemas.microsoft.com/sharepoint/v3/contenttype/forms"/>
+  </ds:schemaRefs>
+</ds:datastoreItem>
 </file>
 
-<file path=customXml/itemProps1.xml><?xml version="1.0" encoding="utf-8"?>
+<file path=customXml/itemProps2.xml><?xml version="1.0" encoding="utf-8"?>
 <ds:datastoreItem xmlns:ds="http://schemas.openxmlformats.org/officeDocument/2006/customXml" ds:itemID="{6921749B-AEB7-461B-845F-603CABD25259}">
   <ds:schemaRefs>
     <ds:schemaRef ds:uri="http://schemas.microsoft.com/office/2006/documentManagement/types"/>
@@ -25067,7 +25162,7 @@
 </ds:datastoreItem>
 </file>
 
-<file path=customXml/itemProps2.xml><?xml version="1.0" encoding="utf-8"?>
+<file path=customXml/itemProps3.xml><?xml version="1.0" encoding="utf-8"?>
 <ds:datastoreItem xmlns:ds="http://schemas.openxmlformats.org/officeDocument/2006/customXml" ds:itemID="{164479E5-0B02-49AC-B79E-EC1D6164DDD3}">
   <ds:schemaRefs>
     <ds:schemaRef ds:uri="http://schemas.microsoft.com/office/2006/metadata/contentType"/>
@@ -25085,18 +25180,10 @@
 </ds:datastoreItem>
 </file>
 
-<file path=customXml/itemProps3.xml><?xml version="1.0" encoding="utf-8"?>
+<file path=customXml/itemProps4.xml><?xml version="1.0" encoding="utf-8"?>
 <ds:datastoreItem xmlns:ds="http://schemas.openxmlformats.org/officeDocument/2006/customXml" ds:itemID="{B13EBC30-FE27-4C6A-B723-23FC2188F7DC}">
   <ds:schemaRefs>
     <ds:schemaRef ds:uri="http://schemas.microsoft.com/sharepoint/events"/>
   </ds:schemaRefs>
 </ds:datastoreItem>
-</file>
-
-<file path=customXml/itemProps4.xml><?xml version="1.0" encoding="utf-8"?>
-<ds:datastoreItem xmlns:ds="http://schemas.openxmlformats.org/officeDocument/2006/customXml" ds:itemID="{5CDEB364-43EC-4510-9881-539C2A3FCE9E}">
-  <ds:schemaRefs>
-    <ds:schemaRef ds:uri="http://schemas.microsoft.com/sharepoint/v3/contenttype/forms"/>
-  </ds:schemaRefs>
-</ds:datastoreItem>
 </file>
</xml_diff>

<commit_message>
Update creating custom profiles
* Update objective:  'Use InSpec...' not 'Using InSpec...'
* Spell out 'command line interface'
* Change the header of the slide for creating the profile directory
* Change the header of the slide when creating the metadata.rb file, use 'Creat
e' instead of 'Creating'
* Downloading the zipped profile and uploading it are two different objectives
* Align the output of the zip command
* Correct the title of the slide when re-scanning the node 'Scan Your Node' ins
tead of 'Upload the Profile to Chef Compliance'
</commit_message>
<xml_diff>
--- a/05-creating-custom-profiles.pptx
+++ b/05-creating-custom-profiles.pptx
@@ -176,7 +176,7 @@
   </p:defaultTextStyle>
   <p:extLst>
     <p:ext uri="{EFAFB233-063F-42B5-8137-9DF3F51BA10A}">
-      <p15:sldGuideLst xmlns:p15="http://schemas.microsoft.com/office/powerpoint/2012/main">
+      <p15:sldGuideLst xmlns:p15="http://schemas.microsoft.com/office/powerpoint/2012/main" xmlns="">
         <p15:guide id="1" orient="horz" pos="894">
           <p15:clr>
             <a:srgbClr val="A4A3A4"/>
@@ -190,7 +190,7 @@
       </p15:sldGuideLst>
     </p:ext>
     <p:ext uri="{2D200454-40CA-4A62-9FC3-DE9A4176ACB9}">
-      <p15:notesGuideLst xmlns:p15="http://schemas.microsoft.com/office/powerpoint/2012/main"/>
+      <p15:notesGuideLst xmlns:p15="http://schemas.microsoft.com/office/powerpoint/2012/main" xmlns=""/>
     </p:ext>
   </p:extLst>
 </p:presentation>
@@ -307,7 +307,7 @@
               <a:pPr>
                 <a:defRPr/>
               </a:pPr>
-              <a:t>2016-01-19</a:t>
+              <a:t>1/19/16</a:t>
             </a:fld>
             <a:endParaRPr lang="en-US" dirty="0"/>
           </a:p>
@@ -490,7 +490,7 @@
               <a:pPr>
                 <a:defRPr/>
               </a:pPr>
-              <a:t>2016-01-19</a:t>
+              <a:t>1/19/16</a:t>
             </a:fld>
             <a:endParaRPr lang="en-US" dirty="0"/>
           </a:p>
@@ -8274,7 +8274,7 @@
   <p:clrMapOvr>
     <a:masterClrMapping/>
   </p:clrMapOvr>
-  <p:transition spd="med">
+  <p:transition xmlns:p14="http://schemas.microsoft.com/office/powerpoint/2010/main" spd="med">
     <p:fade/>
   </p:transition>
 </p:sldLayout>
@@ -8569,7 +8569,7 @@
   <p:clrMapOvr>
     <a:overrideClrMapping bg1="lt1" tx1="dk1" bg2="lt2" tx2="dk2" accent1="accent1" accent2="accent2" accent3="accent3" accent4="accent4" accent5="accent5" accent6="accent6" hlink="hlink" folHlink="folHlink"/>
   </p:clrMapOvr>
-  <p:transition spd="med">
+  <p:transition xmlns:p14="http://schemas.microsoft.com/office/powerpoint/2010/main" spd="med">
     <p:fade/>
   </p:transition>
 </p:sldLayout>
@@ -8702,14 +8702,14 @@
           </a:ln>
           <a:extLst>
             <a:ext uri="{909E8E84-426E-40dd-AFC4-6F175D3DCCD1}">
-              <a14:hiddenFill xmlns="" xmlns:a14="http://schemas.microsoft.com/office/drawing/2010/main">
+              <a14:hiddenFill xmlns:a14="http://schemas.microsoft.com/office/drawing/2010/main">
                 <a:solidFill>
                   <a:srgbClr val="FFFFFF"/>
                 </a:solidFill>
               </a14:hiddenFill>
             </a:ext>
             <a:ext uri="{91240B29-F687-4f45-9708-019B960494DF}">
-              <a14:hiddenLine xmlns="" xmlns:a14="http://schemas.microsoft.com/office/drawing/2010/main" w="9525">
+              <a14:hiddenLine xmlns:a14="http://schemas.microsoft.com/office/drawing/2010/main" w="9525">
                 <a:solidFill>
                   <a:srgbClr val="000000"/>
                 </a:solidFill>
@@ -8857,14 +8857,14 @@
           </a:ln>
           <a:extLst>
             <a:ext uri="{909E8E84-426E-40dd-AFC4-6F175D3DCCD1}">
-              <a14:hiddenFill xmlns="" xmlns:a14="http://schemas.microsoft.com/office/drawing/2010/main">
+              <a14:hiddenFill xmlns:a14="http://schemas.microsoft.com/office/drawing/2010/main">
                 <a:solidFill>
                   <a:srgbClr val="FFFFFF"/>
                 </a:solidFill>
               </a14:hiddenFill>
             </a:ext>
             <a:ext uri="{91240B29-F687-4f45-9708-019B960494DF}">
-              <a14:hiddenLine xmlns="" xmlns:a14="http://schemas.microsoft.com/office/drawing/2010/main" w="9525">
+              <a14:hiddenLine xmlns:a14="http://schemas.microsoft.com/office/drawing/2010/main" w="9525">
                 <a:solidFill>
                   <a:srgbClr val="000000"/>
                 </a:solidFill>
@@ -9262,7 +9262,7 @@
   <p:clrMapOvr>
     <a:overrideClrMapping bg1="lt1" tx1="dk1" bg2="lt2" tx2="dk2" accent1="accent1" accent2="accent2" accent3="accent3" accent4="accent4" accent5="accent5" accent6="accent6" hlink="hlink" folHlink="folHlink"/>
   </p:clrMapOvr>
-  <p:transition spd="med">
+  <p:transition xmlns:p14="http://schemas.microsoft.com/office/powerpoint/2010/main" spd="med">
     <p:fade/>
   </p:transition>
 </p:sldLayout>
@@ -9355,14 +9355,14 @@
           </a:ln>
           <a:extLst>
             <a:ext uri="{909E8E84-426E-40dd-AFC4-6F175D3DCCD1}">
-              <a14:hiddenFill xmlns="" xmlns:a14="http://schemas.microsoft.com/office/drawing/2010/main">
+              <a14:hiddenFill xmlns:a14="http://schemas.microsoft.com/office/drawing/2010/main">
                 <a:solidFill>
                   <a:srgbClr val="FFFFFF"/>
                 </a:solidFill>
               </a14:hiddenFill>
             </a:ext>
             <a:ext uri="{91240B29-F687-4f45-9708-019B960494DF}">
-              <a14:hiddenLine xmlns="" xmlns:a14="http://schemas.microsoft.com/office/drawing/2010/main" w="9525">
+              <a14:hiddenLine xmlns:a14="http://schemas.microsoft.com/office/drawing/2010/main" w="9525">
                 <a:solidFill>
                   <a:srgbClr val="000000"/>
                 </a:solidFill>
@@ -9384,7 +9384,7 @@
   <p:clrMapOvr>
     <a:masterClrMapping/>
   </p:clrMapOvr>
-  <p:transition spd="med">
+  <p:transition xmlns:p14="http://schemas.microsoft.com/office/powerpoint/2010/main" spd="med">
     <p:fade/>
   </p:transition>
 </p:sldLayout>
@@ -9671,7 +9671,7 @@
   <p:clrMapOvr>
     <a:masterClrMapping/>
   </p:clrMapOvr>
-  <p:transition spd="med">
+  <p:transition xmlns:p14="http://schemas.microsoft.com/office/powerpoint/2010/main" spd="med">
     <p:fade/>
   </p:transition>
 </p:sldLayout>
@@ -9888,14 +9888,14 @@
           </a:ln>
           <a:extLst>
             <a:ext uri="{909E8E84-426E-40dd-AFC4-6F175D3DCCD1}">
-              <a14:hiddenFill xmlns="" xmlns:a14="http://schemas.microsoft.com/office/drawing/2010/main">
+              <a14:hiddenFill xmlns:a14="http://schemas.microsoft.com/office/drawing/2010/main">
                 <a:solidFill>
                   <a:srgbClr val="FFFFFF"/>
                 </a:solidFill>
               </a14:hiddenFill>
             </a:ext>
             <a:ext uri="{91240B29-F687-4f45-9708-019B960494DF}">
-              <a14:hiddenLine xmlns="" xmlns:a14="http://schemas.microsoft.com/office/drawing/2010/main" w="9525">
+              <a14:hiddenLine xmlns:a14="http://schemas.microsoft.com/office/drawing/2010/main" w="9525">
                 <a:solidFill>
                   <a:srgbClr val="000000"/>
                 </a:solidFill>
@@ -10092,7 +10092,7 @@
   <p:clrMapOvr>
     <a:masterClrMapping/>
   </p:clrMapOvr>
-  <p:transition spd="med">
+  <p:transition xmlns:p14="http://schemas.microsoft.com/office/powerpoint/2010/main" spd="med">
     <p:fade/>
   </p:transition>
 </p:sldLayout>
@@ -10379,7 +10379,7 @@
   <p:clrMapOvr>
     <a:masterClrMapping/>
   </p:clrMapOvr>
-  <p:transition spd="med">
+  <p:transition xmlns:p14="http://schemas.microsoft.com/office/powerpoint/2010/main" spd="med">
     <p:fade/>
   </p:transition>
 </p:sldLayout>
@@ -10666,7 +10666,7 @@
   <p:clrMapOvr>
     <a:masterClrMapping/>
   </p:clrMapOvr>
-  <p:transition spd="med">
+  <p:transition xmlns:p14="http://schemas.microsoft.com/office/powerpoint/2010/main" spd="med">
     <p:fade/>
   </p:transition>
 </p:sldLayout>
@@ -11015,7 +11015,7 @@
   <p:clrMapOvr>
     <a:masterClrMapping/>
   </p:clrMapOvr>
-  <p:transition spd="med">
+  <p:transition xmlns:p14="http://schemas.microsoft.com/office/powerpoint/2010/main" spd="med">
     <p:fade/>
   </p:transition>
 </p:sldLayout>
@@ -11302,7 +11302,7 @@
   <p:clrMapOvr>
     <a:masterClrMapping/>
   </p:clrMapOvr>
-  <p:transition spd="med">
+  <p:transition xmlns:p14="http://schemas.microsoft.com/office/powerpoint/2010/main" spd="med">
     <p:fade/>
   </p:transition>
 </p:sldLayout>
@@ -11519,14 +11519,14 @@
           </a:ln>
           <a:extLst>
             <a:ext uri="{909E8E84-426E-40dd-AFC4-6F175D3DCCD1}">
-              <a14:hiddenFill xmlns="" xmlns:a14="http://schemas.microsoft.com/office/drawing/2010/main">
+              <a14:hiddenFill xmlns:a14="http://schemas.microsoft.com/office/drawing/2010/main">
                 <a:solidFill>
                   <a:srgbClr val="FFFFFF"/>
                 </a:solidFill>
               </a14:hiddenFill>
             </a:ext>
             <a:ext uri="{91240B29-F687-4f45-9708-019B960494DF}">
-              <a14:hiddenLine xmlns="" xmlns:a14="http://schemas.microsoft.com/office/drawing/2010/main" w="9525">
+              <a14:hiddenLine xmlns:a14="http://schemas.microsoft.com/office/drawing/2010/main" w="9525">
                 <a:solidFill>
                   <a:srgbClr val="000000"/>
                 </a:solidFill>
@@ -11723,7 +11723,7 @@
   <p:clrMapOvr>
     <a:masterClrMapping/>
   </p:clrMapOvr>
-  <p:transition spd="med">
+  <p:transition xmlns:p14="http://schemas.microsoft.com/office/powerpoint/2010/main" spd="med">
     <p:fade/>
   </p:transition>
 </p:sldLayout>
@@ -11900,7 +11900,7 @@
   <p:clrMapOvr>
     <a:masterClrMapping/>
   </p:clrMapOvr>
-  <p:transition spd="med">
+  <p:transition xmlns:p14="http://schemas.microsoft.com/office/powerpoint/2010/main" spd="med">
     <p:fade/>
   </p:transition>
 </p:sldLayout>
@@ -12188,7 +12188,7 @@
   <p:clrMapOvr>
     <a:masterClrMapping/>
   </p:clrMapOvr>
-  <p:transition spd="med">
+  <p:transition xmlns:p14="http://schemas.microsoft.com/office/powerpoint/2010/main" spd="med">
     <p:fade/>
   </p:transition>
 </p:sldLayout>
@@ -12500,7 +12500,7 @@
   <p:clrMapOvr>
     <a:masterClrMapping/>
   </p:clrMapOvr>
-  <p:transition spd="med">
+  <p:transition xmlns:p14="http://schemas.microsoft.com/office/powerpoint/2010/main" spd="med">
     <p:fade/>
   </p:transition>
 </p:sldLayout>
@@ -12804,7 +12804,7 @@
   <p:clrMapOvr>
     <a:masterClrMapping/>
   </p:clrMapOvr>
-  <p:transition spd="med">
+  <p:transition xmlns:p14="http://schemas.microsoft.com/office/powerpoint/2010/main" spd="med">
     <p:fade/>
   </p:transition>
 </p:sldLayout>
@@ -12880,14 +12880,14 @@
           </a:ln>
           <a:extLst>
             <a:ext uri="{909E8E84-426E-40dd-AFC4-6F175D3DCCD1}">
-              <a14:hiddenFill xmlns="" xmlns:a14="http://schemas.microsoft.com/office/drawing/2010/main">
+              <a14:hiddenFill xmlns:a14="http://schemas.microsoft.com/office/drawing/2010/main">
                 <a:solidFill>
                   <a:srgbClr val="FFFFFF"/>
                 </a:solidFill>
               </a14:hiddenFill>
             </a:ext>
             <a:ext uri="{91240B29-F687-4f45-9708-019B960494DF}">
-              <a14:hiddenLine xmlns="" xmlns:a14="http://schemas.microsoft.com/office/drawing/2010/main" w="9525">
+              <a14:hiddenLine xmlns:a14="http://schemas.microsoft.com/office/drawing/2010/main" w="9525">
                 <a:solidFill>
                   <a:srgbClr val="000000"/>
                 </a:solidFill>
@@ -13111,7 +13111,7 @@
   <p:clrMapOvr>
     <a:overrideClrMapping bg1="lt1" tx1="dk1" bg2="lt2" tx2="dk2" accent1="accent1" accent2="accent2" accent3="accent3" accent4="accent4" accent5="accent5" accent6="accent6" hlink="hlink" folHlink="folHlink"/>
   </p:clrMapOvr>
-  <p:transition spd="med">
+  <p:transition xmlns:p14="http://schemas.microsoft.com/office/powerpoint/2010/main" spd="med">
     <p:fade/>
   </p:transition>
 </p:sldLayout>
@@ -13317,7 +13317,7 @@
   <p:clrMapOvr>
     <a:overrideClrMapping bg1="lt1" tx1="dk1" bg2="lt2" tx2="dk2" accent1="accent1" accent2="accent2" accent3="accent3" accent4="accent4" accent5="accent5" accent6="accent6" hlink="hlink" folHlink="folHlink"/>
   </p:clrMapOvr>
-  <p:transition spd="med">
+  <p:transition xmlns:p14="http://schemas.microsoft.com/office/powerpoint/2010/main" spd="med">
     <p:fade/>
   </p:transition>
 </p:sldLayout>
@@ -13393,14 +13393,14 @@
           </a:ln>
           <a:extLst>
             <a:ext uri="{909E8E84-426E-40dd-AFC4-6F175D3DCCD1}">
-              <a14:hiddenFill xmlns="" xmlns:a14="http://schemas.microsoft.com/office/drawing/2010/main">
+              <a14:hiddenFill xmlns:a14="http://schemas.microsoft.com/office/drawing/2010/main">
                 <a:solidFill>
                   <a:srgbClr val="FFFFFF"/>
                 </a:solidFill>
               </a14:hiddenFill>
             </a:ext>
             <a:ext uri="{91240B29-F687-4f45-9708-019B960494DF}">
-              <a14:hiddenLine xmlns="" xmlns:a14="http://schemas.microsoft.com/office/drawing/2010/main" w="9525">
+              <a14:hiddenLine xmlns:a14="http://schemas.microsoft.com/office/drawing/2010/main" w="9525">
                 <a:solidFill>
                   <a:srgbClr val="000000"/>
                 </a:solidFill>
@@ -13683,7 +13683,7 @@
   <p:clrMapOvr>
     <a:overrideClrMapping bg1="lt1" tx1="dk1" bg2="lt2" tx2="dk2" accent1="accent1" accent2="accent2" accent3="accent3" accent4="accent4" accent5="accent5" accent6="accent6" hlink="hlink" folHlink="folHlink"/>
   </p:clrMapOvr>
-  <p:transition spd="med">
+  <p:transition xmlns:p14="http://schemas.microsoft.com/office/powerpoint/2010/main" spd="med">
     <p:fade/>
   </p:transition>
 </p:sldLayout>
@@ -13891,7 +13891,7 @@
   <p:clrMapOvr>
     <a:overrideClrMapping bg1="lt1" tx1="dk1" bg2="lt2" tx2="dk2" accent1="accent1" accent2="accent2" accent3="accent3" accent4="accent4" accent5="accent5" accent6="accent6" hlink="hlink" folHlink="folHlink"/>
   </p:clrMapOvr>
-  <p:transition spd="med">
+  <p:transition xmlns:p14="http://schemas.microsoft.com/office/powerpoint/2010/main" spd="med">
     <p:fade/>
   </p:transition>
 </p:sldLayout>
@@ -13967,14 +13967,14 @@
           </a:ln>
           <a:extLst>
             <a:ext uri="{909E8E84-426E-40dd-AFC4-6F175D3DCCD1}">
-              <a14:hiddenFill xmlns="" xmlns:a14="http://schemas.microsoft.com/office/drawing/2010/main">
+              <a14:hiddenFill xmlns:a14="http://schemas.microsoft.com/office/drawing/2010/main">
                 <a:solidFill>
                   <a:srgbClr val="FFFFFF"/>
                 </a:solidFill>
               </a14:hiddenFill>
             </a:ext>
             <a:ext uri="{91240B29-F687-4f45-9708-019B960494DF}">
-              <a14:hiddenLine xmlns="" xmlns:a14="http://schemas.microsoft.com/office/drawing/2010/main" w="9525">
+              <a14:hiddenLine xmlns:a14="http://schemas.microsoft.com/office/drawing/2010/main" w="9525">
                 <a:solidFill>
                   <a:srgbClr val="000000"/>
                 </a:solidFill>
@@ -14242,7 +14242,7 @@
   <p:clrMapOvr>
     <a:overrideClrMapping bg1="lt1" tx1="dk1" bg2="lt2" tx2="dk2" accent1="accent1" accent2="accent2" accent3="accent3" accent4="accent4" accent5="accent5" accent6="accent6" hlink="hlink" folHlink="folHlink"/>
   </p:clrMapOvr>
-  <p:transition spd="med">
+  <p:transition xmlns:p14="http://schemas.microsoft.com/office/powerpoint/2010/main" spd="med">
     <p:fade/>
   </p:transition>
 </p:sldLayout>
@@ -14470,7 +14470,7 @@
   <p:clrMapOvr>
     <a:overrideClrMapping bg1="lt1" tx1="dk1" bg2="lt2" tx2="dk2" accent1="accent1" accent2="accent2" accent3="accent3" accent4="accent4" accent5="accent5" accent6="accent6" hlink="hlink" folHlink="folHlink"/>
   </p:clrMapOvr>
-  <p:transition spd="med">
+  <p:transition xmlns:p14="http://schemas.microsoft.com/office/powerpoint/2010/main" spd="med">
     <p:fade/>
   </p:transition>
 </p:sldLayout>
@@ -14758,7 +14758,7 @@
   <p:clrMapOvr>
     <a:overrideClrMapping bg1="lt1" tx1="dk1" bg2="lt2" tx2="dk2" accent1="accent1" accent2="accent2" accent3="accent3" accent4="accent4" accent5="accent5" accent6="accent6" hlink="hlink" folHlink="folHlink"/>
   </p:clrMapOvr>
-  <p:transition spd="med">
+  <p:transition xmlns:p14="http://schemas.microsoft.com/office/powerpoint/2010/main" spd="med">
     <p:fade/>
   </p:transition>
 </p:sldLayout>
@@ -14914,14 +14914,14 @@
           </a:ln>
           <a:extLst>
             <a:ext uri="{909E8E84-426E-40dd-AFC4-6F175D3DCCD1}">
-              <a14:hiddenFill xmlns="" xmlns:a14="http://schemas.microsoft.com/office/drawing/2010/main">
+              <a14:hiddenFill xmlns:a14="http://schemas.microsoft.com/office/drawing/2010/main">
                 <a:solidFill>
                   <a:srgbClr val="FFFFFF"/>
                 </a:solidFill>
               </a14:hiddenFill>
             </a:ext>
             <a:ext uri="{91240B29-F687-4f45-9708-019B960494DF}">
-              <a14:hiddenLine xmlns="" xmlns:a14="http://schemas.microsoft.com/office/drawing/2010/main" w="9525">
+              <a14:hiddenLine xmlns:a14="http://schemas.microsoft.com/office/drawing/2010/main" w="9525">
                 <a:solidFill>
                   <a:srgbClr val="000000"/>
                 </a:solidFill>
@@ -15140,13 +15140,13 @@
     <p:sldLayoutId id="2147483867" r:id="rId13"/>
     <p:sldLayoutId id="2147483868" r:id="rId14"/>
   </p:sldLayoutIdLst>
-  <p:transition spd="med">
+  <p:transition xmlns:p14="http://schemas.microsoft.com/office/powerpoint/2010/main" spd="med">
     <p:fade/>
   </p:transition>
   <p:timing>
     <p:tnLst>
       <p:par>
-        <p:cTn id="1" dur="indefinite" restart="never" nodeType="tmRoot"/>
+        <p:cTn xmlns:p14="http://schemas.microsoft.com/office/powerpoint/2010/main" id="1" dur="indefinite" restart="never" nodeType="tmRoot"/>
       </p:par>
     </p:tnLst>
   </p:timing>
@@ -15674,14 +15674,14 @@
           </a:ln>
           <a:extLst>
             <a:ext uri="{909E8E84-426E-40dd-AFC4-6F175D3DCCD1}">
-              <a14:hiddenFill xmlns="" xmlns:a14="http://schemas.microsoft.com/office/drawing/2010/main">
+              <a14:hiddenFill xmlns:a14="http://schemas.microsoft.com/office/drawing/2010/main">
                 <a:solidFill>
                   <a:srgbClr val="FFFFFF"/>
                 </a:solidFill>
               </a14:hiddenFill>
             </a:ext>
             <a:ext uri="{91240B29-F687-4f45-9708-019B960494DF}">
-              <a14:hiddenLine xmlns="" xmlns:a14="http://schemas.microsoft.com/office/drawing/2010/main" w="9525">
+              <a14:hiddenLine xmlns:a14="http://schemas.microsoft.com/office/drawing/2010/main" w="9525">
                 <a:solidFill>
                   <a:srgbClr val="000000"/>
                 </a:solidFill>
@@ -15969,13 +15969,13 @@
     <p:sldLayoutId id="2147483856" r:id="rId7"/>
     <p:sldLayoutId id="2147483866" r:id="rId8"/>
   </p:sldLayoutIdLst>
-  <p:transition spd="med">
+  <p:transition xmlns:p14="http://schemas.microsoft.com/office/powerpoint/2010/main" spd="med">
     <p:fade/>
   </p:transition>
   <p:timing>
     <p:tnLst>
       <p:par>
-        <p:cTn id="1" dur="indefinite" restart="never" nodeType="tmRoot"/>
+        <p:cTn xmlns:p14="http://schemas.microsoft.com/office/powerpoint/2010/main" id="1" dur="indefinite" restart="never" nodeType="tmRoot"/>
       </p:par>
     </p:tnLst>
   </p:timing>
@@ -16478,13 +16478,13 @@
   <p:clrMapOvr>
     <a:masterClrMapping/>
   </p:clrMapOvr>
-  <p:transition spd="med">
+  <p:transition xmlns:p14="http://schemas.microsoft.com/office/powerpoint/2010/main" spd="med">
     <p:fade/>
   </p:transition>
   <p:timing>
     <p:tnLst>
       <p:par>
-        <p:cTn id="1" dur="indefinite" restart="never" nodeType="tmRoot"/>
+        <p:cTn xmlns:p14="http://schemas.microsoft.com/office/powerpoint/2010/main" id="1" dur="indefinite" restart="never" nodeType="tmRoot"/>
       </p:par>
     </p:tnLst>
   </p:timing>
@@ -16635,7 +16635,7 @@
   <p:clrMapOvr>
     <a:masterClrMapping/>
   </p:clrMapOvr>
-  <p:transition spd="med">
+  <p:transition xmlns:p14="http://schemas.microsoft.com/office/powerpoint/2010/main" spd="med">
     <p:fade/>
   </p:transition>
 </p:sld>
@@ -16889,13 +16889,13 @@
   <p:clrMapOvr>
     <a:masterClrMapping/>
   </p:clrMapOvr>
-  <p:transition spd="med">
+  <p:transition xmlns:p14="http://schemas.microsoft.com/office/powerpoint/2010/main" spd="med">
     <p:fade/>
   </p:transition>
   <p:timing>
     <p:tnLst>
       <p:par>
-        <p:cTn id="1" dur="indefinite" restart="never" nodeType="tmRoot"/>
+        <p:cTn xmlns:p14="http://schemas.microsoft.com/office/powerpoint/2010/main" id="1" dur="indefinite" restart="never" nodeType="tmRoot"/>
       </p:par>
     </p:tnLst>
   </p:timing>
@@ -17103,13 +17103,13 @@
   <p:clrMapOvr>
     <a:masterClrMapping/>
   </p:clrMapOvr>
-  <p:transition spd="med">
+  <p:transition xmlns:p14="http://schemas.microsoft.com/office/powerpoint/2010/main" spd="med">
     <p:fade/>
   </p:transition>
   <p:timing>
     <p:tnLst>
       <p:par>
-        <p:cTn id="1" dur="indefinite" restart="never" nodeType="tmRoot"/>
+        <p:cTn xmlns:p14="http://schemas.microsoft.com/office/powerpoint/2010/main" id="1" dur="indefinite" restart="never" nodeType="tmRoot"/>
       </p:par>
     </p:tnLst>
   </p:timing>
@@ -17338,13 +17338,13 @@
   <p:clrMapOvr>
     <a:masterClrMapping/>
   </p:clrMapOvr>
-  <p:transition spd="med">
+  <p:transition xmlns:p14="http://schemas.microsoft.com/office/powerpoint/2010/main" spd="med">
     <p:fade/>
   </p:transition>
   <p:timing>
     <p:tnLst>
       <p:par>
-        <p:cTn id="1" dur="indefinite" restart="never" nodeType="tmRoot"/>
+        <p:cTn xmlns:p14="http://schemas.microsoft.com/office/powerpoint/2010/main" id="1" dur="indefinite" restart="never" nodeType="tmRoot"/>
       </p:par>
     </p:tnLst>
   </p:timing>
@@ -17506,13 +17506,13 @@
   <p:clrMapOvr>
     <a:masterClrMapping/>
   </p:clrMapOvr>
-  <p:transition spd="med">
+  <p:transition xmlns:p14="http://schemas.microsoft.com/office/powerpoint/2010/main" spd="med">
     <p:fade/>
   </p:transition>
   <p:timing>
     <p:tnLst>
       <p:par>
-        <p:cTn id="1" dur="indefinite" restart="never" nodeType="tmRoot"/>
+        <p:cTn xmlns:p14="http://schemas.microsoft.com/office/powerpoint/2010/main" id="1" dur="indefinite" restart="never" nodeType="tmRoot"/>
       </p:par>
     </p:tnLst>
   </p:timing>
@@ -17834,7 +17834,7 @@
   <p:clrMapOvr>
     <a:masterClrMapping/>
   </p:clrMapOvr>
-  <p:transition spd="med">
+  <p:transition xmlns:p14="http://schemas.microsoft.com/office/powerpoint/2010/main" spd="med">
     <p:fade/>
   </p:transition>
 </p:sld>
@@ -18069,13 +18069,13 @@
   <p:clrMapOvr>
     <a:masterClrMapping/>
   </p:clrMapOvr>
-  <p:transition spd="med">
+  <p:transition xmlns:p14="http://schemas.microsoft.com/office/powerpoint/2010/main" spd="med">
     <p:fade/>
   </p:transition>
   <p:timing>
     <p:tnLst>
       <p:par>
-        <p:cTn id="1" dur="indefinite" restart="never" nodeType="tmRoot"/>
+        <p:cTn xmlns:p14="http://schemas.microsoft.com/office/powerpoint/2010/main" id="1" dur="indefinite" restart="never" nodeType="tmRoot"/>
       </p:par>
     </p:tnLst>
   </p:timing>
@@ -18221,13 +18221,13 @@
   <p:clrMapOvr>
     <a:masterClrMapping/>
   </p:clrMapOvr>
-  <p:transition spd="med">
+  <p:transition xmlns:p14="http://schemas.microsoft.com/office/powerpoint/2010/main" spd="med">
     <p:fade/>
   </p:transition>
   <p:timing>
     <p:tnLst>
       <p:par>
-        <p:cTn id="1" dur="indefinite" restart="never" nodeType="tmRoot"/>
+        <p:cTn xmlns:p14="http://schemas.microsoft.com/office/powerpoint/2010/main" id="1" dur="indefinite" restart="never" nodeType="tmRoot"/>
       </p:par>
     </p:tnLst>
   </p:timing>
@@ -18329,7 +18329,7 @@
               <a:buChar char="q"/>
             </a:pPr>
             <a:r>
-              <a:rPr lang="en-US" dirty="0" smtClean="0"/>
+              <a:rPr lang="en-US" dirty="0"/>
               <a:t>Zip up the new profile.</a:t>
             </a:r>
           </a:p>
@@ -18339,8 +18339,8 @@
               <a:buChar char="q"/>
             </a:pPr>
             <a:r>
-              <a:rPr lang="en-US" dirty="0" smtClean="0"/>
-              <a:t>Upload it to your laptop and then to the Compliance Server.</a:t>
+              <a:rPr lang="en-US" dirty="0"/>
+              <a:t>Download it to your laptop.</a:t>
             </a:r>
           </a:p>
           <a:p>
@@ -18348,6 +18348,14 @@
               <a:buFont typeface="Wingdings" panose="05000000000000000000" pitchFamily="2" charset="2"/>
               <a:buChar char="q"/>
             </a:pPr>
+            <a:r>
+              <a:rPr lang="en-US" dirty="0"/>
+              <a:t>Upload it to the Compliance Server</a:t>
+            </a:r>
+            <a:r>
+              <a:rPr lang="en-US" dirty="0" smtClean="0"/>
+              <a:t>.	</a:t>
+            </a:r>
             <a:endParaRPr lang="en-US" dirty="0" smtClean="0"/>
           </a:p>
           <a:p>
@@ -18376,7 +18384,7 @@
   <p:clrMapOvr>
     <a:masterClrMapping/>
   </p:clrMapOvr>
-  <p:transition spd="med">
+  <p:transition xmlns:p14="http://schemas.microsoft.com/office/powerpoint/2010/main" spd="med">
     <p:fade/>
   </p:transition>
 </p:sld>
@@ -18513,7 +18521,7 @@
   <p:clrMapOvr>
     <a:masterClrMapping/>
   </p:clrMapOvr>
-  <p:transition spd="med">
+  <p:transition xmlns:p14="http://schemas.microsoft.com/office/powerpoint/2010/main" spd="med">
     <p:fade/>
   </p:transition>
 </p:sld>
@@ -18623,7 +18631,7 @@
             </a:pPr>
             <a:r>
               <a:rPr lang="en-US" dirty="0" smtClean="0"/>
-              <a:t>Using </a:t>
+              <a:t>Use </a:t>
             </a:r>
             <a:r>
               <a:rPr lang="en-US" dirty="0" err="1" smtClean="0"/>
@@ -18688,13 +18696,13 @@
   <p:clrMapOvr>
     <a:masterClrMapping/>
   </p:clrMapOvr>
-  <p:transition spd="med">
+  <p:transition xmlns:p14="http://schemas.microsoft.com/office/powerpoint/2010/main" spd="med">
     <p:fade/>
   </p:transition>
   <p:timing>
     <p:tnLst>
       <p:par>
-        <p:cTn id="1" dur="indefinite" restart="never" nodeType="tmRoot"/>
+        <p:cTn xmlns:p14="http://schemas.microsoft.com/office/powerpoint/2010/main" id="1" dur="indefinite" restart="never" nodeType="tmRoot"/>
       </p:par>
     </p:tnLst>
   </p:timing>
@@ -18746,19 +18754,35 @@
           <a:p>
             <a:r>
               <a:rPr lang="en-US" dirty="0"/>
-              <a:t>  adding: profile_01/metadata.rb (deflated 17%)</a:t>
-            </a:r>
-          </a:p>
-          <a:p>
+              <a:t> </a:t>
+            </a:r>
+            <a:r>
+              <a:rPr lang="en-US" dirty="0" smtClean="0"/>
+              <a:t>adding</a:t>
+            </a:r>
             <a:r>
               <a:rPr lang="en-US" dirty="0"/>
-              <a:t>  adding: profile_01/test/ (stored 0%)</a:t>
-            </a:r>
-          </a:p>
-          <a:p>
+              <a:t>: profile_01/metadata.rb (deflated 17%)</a:t>
+            </a:r>
+          </a:p>
+          <a:p>
+            <a:r>
+              <a:rPr lang="en-US" dirty="0" smtClean="0"/>
+              <a:t> </a:t>
+            </a:r>
             <a:r>
               <a:rPr lang="en-US" dirty="0"/>
-              <a:t>  adding: profile_01/test/</a:t>
+              <a:t>adding: profile_01/test/ (stored 0%)</a:t>
+            </a:r>
+          </a:p>
+          <a:p>
+            <a:r>
+              <a:rPr lang="en-US" dirty="0" smtClean="0"/>
+              <a:t> </a:t>
+            </a:r>
+            <a:r>
+              <a:rPr lang="en-US" dirty="0"/>
+              <a:t>adding: profile_01/test/</a:t>
             </a:r>
             <a:r>
               <a:rPr lang="en-US" dirty="0" err="1"/>
@@ -18846,7 +18870,7 @@
   <p:clrMapOvr>
     <a:masterClrMapping/>
   </p:clrMapOvr>
-  <p:transition spd="med">
+  <p:transition xmlns:p14="http://schemas.microsoft.com/office/powerpoint/2010/main" spd="med">
     <p:fade/>
   </p:transition>
 </p:sld>
@@ -19013,7 +19037,7 @@
   <p:clrMapOvr>
     <a:masterClrMapping/>
   </p:clrMapOvr>
-  <p:transition spd="med">
+  <p:transition xmlns:p14="http://schemas.microsoft.com/office/powerpoint/2010/main" spd="med">
     <p:fade/>
   </p:transition>
 </p:sld>
@@ -19171,13 +19195,13 @@
   <p:clrMapOvr>
     <a:masterClrMapping/>
   </p:clrMapOvr>
-  <p:transition spd="med">
+  <p:transition xmlns:p14="http://schemas.microsoft.com/office/powerpoint/2010/main" spd="med">
     <p:fade/>
   </p:transition>
   <p:timing>
     <p:tnLst>
       <p:par>
-        <p:cTn id="1" dur="indefinite" restart="never" nodeType="tmRoot"/>
+        <p:cTn xmlns:p14="http://schemas.microsoft.com/office/powerpoint/2010/main" id="1" dur="indefinite" restart="never" nodeType="tmRoot"/>
       </p:par>
     </p:tnLst>
   </p:timing>
@@ -19410,13 +19434,13 @@
   <p:clrMapOvr>
     <a:masterClrMapping/>
   </p:clrMapOvr>
-  <p:transition spd="med">
+  <p:transition xmlns:p14="http://schemas.microsoft.com/office/powerpoint/2010/main" spd="med">
     <p:fade/>
   </p:transition>
   <p:timing>
     <p:tnLst>
       <p:par>
-        <p:cTn id="1" dur="indefinite" restart="never" nodeType="tmRoot"/>
+        <p:cTn xmlns:p14="http://schemas.microsoft.com/office/powerpoint/2010/main" id="1" dur="indefinite" restart="never" nodeType="tmRoot"/>
       </p:par>
     </p:tnLst>
   </p:timing>
@@ -19554,13 +19578,13 @@
   <p:clrMapOvr>
     <a:masterClrMapping/>
   </p:clrMapOvr>
-  <p:transition spd="med">
+  <p:transition xmlns:p14="http://schemas.microsoft.com/office/powerpoint/2010/main" spd="med">
     <p:fade/>
   </p:transition>
   <p:timing>
     <p:tnLst>
       <p:par>
-        <p:cTn id="1" dur="indefinite" restart="never" nodeType="tmRoot"/>
+        <p:cTn xmlns:p14="http://schemas.microsoft.com/office/powerpoint/2010/main" id="1" dur="indefinite" restart="never" nodeType="tmRoot"/>
       </p:par>
     </p:tnLst>
   </p:timing>
@@ -19606,17 +19630,10 @@
               <a:t>GE: </a:t>
             </a:r>
             <a:r>
-              <a:rPr lang="en-US" dirty="0"/>
-              <a:t>Upload the </a:t>
-            </a:r>
-            <a:r>
-              <a:rPr lang="en-US" dirty="0" smtClean="0"/>
-              <a:t>Profile </a:t>
-            </a:r>
-            <a:r>
-              <a:rPr lang="en-US" dirty="0"/>
-              <a:t>to Chef Compliance</a:t>
-            </a:r>
+              <a:rPr lang="en-US" dirty="0" smtClean="0"/>
+              <a:t>Scan Your Node</a:t>
+            </a:r>
+            <a:endParaRPr lang="en-US" dirty="0"/>
           </a:p>
         </p:txBody>
       </p:sp>
@@ -19735,13 +19752,13 @@
   <p:clrMapOvr>
     <a:masterClrMapping/>
   </p:clrMapOvr>
-  <p:transition spd="med">
+  <p:transition xmlns:p14="http://schemas.microsoft.com/office/powerpoint/2010/main" spd="med">
     <p:fade/>
   </p:transition>
   <p:timing>
     <p:tnLst>
       <p:par>
-        <p:cTn id="1" dur="indefinite" restart="never" nodeType="tmRoot"/>
+        <p:cTn xmlns:p14="http://schemas.microsoft.com/office/powerpoint/2010/main" id="1" dur="indefinite" restart="never" nodeType="tmRoot"/>
       </p:par>
     </p:tnLst>
   </p:timing>
@@ -19980,13 +19997,13 @@
   <p:clrMapOvr>
     <a:masterClrMapping/>
   </p:clrMapOvr>
-  <p:transition spd="med">
+  <p:transition xmlns:p14="http://schemas.microsoft.com/office/powerpoint/2010/main" spd="med">
     <p:fade/>
   </p:transition>
   <p:timing>
     <p:tnLst>
       <p:par>
-        <p:cTn id="1" dur="indefinite" restart="never" nodeType="tmRoot"/>
+        <p:cTn xmlns:p14="http://schemas.microsoft.com/office/powerpoint/2010/main" id="1" dur="indefinite" restart="never" nodeType="tmRoot"/>
       </p:par>
     </p:tnLst>
   </p:timing>
@@ -20127,13 +20144,13 @@
   <p:clrMapOvr>
     <a:masterClrMapping/>
   </p:clrMapOvr>
-  <p:transition spd="med">
+  <p:transition xmlns:p14="http://schemas.microsoft.com/office/powerpoint/2010/main" spd="med">
     <p:fade/>
   </p:transition>
   <p:timing>
     <p:tnLst>
       <p:par>
-        <p:cTn id="1" dur="indefinite" restart="never" nodeType="tmRoot"/>
+        <p:cTn xmlns:p14="http://schemas.microsoft.com/office/powerpoint/2010/main" id="1" dur="indefinite" restart="never" nodeType="tmRoot"/>
       </p:par>
     </p:tnLst>
   </p:timing>
@@ -20265,13 +20282,13 @@
   <p:clrMapOvr>
     <a:masterClrMapping/>
   </p:clrMapOvr>
-  <p:transition spd="med">
+  <p:transition xmlns:p14="http://schemas.microsoft.com/office/powerpoint/2010/main" spd="med">
     <p:fade/>
   </p:transition>
   <p:timing>
     <p:tnLst>
       <p:par>
-        <p:cTn id="1" dur="indefinite" restart="never" nodeType="tmRoot"/>
+        <p:cTn xmlns:p14="http://schemas.microsoft.com/office/powerpoint/2010/main" id="1" dur="indefinite" restart="never" nodeType="tmRoot"/>
       </p:par>
     </p:tnLst>
   </p:timing>
@@ -20455,13 +20472,13 @@
   <p:clrMapOvr>
     <a:masterClrMapping/>
   </p:clrMapOvr>
-  <p:transition spd="med">
+  <p:transition xmlns:p14="http://schemas.microsoft.com/office/powerpoint/2010/main" spd="med">
     <p:fade/>
   </p:transition>
   <p:timing>
     <p:tnLst>
       <p:par>
-        <p:cTn id="1" dur="indefinite" restart="never" nodeType="tmRoot"/>
+        <p:cTn xmlns:p14="http://schemas.microsoft.com/office/powerpoint/2010/main" id="1" dur="indefinite" restart="never" nodeType="tmRoot"/>
       </p:par>
     </p:tnLst>
   </p:timing>
@@ -20574,7 +20591,7 @@
   <p:clrMapOvr>
     <a:masterClrMapping/>
   </p:clrMapOvr>
-  <p:transition spd="med">
+  <p:transition xmlns:p14="http://schemas.microsoft.com/office/powerpoint/2010/main" spd="med">
     <p:fade/>
   </p:transition>
 </p:sld>
@@ -20661,7 +20678,7 @@
           </a:ln>
           <a:effectLst/>
           <a:extLst>
-            <a:ext uri="{91240B29-F687-4F45-9708-019B960494DF}">
+            <a:ext uri="{91240B29-F687-4f45-9708-019B960494DF}">
               <a14:hiddenLine xmlns:a14="http://schemas.microsoft.com/office/drawing/2010/main" w="9525">
                 <a:solidFill>
                   <a:schemeClr val="tx1"/>
@@ -20671,7 +20688,7 @@
                 <a:tailEnd/>
               </a14:hiddenLine>
             </a:ext>
-            <a:ext uri="{AF507438-7753-43E0-B8FC-AC1667EBCBE1}">
+            <a:ext uri="{AF507438-7753-43e0-B8FC-AC1667EBCBE1}">
               <a14:hiddenEffects xmlns:a14="http://schemas.microsoft.com/office/drawing/2010/main">
                 <a:effectLst>
                   <a:outerShdw dist="35921" dir="2700000" algn="ctr" rotWithShape="0">
@@ -21599,7 +21616,7 @@
   <p:clrMapOvr>
     <a:masterClrMapping/>
   </p:clrMapOvr>
-  <p:transition spd="med">
+  <p:transition xmlns:p14="http://schemas.microsoft.com/office/powerpoint/2010/main" spd="med">
     <p:fade/>
   </p:transition>
 </p:sld>
@@ -21789,13 +21806,13 @@
   <p:clrMapOvr>
     <a:masterClrMapping/>
   </p:clrMapOvr>
-  <p:transition spd="med">
+  <p:transition xmlns:p14="http://schemas.microsoft.com/office/powerpoint/2010/main" spd="med">
     <p:fade/>
   </p:transition>
   <p:timing>
     <p:tnLst>
       <p:par>
-        <p:cTn id="1" dur="indefinite" restart="never" nodeType="tmRoot"/>
+        <p:cTn xmlns:p14="http://schemas.microsoft.com/office/powerpoint/2010/main" id="1" dur="indefinite" restart="never" nodeType="tmRoot"/>
       </p:par>
     </p:tnLst>
   </p:timing>
@@ -21995,13 +22012,13 @@
   <p:clrMapOvr>
     <a:masterClrMapping/>
   </p:clrMapOvr>
-  <p:transition spd="med">
+  <p:transition xmlns:p14="http://schemas.microsoft.com/office/powerpoint/2010/main" spd="med">
     <p:fade/>
   </p:transition>
   <p:timing>
     <p:tnLst>
       <p:par>
-        <p:cTn id="1" dur="indefinite" restart="never" nodeType="tmRoot"/>
+        <p:cTn xmlns:p14="http://schemas.microsoft.com/office/powerpoint/2010/main" id="1" dur="indefinite" restart="never" nodeType="tmRoot"/>
       </p:par>
     </p:tnLst>
   </p:timing>
@@ -22182,7 +22199,7 @@
   <p:clrMapOvr>
     <a:masterClrMapping/>
   </p:clrMapOvr>
-  <p:transition spd="med">
+  <p:transition xmlns:p14="http://schemas.microsoft.com/office/powerpoint/2010/main" spd="med">
     <p:fade/>
   </p:transition>
 </p:sld>
@@ -22376,7 +22393,7 @@
   <p:clrMapOvr>
     <a:masterClrMapping/>
   </p:clrMapOvr>
-  <p:transition spd="med">
+  <p:transition xmlns:p14="http://schemas.microsoft.com/office/powerpoint/2010/main" spd="med">
     <p:fade/>
   </p:transition>
 </p:sld>
@@ -22417,12 +22434,12 @@
           <a:lstStyle/>
           <a:p>
             <a:r>
-              <a:rPr lang="en-US" dirty="0" err="1" smtClean="0"/>
+              <a:rPr lang="en-US" dirty="0" err="1"/>
               <a:t>InSpec</a:t>
             </a:r>
             <a:r>
-              <a:rPr lang="en-US" dirty="0" smtClean="0"/>
-              <a:t> CLI</a:t>
+              <a:rPr lang="en-US" dirty="0"/>
+              <a:t> Command Line Interface</a:t>
             </a:r>
             <a:endParaRPr lang="en-US" dirty="0"/>
           </a:p>
@@ -22449,24 +22466,16 @@
           <a:lstStyle/>
           <a:p>
             <a:r>
-              <a:rPr lang="en-US" dirty="0" smtClean="0"/>
+              <a:rPr lang="en-US" dirty="0"/>
               <a:t>In this section we will use the </a:t>
             </a:r>
             <a:r>
-              <a:rPr lang="en-US" dirty="0" err="1" smtClean="0"/>
+              <a:rPr lang="en-US" dirty="0" err="1"/>
               <a:t>InSpec</a:t>
             </a:r>
             <a:r>
-              <a:rPr lang="en-US" dirty="0" smtClean="0"/>
-              <a:t> CLI to run </a:t>
-            </a:r>
-            <a:r>
               <a:rPr lang="en-US" dirty="0"/>
-              <a:t>audit tests against </a:t>
-            </a:r>
-            <a:r>
-              <a:rPr lang="en-US" dirty="0" smtClean="0"/>
-              <a:t>targets.</a:t>
+              <a:t> command line interface (CLI) to run audit tests against targets.</a:t>
             </a:r>
           </a:p>
           <a:p>
@@ -22626,7 +22635,7 @@
   <p:clrMapOvr>
     <a:masterClrMapping/>
   </p:clrMapOvr>
-  <p:transition spd="med">
+  <p:transition xmlns:p14="http://schemas.microsoft.com/office/powerpoint/2010/main" spd="med">
     <p:fade/>
   </p:transition>
 </p:sld>
@@ -22774,13 +22783,13 @@
   <p:clrMapOvr>
     <a:masterClrMapping/>
   </p:clrMapOvr>
-  <p:transition spd="med">
+  <p:transition xmlns:p14="http://schemas.microsoft.com/office/powerpoint/2010/main" spd="med">
     <p:fade/>
   </p:transition>
   <p:timing>
     <p:tnLst>
       <p:par>
-        <p:cTn id="1" dur="indefinite" restart="never" nodeType="tmRoot"/>
+        <p:cTn xmlns:p14="http://schemas.microsoft.com/office/powerpoint/2010/main" id="1" dur="indefinite" restart="never" nodeType="tmRoot"/>
       </p:par>
     </p:tnLst>
   </p:timing>
@@ -22917,14 +22926,14 @@
           <a:lstStyle/>
           <a:p>
             <a:r>
-              <a:rPr lang="en-US" dirty="0"/>
+              <a:rPr lang="en-US" sz="4700" dirty="0"/>
               <a:t>GE: </a:t>
             </a:r>
             <a:r>
-              <a:rPr lang="en-US" dirty="0" smtClean="0"/>
-              <a:t>Create a Directory for your Profile</a:t>
-            </a:r>
-            <a:endParaRPr lang="en-US" dirty="0"/>
+              <a:rPr lang="en-US" sz="4700" dirty="0"/>
+              <a:t>Create and change to a directory for your profile</a:t>
+            </a:r>
+            <a:endParaRPr lang="en-US" sz="4700" dirty="0"/>
           </a:p>
         </p:txBody>
       </p:sp>
@@ -22938,13 +22947,13 @@
   <p:clrMapOvr>
     <a:masterClrMapping/>
   </p:clrMapOvr>
-  <p:transition spd="med">
+  <p:transition xmlns:p14="http://schemas.microsoft.com/office/powerpoint/2010/main" spd="med">
     <p:fade/>
   </p:transition>
   <p:timing>
     <p:tnLst>
       <p:par>
-        <p:cTn id="1" dur="indefinite" restart="never" nodeType="tmRoot"/>
+        <p:cTn xmlns:p14="http://schemas.microsoft.com/office/powerpoint/2010/main" id="1" dur="indefinite" restart="never" nodeType="tmRoot"/>
       </p:par>
     </p:tnLst>
   </p:timing>
@@ -23178,13 +23187,13 @@
   <p:clrMapOvr>
     <a:masterClrMapping/>
   </p:clrMapOvr>
-  <p:transition spd="med">
+  <p:transition xmlns:p14="http://schemas.microsoft.com/office/powerpoint/2010/main" spd="med">
     <p:fade/>
   </p:transition>
   <p:timing>
     <p:tnLst>
       <p:par>
-        <p:cTn id="1" dur="indefinite" restart="never" nodeType="tmRoot"/>
+        <p:cTn xmlns:p14="http://schemas.microsoft.com/office/powerpoint/2010/main" id="1" dur="indefinite" restart="never" nodeType="tmRoot"/>
       </p:par>
     </p:tnLst>
   </p:timing>
@@ -23292,7 +23301,15 @@
           <a:p>
             <a:r>
               <a:rPr lang="en-US" dirty="0" smtClean="0"/>
-              <a:t>GE: Creating a metadata.rb </a:t>
+              <a:t>GE: </a:t>
+            </a:r>
+            <a:r>
+              <a:rPr lang="en-US" dirty="0" smtClean="0"/>
+              <a:t>Create </a:t>
+            </a:r>
+            <a:r>
+              <a:rPr lang="en-US" dirty="0" smtClean="0"/>
+              <a:t>a metadata.rb </a:t>
             </a:r>
             <a:r>
               <a:rPr lang="en-US" dirty="0"/>
@@ -23316,7 +23333,7 @@
   <p:clrMapOvr>
     <a:masterClrMapping/>
   </p:clrMapOvr>
-  <p:transition spd="med">
+  <p:transition xmlns:p14="http://schemas.microsoft.com/office/powerpoint/2010/main" spd="med">
     <p:fade/>
   </p:transition>
 </p:sld>
@@ -23590,7 +23607,7 @@
   <p:clrMapOvr>
     <a:masterClrMapping/>
   </p:clrMapOvr>
-  <p:transition spd="med">
+  <p:transition xmlns:p14="http://schemas.microsoft.com/office/powerpoint/2010/main" spd="med">
     <p:fade/>
   </p:transition>
 </p:sld>
@@ -23972,7 +23989,7 @@
   <a:extraClrSchemeLst/>
   <a:extLst>
     <a:ext uri="{05A4C25C-085E-4340-85A3-A5531E510DB2}">
-      <thm15:themeFamily xmlns:thm15="http://schemas.microsoft.com/office/thememl/2012/main" name="Chef-TemplateComps_v09-16x9-Light.potx" id="{078CEFDB-FA7A-4E36-9964-13EF367585CB}" vid="{8B87B0F3-7308-43D5-8388-E1B49EA02652}"/>
+      <thm15:themeFamily xmlns:thm15="http://schemas.microsoft.com/office/thememl/2012/main" xmlns="" name="Chef-TemplateComps_v09-16x9-Light.potx" id="{078CEFDB-FA7A-4E36-9964-13EF367585CB}" vid="{8B87B0F3-7308-43D5-8388-E1B49EA02652}"/>
     </a:ext>
   </a:extLst>
 </a:theme>
@@ -24354,7 +24371,7 @@
   <a:extraClrSchemeLst/>
   <a:extLst>
     <a:ext uri="{05A4C25C-085E-4340-85A3-A5531E510DB2}">
-      <thm15:themeFamily xmlns:thm15="http://schemas.microsoft.com/office/thememl/2012/main" name="Chef-TemplateComps_v09-16x9-Light.potx" id="{078CEFDB-FA7A-4E36-9964-13EF367585CB}" vid="{8B87B0F3-7308-43D5-8388-E1B49EA02652}"/>
+      <thm15:themeFamily xmlns:thm15="http://schemas.microsoft.com/office/thememl/2012/main" xmlns="" name="Chef-TemplateComps_v09-16x9-Light.potx" id="{078CEFDB-FA7A-4E36-9964-13EF367585CB}" vid="{8B87B0F3-7308-43D5-8388-E1B49EA02652}"/>
     </a:ext>
   </a:extLst>
 </a:theme>

</xml_diff>

<commit_message>
Add a missing period to the first objective
</commit_message>
<xml_diff>
--- a/05-creating-custom-profiles.pptx
+++ b/05-creating-custom-profiles.pptx
@@ -176,7 +176,7 @@
   </p:defaultTextStyle>
   <p:extLst>
     <p:ext uri="{EFAFB233-063F-42B5-8137-9DF3F51BA10A}">
-      <p15:sldGuideLst xmlns:p15="http://schemas.microsoft.com/office/powerpoint/2012/main" xmlns="">
+      <p15:sldGuideLst xmlns="" xmlns:p15="http://schemas.microsoft.com/office/powerpoint/2012/main">
         <p15:guide id="1" orient="horz" pos="894">
           <p15:clr>
             <a:srgbClr val="A4A3A4"/>
@@ -190,7 +190,7 @@
       </p15:sldGuideLst>
     </p:ext>
     <p:ext uri="{2D200454-40CA-4A62-9FC3-DE9A4176ACB9}">
-      <p15:notesGuideLst xmlns:p15="http://schemas.microsoft.com/office/powerpoint/2012/main" xmlns=""/>
+      <p15:notesGuideLst xmlns="" xmlns:p15="http://schemas.microsoft.com/office/powerpoint/2012/main"/>
     </p:ext>
   </p:extLst>
 </p:presentation>
@@ -307,7 +307,7 @@
               <a:pPr>
                 <a:defRPr/>
               </a:pPr>
-              <a:t>1/19/16</a:t>
+              <a:t>1/20/16</a:t>
             </a:fld>
             <a:endParaRPr lang="en-US" dirty="0"/>
           </a:p>
@@ -490,7 +490,7 @@
               <a:pPr>
                 <a:defRPr/>
               </a:pPr>
-              <a:t>1/19/16</a:t>
+              <a:t>1/20/16</a:t>
             </a:fld>
             <a:endParaRPr lang="en-US" dirty="0"/>
           </a:p>
@@ -18356,7 +18356,6 @@
               <a:rPr lang="en-US" dirty="0" smtClean="0"/>
               <a:t>.	</a:t>
             </a:r>
-            <a:endParaRPr lang="en-US" dirty="0" smtClean="0"/>
           </a:p>
           <a:p>
             <a:pPr marL="342900" indent="-342900">
@@ -18616,13 +18615,18 @@
               <a:t>Write a custom </a:t>
             </a:r>
             <a:r>
-              <a:rPr lang="en-US" dirty="0"/>
+              <a:rPr lang="en-US"/>
               <a:t>c</a:t>
             </a:r>
             <a:r>
-              <a:rPr lang="en-US" dirty="0" smtClean="0"/>
-              <a:t>ompliance profile</a:t>
-            </a:r>
+              <a:rPr lang="en-US" smtClean="0"/>
+              <a:t>ompliance </a:t>
+            </a:r>
+            <a:r>
+              <a:rPr lang="en-US" smtClean="0"/>
+              <a:t>profile.</a:t>
+            </a:r>
+            <a:endParaRPr lang="en-US" dirty="0" smtClean="0"/>
           </a:p>
           <a:p>
             <a:pPr marL="457200" indent="-457200">
@@ -19627,11 +19631,7 @@
           <a:p>
             <a:r>
               <a:rPr lang="en-US" dirty="0" smtClean="0"/>
-              <a:t>GE: </a:t>
-            </a:r>
-            <a:r>
-              <a:rPr lang="en-US" dirty="0" smtClean="0"/>
-              <a:t>Scan Your Node</a:t>
+              <a:t>GE: Scan Your Node</a:t>
             </a:r>
             <a:endParaRPr lang="en-US" dirty="0"/>
           </a:p>
@@ -22441,7 +22441,6 @@
               <a:rPr lang="en-US" dirty="0"/>
               <a:t> Command Line Interface</a:t>
             </a:r>
-            <a:endParaRPr lang="en-US" dirty="0"/>
           </a:p>
         </p:txBody>
       </p:sp>
@@ -22927,13 +22926,8 @@
           <a:p>
             <a:r>
               <a:rPr lang="en-US" sz="4700" dirty="0"/>
-              <a:t>GE: </a:t>
-            </a:r>
-            <a:r>
-              <a:rPr lang="en-US" sz="4700" dirty="0"/>
-              <a:t>Create and change to a directory for your profile</a:t>
-            </a:r>
-            <a:endParaRPr lang="en-US" sz="4700" dirty="0"/>
+              <a:t>GE: Create and change to a directory for your profile</a:t>
+            </a:r>
           </a:p>
         </p:txBody>
       </p:sp>
@@ -23301,15 +23295,7 @@
           <a:p>
             <a:r>
               <a:rPr lang="en-US" dirty="0" smtClean="0"/>
-              <a:t>GE: </a:t>
-            </a:r>
-            <a:r>
-              <a:rPr lang="en-US" dirty="0" smtClean="0"/>
-              <a:t>Create </a:t>
-            </a:r>
-            <a:r>
-              <a:rPr lang="en-US" dirty="0" smtClean="0"/>
-              <a:t>a metadata.rb </a:t>
+              <a:t>GE: Create a metadata.rb </a:t>
             </a:r>
             <a:r>
               <a:rPr lang="en-US" dirty="0"/>
@@ -23989,7 +23975,7 @@
   <a:extraClrSchemeLst/>
   <a:extLst>
     <a:ext uri="{05A4C25C-085E-4340-85A3-A5531E510DB2}">
-      <thm15:themeFamily xmlns:thm15="http://schemas.microsoft.com/office/thememl/2012/main" xmlns="" name="Chef-TemplateComps_v09-16x9-Light.potx" id="{078CEFDB-FA7A-4E36-9964-13EF367585CB}" vid="{8B87B0F3-7308-43D5-8388-E1B49EA02652}"/>
+      <thm15:themeFamily xmlns="" xmlns:thm15="http://schemas.microsoft.com/office/thememl/2012/main" name="Chef-TemplateComps_v09-16x9-Light.potx" id="{078CEFDB-FA7A-4E36-9964-13EF367585CB}" vid="{8B87B0F3-7308-43D5-8388-E1B49EA02652}"/>
     </a:ext>
   </a:extLst>
 </a:theme>
@@ -24371,7 +24357,7 @@
   <a:extraClrSchemeLst/>
   <a:extLst>
     <a:ext uri="{05A4C25C-085E-4340-85A3-A5531E510DB2}">
-      <thm15:themeFamily xmlns:thm15="http://schemas.microsoft.com/office/thememl/2012/main" xmlns="" name="Chef-TemplateComps_v09-16x9-Light.potx" id="{078CEFDB-FA7A-4E36-9964-13EF367585CB}" vid="{8B87B0F3-7308-43D5-8388-E1B49EA02652}"/>
+      <thm15:themeFamily xmlns="" xmlns:thm15="http://schemas.microsoft.com/office/thememl/2012/main" name="Chef-TemplateComps_v09-16x9-Light.potx" id="{078CEFDB-FA7A-4E36-9964-13EF367585CB}" vid="{8B87B0F3-7308-43D5-8388-E1B49EA02652}"/>
     </a:ext>
   </a:extLst>
 </a:theme>

</xml_diff>

<commit_message>
Update formating in section 05
* Fix spacing of the tmp.rb code
* Use a backtick (`), not a quote (') when wrapping '`inspec check`'
</commit_message>
<xml_diff>
--- a/05-creating-custom-profiles.pptx
+++ b/05-creating-custom-profiles.pptx
@@ -176,7 +176,7 @@
   </p:defaultTextStyle>
   <p:extLst>
     <p:ext uri="{EFAFB233-063F-42B5-8137-9DF3F51BA10A}">
-      <p15:sldGuideLst xmlns="" xmlns:p15="http://schemas.microsoft.com/office/powerpoint/2012/main">
+      <p15:sldGuideLst xmlns:p15="http://schemas.microsoft.com/office/powerpoint/2012/main" xmlns="">
         <p15:guide id="1" orient="horz" pos="894">
           <p15:clr>
             <a:srgbClr val="A4A3A4"/>
@@ -190,7 +190,7 @@
       </p15:sldGuideLst>
     </p:ext>
     <p:ext uri="{2D200454-40CA-4A62-9FC3-DE9A4176ACB9}">
-      <p15:notesGuideLst xmlns="" xmlns:p15="http://schemas.microsoft.com/office/powerpoint/2012/main"/>
+      <p15:notesGuideLst xmlns:p15="http://schemas.microsoft.com/office/powerpoint/2012/main" xmlns=""/>
     </p:ext>
   </p:extLst>
 </p:presentation>
@@ -17599,10 +17599,12 @@
           <a:p>
             <a:r>
               <a:rPr lang="en-US" b="1" dirty="0"/>
-              <a:t>control "tmp-1.0" do</a:t>
-            </a:r>
-          </a:p>
-          <a:p>
+              <a:t>control "tmp-1.0" </a:t>
+            </a:r>
+            <a:r>
+              <a:rPr lang="en-US" b="1" dirty="0" smtClean="0"/>
+              <a:t>do</a:t>
+            </a:r>
             <a:endParaRPr lang="en-US" b="1" dirty="0"/>
           </a:p>
           <a:p>
@@ -17755,7 +17757,15 @@
           <a:p>
             <a:r>
               <a:rPr lang="en-US" b="1" dirty="0"/>
-              <a:t>  it { should </a:t>
+              <a:t> </a:t>
+            </a:r>
+            <a:r>
+              <a:rPr lang="en-US" b="1" dirty="0" smtClean="0"/>
+              <a:t>   </a:t>
+            </a:r>
+            <a:r>
+              <a:rPr lang="en-US" b="1" dirty="0"/>
+              <a:t>it { should </a:t>
             </a:r>
             <a:r>
               <a:rPr lang="en-US" b="1" dirty="0" err="1"/>
@@ -18204,8 +18214,16 @@
               <a:t>inspec</a:t>
             </a:r>
             <a:r>
-              <a:rPr lang="en-US" dirty="0" smtClean="0"/>
-              <a:t> exec' to Run Tests</a:t>
+              <a:rPr lang="en-US" smtClean="0"/>
+              <a:t> </a:t>
+            </a:r>
+            <a:r>
+              <a:rPr lang="en-US" smtClean="0"/>
+              <a:t>exec` </a:t>
+            </a:r>
+            <a:r>
+              <a:rPr lang="en-US" dirty="0" smtClean="0"/>
+              <a:t>to Run Tests</a:t>
             </a:r>
             <a:endParaRPr lang="en-US" dirty="0"/>
           </a:p>
@@ -18620,11 +18638,7 @@
             </a:r>
             <a:r>
               <a:rPr lang="en-US" smtClean="0"/>
-              <a:t>ompliance </a:t>
-            </a:r>
-            <a:r>
-              <a:rPr lang="en-US" smtClean="0"/>
-              <a:t>profile.</a:t>
+              <a:t>ompliance profile.</a:t>
             </a:r>
             <a:endParaRPr lang="en-US" dirty="0" smtClean="0"/>
           </a:p>
@@ -23975,7 +23989,7 @@
   <a:extraClrSchemeLst/>
   <a:extLst>
     <a:ext uri="{05A4C25C-085E-4340-85A3-A5531E510DB2}">
-      <thm15:themeFamily xmlns="" xmlns:thm15="http://schemas.microsoft.com/office/thememl/2012/main" name="Chef-TemplateComps_v09-16x9-Light.potx" id="{078CEFDB-FA7A-4E36-9964-13EF367585CB}" vid="{8B87B0F3-7308-43D5-8388-E1B49EA02652}"/>
+      <thm15:themeFamily xmlns:thm15="http://schemas.microsoft.com/office/thememl/2012/main" xmlns="" name="Chef-TemplateComps_v09-16x9-Light.potx" id="{078CEFDB-FA7A-4E36-9964-13EF367585CB}" vid="{8B87B0F3-7308-43D5-8388-E1B49EA02652}"/>
     </a:ext>
   </a:extLst>
 </a:theme>
@@ -24357,7 +24371,7 @@
   <a:extraClrSchemeLst/>
   <a:extLst>
     <a:ext uri="{05A4C25C-085E-4340-85A3-A5531E510DB2}">
-      <thm15:themeFamily xmlns="" xmlns:thm15="http://schemas.microsoft.com/office/thememl/2012/main" name="Chef-TemplateComps_v09-16x9-Light.potx" id="{078CEFDB-FA7A-4E36-9964-13EF367585CB}" vid="{8B87B0F3-7308-43D5-8388-E1B49EA02652}"/>
+      <thm15:themeFamily xmlns:thm15="http://schemas.microsoft.com/office/thememl/2012/main" xmlns="" name="Chef-TemplateComps_v09-16x9-Light.potx" id="{078CEFDB-FA7A-4E36-9964-13EF367585CB}" vid="{8B87B0F3-7308-43D5-8388-E1B49EA02652}"/>
     </a:ext>
   </a:extLst>
 </a:theme>

</xml_diff>

<commit_message>
05-creating-custom-profiles added speaker notes to 5-23
</commit_message>
<xml_diff>
--- a/05-creating-custom-profiles.pptx
+++ b/05-creating-custom-profiles.pptx
@@ -307,7 +307,7 @@
               <a:pPr>
                 <a:defRPr/>
               </a:pPr>
-              <a:t>2016-02-03</a:t>
+              <a:t>2016-02-04</a:t>
             </a:fld>
             <a:endParaRPr lang="en-US" dirty="0"/>
           </a:p>
@@ -490,7 +490,7 @@
               <a:pPr>
                 <a:defRPr/>
               </a:pPr>
-              <a:t>2016-02-03</a:t>
+              <a:t>2016-02-04</a:t>
             </a:fld>
             <a:endParaRPr lang="en-US" dirty="0"/>
           </a:p>
@@ -4494,12 +4494,154 @@
           </a:bodyPr>
           <a:lstStyle/>
           <a:p>
+            <a:pPr marL="0" marR="0" indent="0" algn="l" defTabSz="1217613" rtl="0" eaLnBrk="1" fontAlgn="base" latinLnBrk="0" hangingPunct="1">
+              <a:lnSpc>
+                <a:spcPct val="90000"/>
+              </a:lnSpc>
+              <a:spcBef>
+                <a:spcPct val="30000"/>
+              </a:spcBef>
+              <a:spcAft>
+                <a:spcPts val="450"/>
+              </a:spcAft>
+              <a:buClrTx/>
+              <a:buSzTx/>
+              <a:buFontTx/>
+              <a:buNone/>
+              <a:tabLst/>
+              <a:defRPr/>
+            </a:pPr>
+            <a:r>
+              <a:rPr lang="en-US" dirty="0" smtClean="0">
+                <a:effectLst/>
+              </a:rPr>
+              <a:t>The Compliance Server checks uploaded profiles using the same `</a:t>
+            </a:r>
+            <a:r>
+              <a:rPr lang="en-US" dirty="0" err="1" smtClean="0">
+                <a:effectLst/>
+              </a:rPr>
+              <a:t>inspec</a:t>
+            </a:r>
+            <a:r>
+              <a:rPr lang="en-US" dirty="0" smtClean="0">
+                <a:effectLst/>
+              </a:rPr>
+              <a:t> check ` mechanism that we used when running </a:t>
+            </a:r>
+            <a:r>
+              <a:rPr lang="en-US" dirty="0" err="1" smtClean="0">
+                <a:effectLst/>
+              </a:rPr>
+              <a:t>inspec</a:t>
+            </a:r>
+            <a:r>
+              <a:rPr lang="en-US" dirty="0" smtClean="0">
+                <a:effectLst/>
+              </a:rPr>
+              <a:t> via the CLI.</a:t>
+            </a:r>
             <a:endParaRPr lang="en-US" dirty="0" smtClean="0"/>
           </a:p>
           <a:p>
             <a:endParaRPr lang="en-US" dirty="0" smtClean="0"/>
           </a:p>
           <a:p>
+            <a:r>
+              <a:rPr lang="en-US" dirty="0" smtClean="0"/>
+              <a:t>Note that if you upload a </a:t>
+            </a:r>
+            <a:r>
+              <a:rPr lang="en-US" sz="1200" b="0" i="0" kern="1200" dirty="0" smtClean="0">
+                <a:solidFill>
+                  <a:schemeClr val="tx1"/>
+                </a:solidFill>
+                <a:effectLst/>
+                <a:latin typeface="Arial" panose="020B0604020202020204" pitchFamily="34" charset="0"/>
+                <a:ea typeface="ＭＳ Ｐゴシック" charset="0"/>
+                <a:cs typeface="Arial" panose="020B0604020202020204" pitchFamily="34" charset="0"/>
+              </a:rPr>
+              <a:t>Compliance profile to Compliance Server and the profile is written incorrectly, we currently don't get an error in the web</a:t>
+            </a:r>
+            <a:r>
+              <a:rPr lang="en-US" sz="1200" b="0" i="0" kern="1200" baseline="0" dirty="0" smtClean="0">
+                <a:solidFill>
+                  <a:schemeClr val="tx1"/>
+                </a:solidFill>
+                <a:effectLst/>
+                <a:latin typeface="Arial" panose="020B0604020202020204" pitchFamily="34" charset="0"/>
+                <a:ea typeface="ＭＳ Ｐゴシック" charset="0"/>
+                <a:cs typeface="Arial" panose="020B0604020202020204" pitchFamily="34" charset="0"/>
+              </a:rPr>
+              <a:t> UI. We would only be notified by the error when the new profile doesn't appear in the list of Compliance profiles or </a:t>
+            </a:r>
+            <a:r>
+              <a:rPr lang="en-US" sz="1200" b="0" i="0" kern="1200" dirty="0" smtClean="0">
+                <a:solidFill>
+                  <a:schemeClr val="tx1"/>
+                </a:solidFill>
+                <a:effectLst/>
+                <a:latin typeface="Arial" panose="020B0604020202020204" pitchFamily="34" charset="0"/>
+                <a:ea typeface="ＭＳ Ｐゴシック" charset="0"/>
+                <a:cs typeface="Arial" panose="020B0604020202020204" pitchFamily="34" charset="0"/>
+              </a:rPr>
+              <a:t>by looking at the logs. </a:t>
+            </a:r>
+          </a:p>
+          <a:p>
+            <a:endParaRPr lang="en-US" sz="1200" b="0" i="0" kern="1200" dirty="0" smtClean="0">
+              <a:solidFill>
+                <a:schemeClr val="tx1"/>
+              </a:solidFill>
+              <a:effectLst/>
+              <a:latin typeface="Arial" panose="020B0604020202020204" pitchFamily="34" charset="0"/>
+              <a:ea typeface="ＭＳ Ｐゴシック" charset="0"/>
+              <a:cs typeface="Arial" panose="020B0604020202020204" pitchFamily="34" charset="0"/>
+            </a:endParaRPr>
+          </a:p>
+          <a:p>
+            <a:r>
+              <a:rPr lang="en-US" sz="1200" b="0" i="0" kern="1200" dirty="0" smtClean="0">
+                <a:solidFill>
+                  <a:schemeClr val="tx1"/>
+                </a:solidFill>
+                <a:effectLst/>
+                <a:latin typeface="Arial" panose="020B0604020202020204" pitchFamily="34" charset="0"/>
+                <a:ea typeface="ＭＳ Ｐゴシック" charset="0"/>
+                <a:cs typeface="Arial" panose="020B0604020202020204" pitchFamily="34" charset="0"/>
+              </a:rPr>
+              <a:t>In the near future, </a:t>
+            </a:r>
+            <a:r>
+              <a:rPr lang="en-US" dirty="0" smtClean="0">
+                <a:effectLst/>
+              </a:rPr>
+              <a:t>the status of</a:t>
+            </a:r>
+            <a:r>
+              <a:rPr lang="en-US" baseline="0" dirty="0" smtClean="0">
+                <a:effectLst/>
+              </a:rPr>
+              <a:t> </a:t>
+            </a:r>
+            <a:r>
+              <a:rPr lang="en-US" dirty="0" smtClean="0">
+                <a:effectLst/>
+              </a:rPr>
+              <a:t>the</a:t>
+            </a:r>
+            <a:r>
+              <a:rPr lang="en-US" baseline="0" dirty="0" smtClean="0">
+                <a:effectLst/>
+              </a:rPr>
+              <a:t> uploaded profile will </a:t>
+            </a:r>
+            <a:r>
+              <a:rPr lang="en-US" dirty="0" smtClean="0">
+                <a:effectLst/>
+              </a:rPr>
+              <a:t>reported by the web UI. </a:t>
+            </a:r>
             <a:endParaRPr lang="en-US" dirty="0" smtClean="0"/>
           </a:p>
         </p:txBody>
@@ -7311,11 +7453,7 @@
             </a:r>
             <a:r>
               <a:rPr lang="en-US" dirty="0" smtClean="0"/>
-              <a:t>/profile_01, </a:t>
-            </a:r>
-            <a:r>
-              <a:rPr lang="en-US" dirty="0" smtClean="0"/>
-              <a:t>let's create a metadata.rb by using the `touch`</a:t>
+              <a:t>/profile_01, let's create a metadata.rb by using the `touch`</a:t>
             </a:r>
             <a:r>
               <a:rPr lang="en-US" baseline="0" dirty="0" smtClean="0"/>
@@ -7362,11 +7500,7 @@
             </a:pPr>
             <a:r>
               <a:rPr lang="en-US" dirty="0" smtClean="0"/>
-              <a:t>$ `touch metadata.rb</a:t>
-            </a:r>
-            <a:r>
-              <a:rPr lang="en-US" dirty="0" smtClean="0"/>
-              <a:t>`    or you</a:t>
+              <a:t>$ `touch metadata.rb`    or you</a:t>
             </a:r>
             <a:r>
               <a:rPr lang="en-US" baseline="0" dirty="0" smtClean="0"/>
@@ -9139,14 +9273,14 @@
           </a:ln>
           <a:extLst>
             <a:ext uri="{909E8E84-426E-40dd-AFC4-6F175D3DCCD1}">
-              <a14:hiddenFill xmlns="" xmlns:a14="http://schemas.microsoft.com/office/drawing/2010/main">
+              <a14:hiddenFill xmlns:a14="http://schemas.microsoft.com/office/drawing/2010/main" xmlns="">
                 <a:solidFill>
                   <a:srgbClr val="FFFFFF"/>
                 </a:solidFill>
               </a14:hiddenFill>
             </a:ext>
             <a:ext uri="{91240B29-F687-4f45-9708-019B960494DF}">
-              <a14:hiddenLine xmlns="" xmlns:a14="http://schemas.microsoft.com/office/drawing/2010/main" w="9525">
+              <a14:hiddenLine xmlns:a14="http://schemas.microsoft.com/office/drawing/2010/main" xmlns="" w="9525">
                 <a:solidFill>
                   <a:srgbClr val="000000"/>
                 </a:solidFill>
@@ -9294,14 +9428,14 @@
           </a:ln>
           <a:extLst>
             <a:ext uri="{909E8E84-426E-40dd-AFC4-6F175D3DCCD1}">
-              <a14:hiddenFill xmlns="" xmlns:a14="http://schemas.microsoft.com/office/drawing/2010/main">
+              <a14:hiddenFill xmlns:a14="http://schemas.microsoft.com/office/drawing/2010/main" xmlns="">
                 <a:solidFill>
                   <a:srgbClr val="FFFFFF"/>
                 </a:solidFill>
               </a14:hiddenFill>
             </a:ext>
             <a:ext uri="{91240B29-F687-4f45-9708-019B960494DF}">
-              <a14:hiddenLine xmlns="" xmlns:a14="http://schemas.microsoft.com/office/drawing/2010/main" w="9525">
+              <a14:hiddenLine xmlns:a14="http://schemas.microsoft.com/office/drawing/2010/main" xmlns="" w="9525">
                 <a:solidFill>
                   <a:srgbClr val="000000"/>
                 </a:solidFill>
@@ -9792,14 +9926,14 @@
           </a:ln>
           <a:extLst>
             <a:ext uri="{909E8E84-426E-40dd-AFC4-6F175D3DCCD1}">
-              <a14:hiddenFill xmlns="" xmlns:a14="http://schemas.microsoft.com/office/drawing/2010/main">
+              <a14:hiddenFill xmlns:a14="http://schemas.microsoft.com/office/drawing/2010/main" xmlns="">
                 <a:solidFill>
                   <a:srgbClr val="FFFFFF"/>
                 </a:solidFill>
               </a14:hiddenFill>
             </a:ext>
             <a:ext uri="{91240B29-F687-4f45-9708-019B960494DF}">
-              <a14:hiddenLine xmlns="" xmlns:a14="http://schemas.microsoft.com/office/drawing/2010/main" w="9525">
+              <a14:hiddenLine xmlns:a14="http://schemas.microsoft.com/office/drawing/2010/main" xmlns="" w="9525">
                 <a:solidFill>
                   <a:srgbClr val="000000"/>
                 </a:solidFill>
@@ -10325,14 +10459,14 @@
           </a:ln>
           <a:extLst>
             <a:ext uri="{909E8E84-426E-40dd-AFC4-6F175D3DCCD1}">
-              <a14:hiddenFill xmlns="" xmlns:a14="http://schemas.microsoft.com/office/drawing/2010/main">
+              <a14:hiddenFill xmlns:a14="http://schemas.microsoft.com/office/drawing/2010/main" xmlns="">
                 <a:solidFill>
                   <a:srgbClr val="FFFFFF"/>
                 </a:solidFill>
               </a14:hiddenFill>
             </a:ext>
             <a:ext uri="{91240B29-F687-4f45-9708-019B960494DF}">
-              <a14:hiddenLine xmlns="" xmlns:a14="http://schemas.microsoft.com/office/drawing/2010/main" w="9525">
+              <a14:hiddenLine xmlns:a14="http://schemas.microsoft.com/office/drawing/2010/main" xmlns="" w="9525">
                 <a:solidFill>
                   <a:srgbClr val="000000"/>
                 </a:solidFill>
@@ -11956,14 +12090,14 @@
           </a:ln>
           <a:extLst>
             <a:ext uri="{909E8E84-426E-40dd-AFC4-6F175D3DCCD1}">
-              <a14:hiddenFill xmlns="" xmlns:a14="http://schemas.microsoft.com/office/drawing/2010/main">
+              <a14:hiddenFill xmlns:a14="http://schemas.microsoft.com/office/drawing/2010/main" xmlns="">
                 <a:solidFill>
                   <a:srgbClr val="FFFFFF"/>
                 </a:solidFill>
               </a14:hiddenFill>
             </a:ext>
             <a:ext uri="{91240B29-F687-4f45-9708-019B960494DF}">
-              <a14:hiddenLine xmlns="" xmlns:a14="http://schemas.microsoft.com/office/drawing/2010/main" w="9525">
+              <a14:hiddenLine xmlns:a14="http://schemas.microsoft.com/office/drawing/2010/main" xmlns="" w="9525">
                 <a:solidFill>
                   <a:srgbClr val="000000"/>
                 </a:solidFill>
@@ -13317,14 +13451,14 @@
           </a:ln>
           <a:extLst>
             <a:ext uri="{909E8E84-426E-40dd-AFC4-6F175D3DCCD1}">
-              <a14:hiddenFill xmlns="" xmlns:a14="http://schemas.microsoft.com/office/drawing/2010/main">
+              <a14:hiddenFill xmlns:a14="http://schemas.microsoft.com/office/drawing/2010/main" xmlns="">
                 <a:solidFill>
                   <a:srgbClr val="FFFFFF"/>
                 </a:solidFill>
               </a14:hiddenFill>
             </a:ext>
             <a:ext uri="{91240B29-F687-4f45-9708-019B960494DF}">
-              <a14:hiddenLine xmlns="" xmlns:a14="http://schemas.microsoft.com/office/drawing/2010/main" w="9525">
+              <a14:hiddenLine xmlns:a14="http://schemas.microsoft.com/office/drawing/2010/main" xmlns="" w="9525">
                 <a:solidFill>
                   <a:srgbClr val="000000"/>
                 </a:solidFill>
@@ -13830,14 +13964,14 @@
           </a:ln>
           <a:extLst>
             <a:ext uri="{909E8E84-426E-40dd-AFC4-6F175D3DCCD1}">
-              <a14:hiddenFill xmlns="" xmlns:a14="http://schemas.microsoft.com/office/drawing/2010/main">
+              <a14:hiddenFill xmlns:a14="http://schemas.microsoft.com/office/drawing/2010/main" xmlns="">
                 <a:solidFill>
                   <a:srgbClr val="FFFFFF"/>
                 </a:solidFill>
               </a14:hiddenFill>
             </a:ext>
             <a:ext uri="{91240B29-F687-4f45-9708-019B960494DF}">
-              <a14:hiddenLine xmlns="" xmlns:a14="http://schemas.microsoft.com/office/drawing/2010/main" w="9525">
+              <a14:hiddenLine xmlns:a14="http://schemas.microsoft.com/office/drawing/2010/main" xmlns="" w="9525">
                 <a:solidFill>
                   <a:srgbClr val="000000"/>
                 </a:solidFill>
@@ -14404,14 +14538,14 @@
           </a:ln>
           <a:extLst>
             <a:ext uri="{909E8E84-426E-40dd-AFC4-6F175D3DCCD1}">
-              <a14:hiddenFill xmlns="" xmlns:a14="http://schemas.microsoft.com/office/drawing/2010/main">
+              <a14:hiddenFill xmlns:a14="http://schemas.microsoft.com/office/drawing/2010/main" xmlns="">
                 <a:solidFill>
                   <a:srgbClr val="FFFFFF"/>
                 </a:solidFill>
               </a14:hiddenFill>
             </a:ext>
             <a:ext uri="{91240B29-F687-4f45-9708-019B960494DF}">
-              <a14:hiddenLine xmlns="" xmlns:a14="http://schemas.microsoft.com/office/drawing/2010/main" w="9525">
+              <a14:hiddenLine xmlns:a14="http://schemas.microsoft.com/office/drawing/2010/main" xmlns="" w="9525">
                 <a:solidFill>
                   <a:srgbClr val="000000"/>
                 </a:solidFill>
@@ -15351,14 +15485,14 @@
           </a:ln>
           <a:extLst>
             <a:ext uri="{909E8E84-426E-40dd-AFC4-6F175D3DCCD1}">
-              <a14:hiddenFill xmlns="" xmlns:a14="http://schemas.microsoft.com/office/drawing/2010/main">
+              <a14:hiddenFill xmlns:a14="http://schemas.microsoft.com/office/drawing/2010/main" xmlns="">
                 <a:solidFill>
                   <a:srgbClr val="FFFFFF"/>
                 </a:solidFill>
               </a14:hiddenFill>
             </a:ext>
             <a:ext uri="{91240B29-F687-4f45-9708-019B960494DF}">
-              <a14:hiddenLine xmlns="" xmlns:a14="http://schemas.microsoft.com/office/drawing/2010/main" w="9525">
+              <a14:hiddenLine xmlns:a14="http://schemas.microsoft.com/office/drawing/2010/main" xmlns="" w="9525">
                 <a:solidFill>
                   <a:srgbClr val="000000"/>
                 </a:solidFill>
@@ -16111,14 +16245,14 @@
           </a:ln>
           <a:extLst>
             <a:ext uri="{909E8E84-426E-40dd-AFC4-6F175D3DCCD1}">
-              <a14:hiddenFill xmlns="" xmlns:a14="http://schemas.microsoft.com/office/drawing/2010/main">
+              <a14:hiddenFill xmlns:a14="http://schemas.microsoft.com/office/drawing/2010/main" xmlns="">
                 <a:solidFill>
                   <a:srgbClr val="FFFFFF"/>
                 </a:solidFill>
               </a14:hiddenFill>
             </a:ext>
             <a:ext uri="{91240B29-F687-4f45-9708-019B960494DF}">
-              <a14:hiddenLine xmlns="" xmlns:a14="http://schemas.microsoft.com/office/drawing/2010/main" w="9525">
+              <a14:hiddenLine xmlns:a14="http://schemas.microsoft.com/office/drawing/2010/main" xmlns="" w="9525">
                 <a:solidFill>
                   <a:srgbClr val="000000"/>
                 </a:solidFill>
@@ -21179,7 +21313,7 @@
           <a:effectLst/>
           <a:extLst>
             <a:ext uri="{91240B29-F687-4f45-9708-019B960494DF}">
-              <a14:hiddenLine xmlns="" xmlns:a14="http://schemas.microsoft.com/office/drawing/2010/main" w="9525">
+              <a14:hiddenLine xmlns:a14="http://schemas.microsoft.com/office/drawing/2010/main" xmlns="" w="9525">
                 <a:solidFill>
                   <a:schemeClr val="tx1"/>
                 </a:solidFill>
@@ -21189,7 +21323,7 @@
               </a14:hiddenLine>
             </a:ext>
             <a:ext uri="{AF507438-7753-43e0-B8FC-AC1667EBCBE1}">
-              <a14:hiddenEffects xmlns="" xmlns:a14="http://schemas.microsoft.com/office/drawing/2010/main">
+              <a14:hiddenEffects xmlns:a14="http://schemas.microsoft.com/office/drawing/2010/main" xmlns="">
                 <a:effectLst>
                   <a:outerShdw dist="35921" dir="2700000" algn="ctr" rotWithShape="0">
                     <a:schemeClr val="bg2"/>
@@ -23820,7 +23954,6 @@
               <a:rPr lang="en-US" dirty="0" smtClean="0"/>
               <a:t>/profile_01/metadata.rb</a:t>
             </a:r>
-            <a:endParaRPr lang="en-US" dirty="0" smtClean="0"/>
           </a:p>
           <a:p>
             <a:r>
@@ -25499,6 +25632,61 @@
 </file>
 
 <file path=customXml/item1.xml><?xml version="1.0" encoding="utf-8"?>
+<?mso-contentType ?>
+<FormTemplates xmlns="http://schemas.microsoft.com/sharepoint/v3/contenttype/forms">
+  <Display>DocumentLibraryForm</Display>
+  <Edit>DocumentLibraryForm</Edit>
+  <New>DocumentLibraryForm</New>
+</FormTemplates>
+</file>
+
+<file path=customXml/item2.xml><?xml version="1.0" encoding="utf-8"?>
+<?mso-contentType ?>
+<spe:Receivers xmlns:spe="http://schemas.microsoft.com/sharepoint/events">
+  <Receiver>
+    <Name>Document ID Generator</Name>
+    <Synchronization>Synchronous</Synchronization>
+    <Type>10001</Type>
+    <SequenceNumber>1000</SequenceNumber>
+    <Assembly>Microsoft.Office.DocumentManagement, Version=14.0.0.0, Culture=neutral, PublicKeyToken=71e9bce111e9429c</Assembly>
+    <Class>Microsoft.Office.DocumentManagement.Internal.DocIdHandler</Class>
+    <Data/>
+    <Filter/>
+  </Receiver>
+  <Receiver>
+    <Name>Document ID Generator</Name>
+    <Synchronization>Synchronous</Synchronization>
+    <Type>10002</Type>
+    <SequenceNumber>1001</SequenceNumber>
+    <Assembly>Microsoft.Office.DocumentManagement, Version=14.0.0.0, Culture=neutral, PublicKeyToken=71e9bce111e9429c</Assembly>
+    <Class>Microsoft.Office.DocumentManagement.Internal.DocIdHandler</Class>
+    <Data/>
+    <Filter/>
+  </Receiver>
+  <Receiver>
+    <Name>Document ID Generator</Name>
+    <Synchronization>Synchronous</Synchronization>
+    <Type>10004</Type>
+    <SequenceNumber>1002</SequenceNumber>
+    <Assembly>Microsoft.Office.DocumentManagement, Version=14.0.0.0, Culture=neutral, PublicKeyToken=71e9bce111e9429c</Assembly>
+    <Class>Microsoft.Office.DocumentManagement.Internal.DocIdHandler</Class>
+    <Data/>
+    <Filter/>
+  </Receiver>
+  <Receiver>
+    <Name>Document ID Generator</Name>
+    <Synchronization>Synchronous</Synchronization>
+    <Type>10006</Type>
+    <SequenceNumber>1003</SequenceNumber>
+    <Assembly>Microsoft.Office.DocumentManagement, Version=14.0.0.0, Culture=neutral, PublicKeyToken=71e9bce111e9429c</Assembly>
+    <Class>Microsoft.Office.DocumentManagement.Internal.DocIdHandler</Class>
+    <Data/>
+    <Filter/>
+  </Receiver>
+</spe:Receivers>
+</file>
+
+<file path=customXml/item3.xml><?xml version="1.0" encoding="utf-8"?>
 <ct:contentTypeSchema xmlns:ct="http://schemas.microsoft.com/office/2006/metadata/contentType" xmlns:ma="http://schemas.microsoft.com/office/2006/metadata/properties/metaAttributes" ct:_="" ma:_="" ma:contentTypeName="Document" ma:contentTypeID="0x0101000812F700BE7F874999720E88173FE491" ma:contentTypeVersion="0" ma:contentTypeDescription="Create a new document." ma:contentTypeScope="" ma:versionID="3f79f408e2ca720b7aba6e0e32464d0c">
   <xsd:schema xmlns:xsd="http://www.w3.org/2001/XMLSchema" xmlns:xs="http://www.w3.org/2001/XMLSchema" xmlns:p="http://schemas.microsoft.com/office/2006/metadata/properties" xmlns:ns2="7bb5d761-a2ea-4873-95f7-7a6658fb3ef0" targetNamespace="http://schemas.microsoft.com/office/2006/metadata/properties" ma:root="true" ma:fieldsID="1e062cd38ba31e406bfc4340fbc7f87a" ns2:_="">
     <xsd:import namespace="7bb5d761-a2ea-4873-95f7-7a6658fb3ef0"/>
@@ -25643,61 +25831,6 @@
 </ct:contentTypeSchema>
 </file>
 
-<file path=customXml/item2.xml><?xml version="1.0" encoding="utf-8"?>
-<?mso-contentType ?>
-<spe:Receivers xmlns:spe="http://schemas.microsoft.com/sharepoint/events">
-  <Receiver>
-    <Name>Document ID Generator</Name>
-    <Synchronization>Synchronous</Synchronization>
-    <Type>10001</Type>
-    <SequenceNumber>1000</SequenceNumber>
-    <Assembly>Microsoft.Office.DocumentManagement, Version=14.0.0.0, Culture=neutral, PublicKeyToken=71e9bce111e9429c</Assembly>
-    <Class>Microsoft.Office.DocumentManagement.Internal.DocIdHandler</Class>
-    <Data/>
-    <Filter/>
-  </Receiver>
-  <Receiver>
-    <Name>Document ID Generator</Name>
-    <Synchronization>Synchronous</Synchronization>
-    <Type>10002</Type>
-    <SequenceNumber>1001</SequenceNumber>
-    <Assembly>Microsoft.Office.DocumentManagement, Version=14.0.0.0, Culture=neutral, PublicKeyToken=71e9bce111e9429c</Assembly>
-    <Class>Microsoft.Office.DocumentManagement.Internal.DocIdHandler</Class>
-    <Data/>
-    <Filter/>
-  </Receiver>
-  <Receiver>
-    <Name>Document ID Generator</Name>
-    <Synchronization>Synchronous</Synchronization>
-    <Type>10004</Type>
-    <SequenceNumber>1002</SequenceNumber>
-    <Assembly>Microsoft.Office.DocumentManagement, Version=14.0.0.0, Culture=neutral, PublicKeyToken=71e9bce111e9429c</Assembly>
-    <Class>Microsoft.Office.DocumentManagement.Internal.DocIdHandler</Class>
-    <Data/>
-    <Filter/>
-  </Receiver>
-  <Receiver>
-    <Name>Document ID Generator</Name>
-    <Synchronization>Synchronous</Synchronization>
-    <Type>10006</Type>
-    <SequenceNumber>1003</SequenceNumber>
-    <Assembly>Microsoft.Office.DocumentManagement, Version=14.0.0.0, Culture=neutral, PublicKeyToken=71e9bce111e9429c</Assembly>
-    <Class>Microsoft.Office.DocumentManagement.Internal.DocIdHandler</Class>
-    <Data/>
-    <Filter/>
-  </Receiver>
-</spe:Receivers>
-</file>
-
-<file path=customXml/item3.xml><?xml version="1.0" encoding="utf-8"?>
-<?mso-contentType ?>
-<FormTemplates xmlns="http://schemas.microsoft.com/sharepoint/v3/contenttype/forms">
-  <Display>DocumentLibraryForm</Display>
-  <Edit>DocumentLibraryForm</Edit>
-  <New>DocumentLibraryForm</New>
-</FormTemplates>
-</file>
-
 <file path=customXml/item4.xml><?xml version="1.0" encoding="utf-8"?>
 <p:properties xmlns:p="http://schemas.microsoft.com/office/2006/metadata/properties" xmlns:xsi="http://www.w3.org/2001/XMLSchema-instance" xmlns:pc="http://schemas.microsoft.com/office/infopath/2007/PartnerControls">
   <documentManagement>
@@ -25711,6 +25844,22 @@
 </file>
 
 <file path=customXml/itemProps1.xml><?xml version="1.0" encoding="utf-8"?>
+<ds:datastoreItem xmlns:ds="http://schemas.openxmlformats.org/officeDocument/2006/customXml" ds:itemID="{5CDEB364-43EC-4510-9881-539C2A3FCE9E}">
+  <ds:schemaRefs>
+    <ds:schemaRef ds:uri="http://schemas.microsoft.com/sharepoint/v3/contenttype/forms"/>
+  </ds:schemaRefs>
+</ds:datastoreItem>
+</file>
+
+<file path=customXml/itemProps2.xml><?xml version="1.0" encoding="utf-8"?>
+<ds:datastoreItem xmlns:ds="http://schemas.openxmlformats.org/officeDocument/2006/customXml" ds:itemID="{B13EBC30-FE27-4C6A-B723-23FC2188F7DC}">
+  <ds:schemaRefs>
+    <ds:schemaRef ds:uri="http://schemas.microsoft.com/sharepoint/events"/>
+  </ds:schemaRefs>
+</ds:datastoreItem>
+</file>
+
+<file path=customXml/itemProps3.xml><?xml version="1.0" encoding="utf-8"?>
 <ds:datastoreItem xmlns:ds="http://schemas.openxmlformats.org/officeDocument/2006/customXml" ds:itemID="{164479E5-0B02-49AC-B79E-EC1D6164DDD3}">
   <ds:schemaRefs>
     <ds:schemaRef ds:uri="http://schemas.microsoft.com/office/2006/metadata/contentType"/>
@@ -25724,22 +25873,6 @@
     <ds:schemaRef ds:uri="http://purl.org/dc/elements/1.1/"/>
     <ds:schemaRef ds:uri="http://purl.org/dc/terms/"/>
     <ds:schemaRef ds:uri="http://schemas.microsoft.com/internal/obd"/>
-  </ds:schemaRefs>
-</ds:datastoreItem>
-</file>
-
-<file path=customXml/itemProps2.xml><?xml version="1.0" encoding="utf-8"?>
-<ds:datastoreItem xmlns:ds="http://schemas.openxmlformats.org/officeDocument/2006/customXml" ds:itemID="{B13EBC30-FE27-4C6A-B723-23FC2188F7DC}">
-  <ds:schemaRefs>
-    <ds:schemaRef ds:uri="http://schemas.microsoft.com/sharepoint/events"/>
-  </ds:schemaRefs>
-</ds:datastoreItem>
-</file>
-
-<file path=customXml/itemProps3.xml><?xml version="1.0" encoding="utf-8"?>
-<ds:datastoreItem xmlns:ds="http://schemas.openxmlformats.org/officeDocument/2006/customXml" ds:itemID="{5CDEB364-43EC-4510-9881-539C2A3FCE9E}">
-  <ds:schemaRefs>
-    <ds:schemaRef ds:uri="http://schemas.microsoft.com/sharepoint/v3/contenttype/forms"/>
   </ds:schemaRefs>
 </ds:datastoreItem>
 </file>

</xml_diff>

<commit_message>
added InSpec Directory Structure Roadmap slide
</commit_message>
<xml_diff>
--- a/05-creating-custom-profiles.pptx
+++ b/05-creating-custom-profiles.pptx
@@ -5656,8 +5656,41 @@
                 <a:ea typeface="ＭＳ Ｐゴシック" charset="0"/>
                 <a:cs typeface="Arial" panose="020B0604020202020204" pitchFamily="34" charset="0"/>
               </a:rPr>
-              <a:t> an awesome message to tell. Here is a link to where the image on the right was derived: https://github.com/chef/inspec/blob/1f325b1cfd02391fab14a996693a034da37aadd8/docs/profiles.rst</a:t>
-            </a:r>
+              <a:t> an awesome message to tell. Here is a link to where the image on the right was derived: https</a:t>
+            </a:r>
+            <a:r>
+              <a:rPr lang="en-US" sz="1200" b="0" i="0" kern="1200" baseline="0" smtClean="0">
+                <a:solidFill>
+                  <a:schemeClr val="tx1"/>
+                </a:solidFill>
+                <a:effectLst/>
+                <a:latin typeface="Arial" panose="020B0604020202020204" pitchFamily="34" charset="0"/>
+                <a:ea typeface="ＭＳ Ｐゴシック" charset="0"/>
+                <a:cs typeface="Arial" panose="020B0604020202020204" pitchFamily="34" charset="0"/>
+              </a:rPr>
+              <a:t>://</a:t>
+            </a:r>
+            <a:r>
+              <a:rPr lang="en-US" sz="1200" b="0" i="0" kern="1200" baseline="0" smtClean="0">
+                <a:solidFill>
+                  <a:schemeClr val="tx1"/>
+                </a:solidFill>
+                <a:effectLst/>
+                <a:latin typeface="Arial" panose="020B0604020202020204" pitchFamily="34" charset="0"/>
+                <a:ea typeface="ＭＳ Ｐゴシック" charset="0"/>
+                <a:cs typeface="Arial" panose="020B0604020202020204" pitchFamily="34" charset="0"/>
+              </a:rPr>
+              <a:t>github.com/chef/inspec/blob/1f325b1cfd02391fab14a996693a034da37aadd8/docs/profiles.rst </a:t>
+            </a:r>
+            <a:endParaRPr lang="en-US" sz="1200" b="0" i="0" kern="1200" baseline="0" dirty="0" smtClean="0">
+              <a:solidFill>
+                <a:schemeClr val="tx1"/>
+              </a:solidFill>
+              <a:effectLst/>
+              <a:latin typeface="Arial" panose="020B0604020202020204" pitchFamily="34" charset="0"/>
+              <a:ea typeface="ＭＳ Ｐゴシック" charset="0"/>
+              <a:cs typeface="Arial" panose="020B0604020202020204" pitchFamily="34" charset="0"/>
+            </a:endParaRPr>
           </a:p>
           <a:p>
             <a:endParaRPr lang="en-US" sz="1200" b="0" i="0" kern="1200" baseline="0" dirty="0" smtClean="0">
@@ -9406,14 +9439,14 @@
           </a:ln>
           <a:extLst>
             <a:ext uri="{909E8E84-426E-40dd-AFC4-6F175D3DCCD1}">
-              <a14:hiddenFill xmlns:a14="http://schemas.microsoft.com/office/drawing/2010/main" xmlns="">
+              <a14:hiddenFill xmlns="" xmlns:a14="http://schemas.microsoft.com/office/drawing/2010/main">
                 <a:solidFill>
                   <a:srgbClr val="FFFFFF"/>
                 </a:solidFill>
               </a14:hiddenFill>
             </a:ext>
             <a:ext uri="{91240B29-F687-4f45-9708-019B960494DF}">
-              <a14:hiddenLine xmlns:a14="http://schemas.microsoft.com/office/drawing/2010/main" xmlns="" w="9525">
+              <a14:hiddenLine xmlns="" xmlns:a14="http://schemas.microsoft.com/office/drawing/2010/main" w="9525">
                 <a:solidFill>
                   <a:srgbClr val="000000"/>
                 </a:solidFill>
@@ -9561,14 +9594,14 @@
           </a:ln>
           <a:extLst>
             <a:ext uri="{909E8E84-426E-40dd-AFC4-6F175D3DCCD1}">
-              <a14:hiddenFill xmlns:a14="http://schemas.microsoft.com/office/drawing/2010/main" xmlns="">
+              <a14:hiddenFill xmlns="" xmlns:a14="http://schemas.microsoft.com/office/drawing/2010/main">
                 <a:solidFill>
                   <a:srgbClr val="FFFFFF"/>
                 </a:solidFill>
               </a14:hiddenFill>
             </a:ext>
             <a:ext uri="{91240B29-F687-4f45-9708-019B960494DF}">
-              <a14:hiddenLine xmlns:a14="http://schemas.microsoft.com/office/drawing/2010/main" xmlns="" w="9525">
+              <a14:hiddenLine xmlns="" xmlns:a14="http://schemas.microsoft.com/office/drawing/2010/main" w="9525">
                 <a:solidFill>
                   <a:srgbClr val="000000"/>
                 </a:solidFill>
@@ -10059,14 +10092,14 @@
           </a:ln>
           <a:extLst>
             <a:ext uri="{909E8E84-426E-40dd-AFC4-6F175D3DCCD1}">
-              <a14:hiddenFill xmlns:a14="http://schemas.microsoft.com/office/drawing/2010/main" xmlns="">
+              <a14:hiddenFill xmlns="" xmlns:a14="http://schemas.microsoft.com/office/drawing/2010/main">
                 <a:solidFill>
                   <a:srgbClr val="FFFFFF"/>
                 </a:solidFill>
               </a14:hiddenFill>
             </a:ext>
             <a:ext uri="{91240B29-F687-4f45-9708-019B960494DF}">
-              <a14:hiddenLine xmlns:a14="http://schemas.microsoft.com/office/drawing/2010/main" xmlns="" w="9525">
+              <a14:hiddenLine xmlns="" xmlns:a14="http://schemas.microsoft.com/office/drawing/2010/main" w="9525">
                 <a:solidFill>
                   <a:srgbClr val="000000"/>
                 </a:solidFill>
@@ -10592,14 +10625,14 @@
           </a:ln>
           <a:extLst>
             <a:ext uri="{909E8E84-426E-40dd-AFC4-6F175D3DCCD1}">
-              <a14:hiddenFill xmlns:a14="http://schemas.microsoft.com/office/drawing/2010/main" xmlns="">
+              <a14:hiddenFill xmlns="" xmlns:a14="http://schemas.microsoft.com/office/drawing/2010/main">
                 <a:solidFill>
                   <a:srgbClr val="FFFFFF"/>
                 </a:solidFill>
               </a14:hiddenFill>
             </a:ext>
             <a:ext uri="{91240B29-F687-4f45-9708-019B960494DF}">
-              <a14:hiddenLine xmlns:a14="http://schemas.microsoft.com/office/drawing/2010/main" xmlns="" w="9525">
+              <a14:hiddenLine xmlns="" xmlns:a14="http://schemas.microsoft.com/office/drawing/2010/main" w="9525">
                 <a:solidFill>
                   <a:srgbClr val="000000"/>
                 </a:solidFill>
@@ -12223,14 +12256,14 @@
           </a:ln>
           <a:extLst>
             <a:ext uri="{909E8E84-426E-40dd-AFC4-6F175D3DCCD1}">
-              <a14:hiddenFill xmlns:a14="http://schemas.microsoft.com/office/drawing/2010/main" xmlns="">
+              <a14:hiddenFill xmlns="" xmlns:a14="http://schemas.microsoft.com/office/drawing/2010/main">
                 <a:solidFill>
                   <a:srgbClr val="FFFFFF"/>
                 </a:solidFill>
               </a14:hiddenFill>
             </a:ext>
             <a:ext uri="{91240B29-F687-4f45-9708-019B960494DF}">
-              <a14:hiddenLine xmlns:a14="http://schemas.microsoft.com/office/drawing/2010/main" xmlns="" w="9525">
+              <a14:hiddenLine xmlns="" xmlns:a14="http://schemas.microsoft.com/office/drawing/2010/main" w="9525">
                 <a:solidFill>
                   <a:srgbClr val="000000"/>
                 </a:solidFill>
@@ -13584,14 +13617,14 @@
           </a:ln>
           <a:extLst>
             <a:ext uri="{909E8E84-426E-40dd-AFC4-6F175D3DCCD1}">
-              <a14:hiddenFill xmlns:a14="http://schemas.microsoft.com/office/drawing/2010/main" xmlns="">
+              <a14:hiddenFill xmlns="" xmlns:a14="http://schemas.microsoft.com/office/drawing/2010/main">
                 <a:solidFill>
                   <a:srgbClr val="FFFFFF"/>
                 </a:solidFill>
               </a14:hiddenFill>
             </a:ext>
             <a:ext uri="{91240B29-F687-4f45-9708-019B960494DF}">
-              <a14:hiddenLine xmlns:a14="http://schemas.microsoft.com/office/drawing/2010/main" xmlns="" w="9525">
+              <a14:hiddenLine xmlns="" xmlns:a14="http://schemas.microsoft.com/office/drawing/2010/main" w="9525">
                 <a:solidFill>
                   <a:srgbClr val="000000"/>
                 </a:solidFill>
@@ -14097,14 +14130,14 @@
           </a:ln>
           <a:extLst>
             <a:ext uri="{909E8E84-426E-40dd-AFC4-6F175D3DCCD1}">
-              <a14:hiddenFill xmlns:a14="http://schemas.microsoft.com/office/drawing/2010/main" xmlns="">
+              <a14:hiddenFill xmlns="" xmlns:a14="http://schemas.microsoft.com/office/drawing/2010/main">
                 <a:solidFill>
                   <a:srgbClr val="FFFFFF"/>
                 </a:solidFill>
               </a14:hiddenFill>
             </a:ext>
             <a:ext uri="{91240B29-F687-4f45-9708-019B960494DF}">
-              <a14:hiddenLine xmlns:a14="http://schemas.microsoft.com/office/drawing/2010/main" xmlns="" w="9525">
+              <a14:hiddenLine xmlns="" xmlns:a14="http://schemas.microsoft.com/office/drawing/2010/main" w="9525">
                 <a:solidFill>
                   <a:srgbClr val="000000"/>
                 </a:solidFill>
@@ -14671,14 +14704,14 @@
           </a:ln>
           <a:extLst>
             <a:ext uri="{909E8E84-426E-40dd-AFC4-6F175D3DCCD1}">
-              <a14:hiddenFill xmlns:a14="http://schemas.microsoft.com/office/drawing/2010/main" xmlns="">
+              <a14:hiddenFill xmlns="" xmlns:a14="http://schemas.microsoft.com/office/drawing/2010/main">
                 <a:solidFill>
                   <a:srgbClr val="FFFFFF"/>
                 </a:solidFill>
               </a14:hiddenFill>
             </a:ext>
             <a:ext uri="{91240B29-F687-4f45-9708-019B960494DF}">
-              <a14:hiddenLine xmlns:a14="http://schemas.microsoft.com/office/drawing/2010/main" xmlns="" w="9525">
+              <a14:hiddenLine xmlns="" xmlns:a14="http://schemas.microsoft.com/office/drawing/2010/main" w="9525">
                 <a:solidFill>
                   <a:srgbClr val="000000"/>
                 </a:solidFill>
@@ -15618,14 +15651,14 @@
           </a:ln>
           <a:extLst>
             <a:ext uri="{909E8E84-426E-40dd-AFC4-6F175D3DCCD1}">
-              <a14:hiddenFill xmlns:a14="http://schemas.microsoft.com/office/drawing/2010/main" xmlns="">
+              <a14:hiddenFill xmlns="" xmlns:a14="http://schemas.microsoft.com/office/drawing/2010/main">
                 <a:solidFill>
                   <a:srgbClr val="FFFFFF"/>
                 </a:solidFill>
               </a14:hiddenFill>
             </a:ext>
             <a:ext uri="{91240B29-F687-4f45-9708-019B960494DF}">
-              <a14:hiddenLine xmlns:a14="http://schemas.microsoft.com/office/drawing/2010/main" xmlns="" w="9525">
+              <a14:hiddenLine xmlns="" xmlns:a14="http://schemas.microsoft.com/office/drawing/2010/main" w="9525">
                 <a:solidFill>
                   <a:srgbClr val="000000"/>
                 </a:solidFill>
@@ -16378,14 +16411,14 @@
           </a:ln>
           <a:extLst>
             <a:ext uri="{909E8E84-426E-40dd-AFC4-6F175D3DCCD1}">
-              <a14:hiddenFill xmlns:a14="http://schemas.microsoft.com/office/drawing/2010/main" xmlns="">
+              <a14:hiddenFill xmlns="" xmlns:a14="http://schemas.microsoft.com/office/drawing/2010/main">
                 <a:solidFill>
                   <a:srgbClr val="FFFFFF"/>
                 </a:solidFill>
               </a14:hiddenFill>
             </a:ext>
             <a:ext uri="{91240B29-F687-4f45-9708-019B960494DF}">
-              <a14:hiddenLine xmlns:a14="http://schemas.microsoft.com/office/drawing/2010/main" xmlns="" w="9525">
+              <a14:hiddenLine xmlns="" xmlns:a14="http://schemas.microsoft.com/office/drawing/2010/main" w="9525">
                 <a:solidFill>
                   <a:srgbClr val="000000"/>
                 </a:solidFill>
@@ -17689,11 +17722,7 @@
           <a:p>
             <a:r>
               <a:rPr lang="en-US" dirty="0"/>
-              <a:t>As you write controls, InSpec </a:t>
-            </a:r>
-            <a:r>
-              <a:rPr lang="en-US" dirty="0"/>
-              <a:t>v0.9.2 expects </a:t>
+              <a:t>As you write controls, InSpec v0.9.2 expects </a:t>
             </a:r>
             <a:r>
               <a:rPr lang="en-US" dirty="0" smtClean="0"/>
@@ -21122,15 +21151,7 @@
           <a:p>
             <a:r>
               <a:rPr lang="en-US" dirty="0" smtClean="0"/>
-              <a:t>InSpec </a:t>
-            </a:r>
-            <a:r>
-              <a:rPr lang="en-US" dirty="0" smtClean="0"/>
-              <a:t>Directory Structure </a:t>
-            </a:r>
-            <a:r>
-              <a:rPr lang="en-US" dirty="0" smtClean="0"/>
-              <a:t>Roadmap</a:t>
+              <a:t>InSpec Directory Structure Roadmap</a:t>
             </a:r>
             <a:endParaRPr lang="en-US" dirty="0"/>
           </a:p>
@@ -21162,11 +21183,7 @@
             </a:r>
             <a:r>
               <a:rPr lang="en-US" dirty="0" smtClean="0"/>
-              <a:t>mentioned previously</a:t>
-            </a:r>
-            <a:r>
-              <a:rPr lang="en-US" dirty="0" smtClean="0"/>
-              <a:t>, </a:t>
+              <a:t>mentioned previously, </a:t>
             </a:r>
             <a:r>
               <a:rPr lang="en-US" dirty="0"/>
@@ -21174,11 +21191,7 @@
             </a:r>
             <a:r>
               <a:rPr lang="en-US" dirty="0" smtClean="0"/>
-              <a:t>v0.9.2 expects the </a:t>
-            </a:r>
-            <a:r>
-              <a:rPr lang="en-US" dirty="0" smtClean="0"/>
-              <a:t>directory structure on the left. In the future, the InSpec version that will ship with the next version of ChefDK </a:t>
+              <a:t>v0.9.2 expects the directory structure on the left. In the future, the InSpec version that will ship with the next version of ChefDK </a:t>
             </a:r>
             <a:r>
               <a:rPr lang="en-US" dirty="0"/>
@@ -21196,7 +21209,6 @@
               <a:rPr lang="en-US" dirty="0" smtClean="0"/>
               <a:t>right. </a:t>
             </a:r>
-            <a:endParaRPr lang="en-US" dirty="0" smtClean="0"/>
           </a:p>
           <a:p>
             <a:endParaRPr lang="en-US" dirty="0"/>
@@ -21698,7 +21710,7 @@
           <a:effectLst/>
           <a:extLst>
             <a:ext uri="{91240B29-F687-4f45-9708-019B960494DF}">
-              <a14:hiddenLine xmlns:a14="http://schemas.microsoft.com/office/drawing/2010/main" xmlns="" w="9525">
+              <a14:hiddenLine xmlns="" xmlns:a14="http://schemas.microsoft.com/office/drawing/2010/main" w="9525">
                 <a:solidFill>
                   <a:schemeClr val="tx1"/>
                 </a:solidFill>
@@ -21708,7 +21720,7 @@
               </a14:hiddenLine>
             </a:ext>
             <a:ext uri="{AF507438-7753-43e0-B8FC-AC1667EBCBE1}">
-              <a14:hiddenEffects xmlns:a14="http://schemas.microsoft.com/office/drawing/2010/main" xmlns="">
+              <a14:hiddenEffects xmlns="" xmlns:a14="http://schemas.microsoft.com/office/drawing/2010/main">
                 <a:effectLst>
                   <a:outerShdw dist="35921" dir="2700000" algn="ctr" rotWithShape="0">
                     <a:schemeClr val="bg2"/>
@@ -23228,6 +23240,13 @@
   <p:transition spd="med">
     <p:fade/>
   </p:transition>
+  <p:timing>
+    <p:tnLst>
+      <p:par>
+        <p:cTn id="1" dur="indefinite" restart="never" nodeType="tmRoot"/>
+      </p:par>
+    </p:tnLst>
+  </p:timing>
 </p:sld>
 </file>
 
@@ -23422,6 +23441,13 @@
   <p:transition spd="med">
     <p:fade/>
   </p:transition>
+  <p:timing>
+    <p:tnLst>
+      <p:par>
+        <p:cTn id="1" dur="indefinite" restart="never" nodeType="tmRoot"/>
+      </p:par>
+    </p:tnLst>
+  </p:timing>
 </p:sld>
 </file>
 
@@ -26017,61 +26043,6 @@
 </file>
 
 <file path=customXml/item1.xml><?xml version="1.0" encoding="utf-8"?>
-<?mso-contentType ?>
-<FormTemplates xmlns="http://schemas.microsoft.com/sharepoint/v3/contenttype/forms">
-  <Display>DocumentLibraryForm</Display>
-  <Edit>DocumentLibraryForm</Edit>
-  <New>DocumentLibraryForm</New>
-</FormTemplates>
-</file>
-
-<file path=customXml/item2.xml><?xml version="1.0" encoding="utf-8"?>
-<?mso-contentType ?>
-<spe:Receivers xmlns:spe="http://schemas.microsoft.com/sharepoint/events">
-  <Receiver>
-    <Name>Document ID Generator</Name>
-    <Synchronization>Synchronous</Synchronization>
-    <Type>10001</Type>
-    <SequenceNumber>1000</SequenceNumber>
-    <Assembly>Microsoft.Office.DocumentManagement, Version=14.0.0.0, Culture=neutral, PublicKeyToken=71e9bce111e9429c</Assembly>
-    <Class>Microsoft.Office.DocumentManagement.Internal.DocIdHandler</Class>
-    <Data/>
-    <Filter/>
-  </Receiver>
-  <Receiver>
-    <Name>Document ID Generator</Name>
-    <Synchronization>Synchronous</Synchronization>
-    <Type>10002</Type>
-    <SequenceNumber>1001</SequenceNumber>
-    <Assembly>Microsoft.Office.DocumentManagement, Version=14.0.0.0, Culture=neutral, PublicKeyToken=71e9bce111e9429c</Assembly>
-    <Class>Microsoft.Office.DocumentManagement.Internal.DocIdHandler</Class>
-    <Data/>
-    <Filter/>
-  </Receiver>
-  <Receiver>
-    <Name>Document ID Generator</Name>
-    <Synchronization>Synchronous</Synchronization>
-    <Type>10004</Type>
-    <SequenceNumber>1002</SequenceNumber>
-    <Assembly>Microsoft.Office.DocumentManagement, Version=14.0.0.0, Culture=neutral, PublicKeyToken=71e9bce111e9429c</Assembly>
-    <Class>Microsoft.Office.DocumentManagement.Internal.DocIdHandler</Class>
-    <Data/>
-    <Filter/>
-  </Receiver>
-  <Receiver>
-    <Name>Document ID Generator</Name>
-    <Synchronization>Synchronous</Synchronization>
-    <Type>10006</Type>
-    <SequenceNumber>1003</SequenceNumber>
-    <Assembly>Microsoft.Office.DocumentManagement, Version=14.0.0.0, Culture=neutral, PublicKeyToken=71e9bce111e9429c</Assembly>
-    <Class>Microsoft.Office.DocumentManagement.Internal.DocIdHandler</Class>
-    <Data/>
-    <Filter/>
-  </Receiver>
-</spe:Receivers>
-</file>
-
-<file path=customXml/item3.xml><?xml version="1.0" encoding="utf-8"?>
 <ct:contentTypeSchema xmlns:ct="http://schemas.microsoft.com/office/2006/metadata/contentType" xmlns:ma="http://schemas.microsoft.com/office/2006/metadata/properties/metaAttributes" ct:_="" ma:_="" ma:contentTypeName="Document" ma:contentTypeID="0x0101000812F700BE7F874999720E88173FE491" ma:contentTypeVersion="0" ma:contentTypeDescription="Create a new document." ma:contentTypeScope="" ma:versionID="3f79f408e2ca720b7aba6e0e32464d0c">
   <xsd:schema xmlns:xsd="http://www.w3.org/2001/XMLSchema" xmlns:xs="http://www.w3.org/2001/XMLSchema" xmlns:p="http://schemas.microsoft.com/office/2006/metadata/properties" xmlns:ns2="7bb5d761-a2ea-4873-95f7-7a6658fb3ef0" targetNamespace="http://schemas.microsoft.com/office/2006/metadata/properties" ma:root="true" ma:fieldsID="1e062cd38ba31e406bfc4340fbc7f87a" ns2:_="">
     <xsd:import namespace="7bb5d761-a2ea-4873-95f7-7a6658fb3ef0"/>
@@ -26216,6 +26187,61 @@
 </ct:contentTypeSchema>
 </file>
 
+<file path=customXml/item2.xml><?xml version="1.0" encoding="utf-8"?>
+<?mso-contentType ?>
+<spe:Receivers xmlns:spe="http://schemas.microsoft.com/sharepoint/events">
+  <Receiver>
+    <Name>Document ID Generator</Name>
+    <Synchronization>Synchronous</Synchronization>
+    <Type>10001</Type>
+    <SequenceNumber>1000</SequenceNumber>
+    <Assembly>Microsoft.Office.DocumentManagement, Version=14.0.0.0, Culture=neutral, PublicKeyToken=71e9bce111e9429c</Assembly>
+    <Class>Microsoft.Office.DocumentManagement.Internal.DocIdHandler</Class>
+    <Data/>
+    <Filter/>
+  </Receiver>
+  <Receiver>
+    <Name>Document ID Generator</Name>
+    <Synchronization>Synchronous</Synchronization>
+    <Type>10002</Type>
+    <SequenceNumber>1001</SequenceNumber>
+    <Assembly>Microsoft.Office.DocumentManagement, Version=14.0.0.0, Culture=neutral, PublicKeyToken=71e9bce111e9429c</Assembly>
+    <Class>Microsoft.Office.DocumentManagement.Internal.DocIdHandler</Class>
+    <Data/>
+    <Filter/>
+  </Receiver>
+  <Receiver>
+    <Name>Document ID Generator</Name>
+    <Synchronization>Synchronous</Synchronization>
+    <Type>10004</Type>
+    <SequenceNumber>1002</SequenceNumber>
+    <Assembly>Microsoft.Office.DocumentManagement, Version=14.0.0.0, Culture=neutral, PublicKeyToken=71e9bce111e9429c</Assembly>
+    <Class>Microsoft.Office.DocumentManagement.Internal.DocIdHandler</Class>
+    <Data/>
+    <Filter/>
+  </Receiver>
+  <Receiver>
+    <Name>Document ID Generator</Name>
+    <Synchronization>Synchronous</Synchronization>
+    <Type>10006</Type>
+    <SequenceNumber>1003</SequenceNumber>
+    <Assembly>Microsoft.Office.DocumentManagement, Version=14.0.0.0, Culture=neutral, PublicKeyToken=71e9bce111e9429c</Assembly>
+    <Class>Microsoft.Office.DocumentManagement.Internal.DocIdHandler</Class>
+    <Data/>
+    <Filter/>
+  </Receiver>
+</spe:Receivers>
+</file>
+
+<file path=customXml/item3.xml><?xml version="1.0" encoding="utf-8"?>
+<?mso-contentType ?>
+<FormTemplates xmlns="http://schemas.microsoft.com/sharepoint/v3/contenttype/forms">
+  <Display>DocumentLibraryForm</Display>
+  <Edit>DocumentLibraryForm</Edit>
+  <New>DocumentLibraryForm</New>
+</FormTemplates>
+</file>
+
 <file path=customXml/item4.xml><?xml version="1.0" encoding="utf-8"?>
 <p:properties xmlns:p="http://schemas.microsoft.com/office/2006/metadata/properties" xmlns:xsi="http://www.w3.org/2001/XMLSchema-instance" xmlns:pc="http://schemas.microsoft.com/office/infopath/2007/PartnerControls">
   <documentManagement>
@@ -26229,9 +26255,19 @@
 </file>
 
 <file path=customXml/itemProps1.xml><?xml version="1.0" encoding="utf-8"?>
-<ds:datastoreItem xmlns:ds="http://schemas.openxmlformats.org/officeDocument/2006/customXml" ds:itemID="{5CDEB364-43EC-4510-9881-539C2A3FCE9E}">
+<ds:datastoreItem xmlns:ds="http://schemas.openxmlformats.org/officeDocument/2006/customXml" ds:itemID="{164479E5-0B02-49AC-B79E-EC1D6164DDD3}">
   <ds:schemaRefs>
-    <ds:schemaRef ds:uri="http://schemas.microsoft.com/sharepoint/v3/contenttype/forms"/>
+    <ds:schemaRef ds:uri="http://schemas.microsoft.com/office/2006/metadata/contentType"/>
+    <ds:schemaRef ds:uri="http://schemas.microsoft.com/office/2006/metadata/properties/metaAttributes"/>
+    <ds:schemaRef ds:uri="http://www.w3.org/2001/XMLSchema"/>
+    <ds:schemaRef ds:uri="http://schemas.microsoft.com/office/2006/metadata/properties"/>
+    <ds:schemaRef ds:uri="7bb5d761-a2ea-4873-95f7-7a6658fb3ef0"/>
+    <ds:schemaRef ds:uri="http://schemas.microsoft.com/office/2006/documentManagement/types"/>
+    <ds:schemaRef ds:uri="http://schemas.microsoft.com/office/infopath/2007/PartnerControls"/>
+    <ds:schemaRef ds:uri="http://schemas.openxmlformats.org/package/2006/metadata/core-properties"/>
+    <ds:schemaRef ds:uri="http://purl.org/dc/elements/1.1/"/>
+    <ds:schemaRef ds:uri="http://purl.org/dc/terms/"/>
+    <ds:schemaRef ds:uri="http://schemas.microsoft.com/internal/obd"/>
   </ds:schemaRefs>
 </ds:datastoreItem>
 </file>
@@ -26245,19 +26281,9 @@
 </file>
 
 <file path=customXml/itemProps3.xml><?xml version="1.0" encoding="utf-8"?>
-<ds:datastoreItem xmlns:ds="http://schemas.openxmlformats.org/officeDocument/2006/customXml" ds:itemID="{164479E5-0B02-49AC-B79E-EC1D6164DDD3}">
+<ds:datastoreItem xmlns:ds="http://schemas.openxmlformats.org/officeDocument/2006/customXml" ds:itemID="{5CDEB364-43EC-4510-9881-539C2A3FCE9E}">
   <ds:schemaRefs>
-    <ds:schemaRef ds:uri="http://schemas.microsoft.com/office/2006/metadata/contentType"/>
-    <ds:schemaRef ds:uri="http://schemas.microsoft.com/office/2006/metadata/properties/metaAttributes"/>
-    <ds:schemaRef ds:uri="http://www.w3.org/2001/XMLSchema"/>
-    <ds:schemaRef ds:uri="http://schemas.microsoft.com/office/2006/metadata/properties"/>
-    <ds:schemaRef ds:uri="7bb5d761-a2ea-4873-95f7-7a6658fb3ef0"/>
-    <ds:schemaRef ds:uri="http://schemas.microsoft.com/office/2006/documentManagement/types"/>
-    <ds:schemaRef ds:uri="http://schemas.microsoft.com/office/infopath/2007/PartnerControls"/>
-    <ds:schemaRef ds:uri="http://schemas.openxmlformats.org/package/2006/metadata/core-properties"/>
-    <ds:schemaRef ds:uri="http://purl.org/dc/elements/1.1/"/>
-    <ds:schemaRef ds:uri="http://purl.org/dc/terms/"/>
-    <ds:schemaRef ds:uri="http://schemas.microsoft.com/internal/obd"/>
+    <ds:schemaRef ds:uri="http://schemas.microsoft.com/sharepoint/v3/contenttype/forms"/>
   </ds:schemaRefs>
 </ds:datastoreItem>
 </file>

</xml_diff>

<commit_message>
module 05 chagned 'Run the scp Command' slide color to differentiate local laptop from VM
</commit_message>
<xml_diff>
--- a/05-creating-custom-profiles.pptx
+++ b/05-creating-custom-profiles.pptx
@@ -5656,29 +5656,8 @@
                 <a:ea typeface="ＭＳ Ｐゴシック" charset="0"/>
                 <a:cs typeface="Arial" panose="020B0604020202020204" pitchFamily="34" charset="0"/>
               </a:rPr>
-              <a:t> an awesome message to tell. Here is a link to where the image on the right was derived: https</a:t>
-            </a:r>
-            <a:r>
-              <a:rPr lang="en-US" sz="1200" b="0" i="0" kern="1200" baseline="0" smtClean="0">
-                <a:solidFill>
-                  <a:schemeClr val="tx1"/>
-                </a:solidFill>
-                <a:effectLst/>
-                <a:latin typeface="Arial" panose="020B0604020202020204" pitchFamily="34" charset="0"/>
-                <a:ea typeface="ＭＳ Ｐゴシック" charset="0"/>
-                <a:cs typeface="Arial" panose="020B0604020202020204" pitchFamily="34" charset="0"/>
-              </a:rPr>
-              <a:t>://github.com/chef/inspec/blob/1f325b1cfd02391fab14a996693a034da37aadd8/docs/profiles.rst </a:t>
-            </a:r>
-            <a:endParaRPr lang="en-US" sz="1200" b="0" i="0" kern="1200" baseline="0" dirty="0" smtClean="0">
-              <a:solidFill>
-                <a:schemeClr val="tx1"/>
-              </a:solidFill>
-              <a:effectLst/>
-              <a:latin typeface="Arial" panose="020B0604020202020204" pitchFamily="34" charset="0"/>
-              <a:ea typeface="ＭＳ Ｐゴシック" charset="0"/>
-              <a:cs typeface="Arial" panose="020B0604020202020204" pitchFamily="34" charset="0"/>
-            </a:endParaRPr>
+              <a:t> an awesome message to tell. Here is a link to where the image on the right was derived: https://github.com/chef/inspec/blob/1f325b1cfd02391fab14a996693a034da37aadd8/docs/profiles.rst </a:t>
+            </a:r>
           </a:p>
           <a:p>
             <a:endParaRPr lang="en-US" sz="1200" b="0" i="0" kern="1200" baseline="0" dirty="0" smtClean="0">
@@ -5836,11 +5815,7 @@
           <a:p>
             <a:r>
               <a:rPr lang="en-US" dirty="0" smtClean="0"/>
-              <a:t>TBD: now do lab for windows too</a:t>
-            </a:r>
-            <a:r>
-              <a:rPr lang="en-US" dirty="0" smtClean="0"/>
-              <a:t>. Also add </a:t>
+              <a:t>TBD: now do lab for windows too. Also add </a:t>
             </a:r>
             <a:r>
               <a:rPr lang="en-US" dirty="0" err="1" smtClean="0"/>
@@ -5866,7 +5841,6 @@
               <a:rPr lang="en-US" dirty="0" smtClean="0"/>
               <a:t>. </a:t>
             </a:r>
-            <a:endParaRPr lang="en-US" dirty="0" smtClean="0"/>
           </a:p>
           <a:p>
             <a:endParaRPr lang="en-US" dirty="0" smtClean="0"/>
@@ -19868,98 +19842,6 @@
       </p:grpSpPr>
       <p:sp>
         <p:nvSpPr>
-          <p:cNvPr id="2" name="Content Placeholder 1"/>
-          <p:cNvSpPr>
-            <a:spLocks noGrp="1"/>
-          </p:cNvSpPr>
-          <p:nvPr>
-            <p:ph sz="quarter" idx="10"/>
-          </p:nvPr>
-        </p:nvSpPr>
-        <p:spPr>
-          <a:xfrm>
-            <a:off x="1121104" y="2489675"/>
-            <a:ext cx="14423693" cy="5498208"/>
-          </a:xfrm>
-        </p:spPr>
-        <p:txBody>
-          <a:bodyPr/>
-          <a:lstStyle/>
-          <a:p>
-            <a:r>
-              <a:rPr lang="en-US" dirty="0"/>
-              <a:t>The authenticity of host '52.90.148.31 (52.90.148.31)' can't be established.</a:t>
-            </a:r>
-          </a:p>
-          <a:p>
-            <a:r>
-              <a:rPr lang="en-US" dirty="0"/>
-              <a:t>RSA key fingerprint is a5:c3:31:5a:ce:4d:a8:17:46:ac:47:17:60:fc:26:17.</a:t>
-            </a:r>
-          </a:p>
-          <a:p>
-            <a:r>
-              <a:rPr lang="en-US" dirty="0"/>
-              <a:t>Are you sure you want to continue connecting (yes/no)? yes</a:t>
-            </a:r>
-          </a:p>
-          <a:p>
-            <a:r>
-              <a:rPr lang="en-US" dirty="0"/>
-              <a:t>Warning: Permanently added '52.90.148.31' (RSA) to the list of known hosts.</a:t>
-            </a:r>
-          </a:p>
-          <a:p>
-            <a:r>
-              <a:rPr lang="en-US" dirty="0"/>
-              <a:t>chef@52.90.148.31's password:</a:t>
-            </a:r>
-          </a:p>
-          <a:p>
-            <a:r>
-              <a:rPr lang="en-US" dirty="0"/>
-              <a:t>profile_01.zip                                100%  937     0.9KB/s   00:00</a:t>
-            </a:r>
-          </a:p>
-        </p:txBody>
-      </p:sp>
-      <p:sp>
-        <p:nvSpPr>
-          <p:cNvPr id="3" name="Text Placeholder 2"/>
-          <p:cNvSpPr>
-            <a:spLocks noGrp="1"/>
-          </p:cNvSpPr>
-          <p:nvPr>
-            <p:ph type="body" sz="quarter" idx="11"/>
-          </p:nvPr>
-        </p:nvSpPr>
-        <p:spPr>
-          <a:xfrm>
-            <a:off x="1121104" y="1337149"/>
-            <a:ext cx="14422528" cy="857411"/>
-          </a:xfrm>
-        </p:spPr>
-        <p:txBody>
-          <a:bodyPr/>
-          <a:lstStyle/>
-          <a:p>
-            <a:r>
-              <a:rPr lang="en-US" dirty="0"/>
-              <a:t>C:\tmp&gt;scp chef@52.90.148.31:~/</a:t>
-            </a:r>
-            <a:r>
-              <a:rPr lang="en-US" dirty="0" err="1"/>
-              <a:t>compliance_profiles</a:t>
-            </a:r>
-            <a:r>
-              <a:rPr lang="en-US" dirty="0"/>
-              <a:t>/profile_01.zip .</a:t>
-            </a:r>
-          </a:p>
-        </p:txBody>
-      </p:sp>
-      <p:sp>
-        <p:nvSpPr>
           <p:cNvPr id="4" name="Title 3"/>
           <p:cNvSpPr>
             <a:spLocks noGrp="1"/>
@@ -19977,7 +19859,15 @@
           <a:p>
             <a:r>
               <a:rPr lang="en-US" dirty="0" smtClean="0"/>
-              <a:t>GL: From your Laptop Run the </a:t>
+              <a:t>GL: From </a:t>
+            </a:r>
+            <a:r>
+              <a:rPr lang="en-US" dirty="0" smtClean="0"/>
+              <a:t>Your </a:t>
+            </a:r>
+            <a:r>
+              <a:rPr lang="en-US" dirty="0" smtClean="0"/>
+              <a:t>Laptop Run the </a:t>
             </a:r>
             <a:r>
               <a:rPr lang="en-US" dirty="0" err="1" smtClean="0"/>
@@ -19988,6 +19878,88 @@
               <a:t> Command</a:t>
             </a:r>
             <a:endParaRPr lang="en-US" dirty="0"/>
+          </a:p>
+        </p:txBody>
+      </p:sp>
+      <p:sp>
+        <p:nvSpPr>
+          <p:cNvPr id="2" name="Content Placeholder 1"/>
+          <p:cNvSpPr>
+            <a:spLocks noGrp="1"/>
+          </p:cNvSpPr>
+          <p:nvPr>
+            <p:ph sz="quarter" idx="10"/>
+          </p:nvPr>
+        </p:nvSpPr>
+        <p:spPr/>
+        <p:txBody>
+          <a:bodyPr/>
+          <a:lstStyle/>
+          <a:p>
+            <a:r>
+              <a:rPr lang="en-US" b="1" dirty="0"/>
+              <a:t>The authenticity of host '52.90.148.31 (52.90.148.31)' can't be established.</a:t>
+            </a:r>
+          </a:p>
+          <a:p>
+            <a:r>
+              <a:rPr lang="en-US" b="1" dirty="0"/>
+              <a:t>RSA key fingerprint is a5:c3:31:5a:ce:4d:a8:17:46:ac:47:17:60:fc:26:17.</a:t>
+            </a:r>
+          </a:p>
+          <a:p>
+            <a:r>
+              <a:rPr lang="en-US" b="1" dirty="0"/>
+              <a:t>Are you sure you want to continue connecting (yes/no)? yes</a:t>
+            </a:r>
+          </a:p>
+          <a:p>
+            <a:r>
+              <a:rPr lang="en-US" b="1" dirty="0"/>
+              <a:t>Warning: Permanently added '52.90.148.31' (RSA) to the list of known hosts.</a:t>
+            </a:r>
+          </a:p>
+          <a:p>
+            <a:r>
+              <a:rPr lang="en-US" b="1" dirty="0"/>
+              <a:t>chef@52.90.148.31's password:</a:t>
+            </a:r>
+          </a:p>
+          <a:p>
+            <a:r>
+              <a:rPr lang="en-US" b="1" dirty="0"/>
+              <a:t>profile_01.zip                                100%  937     0.9KB/s   00:00</a:t>
+            </a:r>
+          </a:p>
+        </p:txBody>
+      </p:sp>
+      <p:sp>
+        <p:nvSpPr>
+          <p:cNvPr id="3" name="Text Placeholder 2"/>
+          <p:cNvSpPr>
+            <a:spLocks noGrp="1"/>
+          </p:cNvSpPr>
+          <p:nvPr>
+            <p:ph type="body" sz="quarter" idx="11"/>
+          </p:nvPr>
+        </p:nvSpPr>
+        <p:spPr/>
+        <p:txBody>
+          <a:bodyPr/>
+          <a:lstStyle/>
+          <a:p>
+            <a:r>
+              <a:rPr lang="en-US" dirty="0"/>
+              <a:t>C:\tmp&gt;scp chef@52.90.148.31:~/</a:t>
+            </a:r>
+            <a:r>
+              <a:rPr lang="en-US" dirty="0" err="1"/>
+              <a:t>compliance_profiles</a:t>
+            </a:r>
+            <a:r>
+              <a:rPr lang="en-US" dirty="0"/>
+              <a:t>/profile_01.zip .</a:t>
+            </a:r>
           </a:p>
         </p:txBody>
       </p:sp>
@@ -26061,6 +26033,15 @@
 
 <file path=customXml/item1.xml><?xml version="1.0" encoding="utf-8"?>
 <?mso-contentType ?>
+<FormTemplates xmlns="http://schemas.microsoft.com/sharepoint/v3/contenttype/forms">
+  <Display>DocumentLibraryForm</Display>
+  <Edit>DocumentLibraryForm</Edit>
+  <New>DocumentLibraryForm</New>
+</FormTemplates>
+</file>
+
+<file path=customXml/item2.xml><?xml version="1.0" encoding="utf-8"?>
+<?mso-contentType ?>
 <spe:Receivers xmlns:spe="http://schemas.microsoft.com/sharepoint/events">
   <Receiver>
     <Name>Document ID Generator</Name>
@@ -26105,7 +26086,7 @@
 </spe:Receivers>
 </file>
 
-<file path=customXml/item2.xml><?xml version="1.0" encoding="utf-8"?>
+<file path=customXml/item3.xml><?xml version="1.0" encoding="utf-8"?>
 <ct:contentTypeSchema xmlns:ct="http://schemas.microsoft.com/office/2006/metadata/contentType" xmlns:ma="http://schemas.microsoft.com/office/2006/metadata/properties/metaAttributes" ct:_="" ma:_="" ma:contentTypeName="Document" ma:contentTypeID="0x0101000812F700BE7F874999720E88173FE491" ma:contentTypeVersion="0" ma:contentTypeDescription="Create a new document." ma:contentTypeScope="" ma:versionID="3f79f408e2ca720b7aba6e0e32464d0c">
   <xsd:schema xmlns:xsd="http://www.w3.org/2001/XMLSchema" xmlns:xs="http://www.w3.org/2001/XMLSchema" xmlns:p="http://schemas.microsoft.com/office/2006/metadata/properties" xmlns:ns2="7bb5d761-a2ea-4873-95f7-7a6658fb3ef0" targetNamespace="http://schemas.microsoft.com/office/2006/metadata/properties" ma:root="true" ma:fieldsID="1e062cd38ba31e406bfc4340fbc7f87a" ns2:_="">
     <xsd:import namespace="7bb5d761-a2ea-4873-95f7-7a6658fb3ef0"/>
@@ -26250,7 +26231,7 @@
 </ct:contentTypeSchema>
 </file>
 
-<file path=customXml/item3.xml><?xml version="1.0" encoding="utf-8"?>
+<file path=customXml/item4.xml><?xml version="1.0" encoding="utf-8"?>
 <p:properties xmlns:p="http://schemas.microsoft.com/office/2006/metadata/properties" xmlns:xsi="http://www.w3.org/2001/XMLSchema-instance" xmlns:pc="http://schemas.microsoft.com/office/infopath/2007/PartnerControls">
   <documentManagement>
     <_dlc_DocId xmlns="7bb5d761-a2ea-4873-95f7-7a6658fb3ef0">M4CWTKMW727E-592-73</_dlc_DocId>
@@ -26262,16 +26243,15 @@
 </p:properties>
 </file>
 
-<file path=customXml/item4.xml><?xml version="1.0" encoding="utf-8"?>
-<?mso-contentType ?>
-<FormTemplates xmlns="http://schemas.microsoft.com/sharepoint/v3/contenttype/forms">
-  <Display>DocumentLibraryForm</Display>
-  <Edit>DocumentLibraryForm</Edit>
-  <New>DocumentLibraryForm</New>
-</FormTemplates>
+<file path=customXml/itemProps1.xml><?xml version="1.0" encoding="utf-8"?>
+<ds:datastoreItem xmlns:ds="http://schemas.openxmlformats.org/officeDocument/2006/customXml" ds:itemID="{5CDEB364-43EC-4510-9881-539C2A3FCE9E}">
+  <ds:schemaRefs>
+    <ds:schemaRef ds:uri="http://schemas.microsoft.com/sharepoint/v3/contenttype/forms"/>
+  </ds:schemaRefs>
+</ds:datastoreItem>
 </file>
 
-<file path=customXml/itemProps1.xml><?xml version="1.0" encoding="utf-8"?>
+<file path=customXml/itemProps2.xml><?xml version="1.0" encoding="utf-8"?>
 <ds:datastoreItem xmlns:ds="http://schemas.openxmlformats.org/officeDocument/2006/customXml" ds:itemID="{B13EBC30-FE27-4C6A-B723-23FC2188F7DC}">
   <ds:schemaRefs>
     <ds:schemaRef ds:uri="http://schemas.microsoft.com/sharepoint/events"/>
@@ -26279,7 +26259,7 @@
 </ds:datastoreItem>
 </file>
 
-<file path=customXml/itemProps2.xml><?xml version="1.0" encoding="utf-8"?>
+<file path=customXml/itemProps3.xml><?xml version="1.0" encoding="utf-8"?>
 <ds:datastoreItem xmlns:ds="http://schemas.openxmlformats.org/officeDocument/2006/customXml" ds:itemID="{164479E5-0B02-49AC-B79E-EC1D6164DDD3}">
   <ds:schemaRefs>
     <ds:schemaRef ds:uri="http://schemas.microsoft.com/office/2006/metadata/contentType"/>
@@ -26297,7 +26277,7 @@
 </ds:datastoreItem>
 </file>
 
-<file path=customXml/itemProps3.xml><?xml version="1.0" encoding="utf-8"?>
+<file path=customXml/itemProps4.xml><?xml version="1.0" encoding="utf-8"?>
 <ds:datastoreItem xmlns:ds="http://schemas.openxmlformats.org/officeDocument/2006/customXml" ds:itemID="{6921749B-AEB7-461B-845F-603CABD25259}">
   <ds:schemaRefs>
     <ds:schemaRef ds:uri="http://schemas.microsoft.com/office/2006/documentManagement/types"/>
@@ -26311,12 +26291,4 @@
     <ds:schemaRef ds:uri="http://purl.org/dc/dcmitype/"/>
   </ds:schemaRefs>
 </ds:datastoreItem>
-</file>
-
-<file path=customXml/itemProps4.xml><?xml version="1.0" encoding="utf-8"?>
-<ds:datastoreItem xmlns:ds="http://schemas.openxmlformats.org/officeDocument/2006/customXml" ds:itemID="{5CDEB364-43EC-4510-9881-539C2A3FCE9E}">
-  <ds:schemaRefs>
-    <ds:schemaRef ds:uri="http://schemas.microsoft.com/sharepoint/v3/contenttype/forms"/>
-  </ds:schemaRefs>
-</ds:datastoreItem>
 </file>
</xml_diff>

<commit_message>
05-creating-custom-profiles removed unneccessary slides at end
</commit_message>
<xml_diff>
--- a/05-creating-custom-profiles.pptx
+++ b/05-creating-custom-profiles.pptx
@@ -6,10 +6,10 @@
     <p:sldMasterId id="2147483847" r:id="rId6"/>
   </p:sldMasterIdLst>
   <p:notesMasterIdLst>
-    <p:notesMasterId r:id="rId42"/>
+    <p:notesMasterId r:id="rId38"/>
   </p:notesMasterIdLst>
   <p:handoutMasterIdLst>
-    <p:handoutMasterId r:id="rId43"/>
+    <p:handoutMasterId r:id="rId39"/>
   </p:handoutMasterIdLst>
   <p:sldIdLst>
     <p:sldId id="256" r:id="rId7"/>
@@ -41,12 +41,8 @@
     <p:sldId id="313" r:id="rId33"/>
     <p:sldId id="314" r:id="rId34"/>
     <p:sldId id="320" r:id="rId35"/>
-    <p:sldId id="318" r:id="rId36"/>
-    <p:sldId id="319" r:id="rId37"/>
-    <p:sldId id="296" r:id="rId38"/>
-    <p:sldId id="302" r:id="rId39"/>
-    <p:sldId id="276" r:id="rId40"/>
-    <p:sldId id="267" r:id="rId41"/>
+    <p:sldId id="276" r:id="rId36"/>
+    <p:sldId id="267" r:id="rId37"/>
   </p:sldIdLst>
   <p:sldSz cx="16256000" cy="9144000"/>
   <p:notesSz cx="6858000" cy="9144000"/>
@@ -308,7 +304,7 @@
               <a:pPr>
                 <a:defRPr/>
               </a:pPr>
-              <a:t>2016-02-08</a:t>
+              <a:t>2016-02-10</a:t>
             </a:fld>
             <a:endParaRPr lang="en-US" dirty="0"/>
           </a:p>
@@ -491,7 +487,7 @@
               <a:pPr>
                 <a:defRPr/>
               </a:pPr>
-              <a:t>2016-02-08</a:t>
+              <a:t>2016-02-10</a:t>
             </a:fld>
             <a:endParaRPr lang="en-US" dirty="0"/>
           </a:p>
@@ -2806,217 +2802,7 @@
             </a:r>
             <a:r>
               <a:rPr lang="en-US" baseline="0" dirty="0" smtClean="0"/>
-              <a:t>/rb files was verified.</a:t>
-            </a:r>
-          </a:p>
-          <a:p>
-            <a:pPr marL="0" marR="0" indent="0" algn="l" defTabSz="1217613" rtl="0" eaLnBrk="1" fontAlgn="base" latinLnBrk="0" hangingPunct="1">
-              <a:lnSpc>
-                <a:spcPct val="90000"/>
-              </a:lnSpc>
-              <a:spcBef>
-                <a:spcPct val="30000"/>
-              </a:spcBef>
-              <a:spcAft>
-                <a:spcPts val="450"/>
-              </a:spcAft>
-              <a:buClrTx/>
-              <a:buSzTx/>
-              <a:buFontTx/>
-              <a:buNone/>
-              <a:tabLst/>
-              <a:defRPr/>
-            </a:pPr>
-            <a:endParaRPr lang="en-US" baseline="0" dirty="0" smtClean="0"/>
-          </a:p>
-          <a:p>
-            <a:pPr marL="0" marR="0" indent="0" algn="l" defTabSz="1217613" rtl="0" eaLnBrk="1" fontAlgn="base" latinLnBrk="0" hangingPunct="1">
-              <a:lnSpc>
-                <a:spcPct val="90000"/>
-              </a:lnSpc>
-              <a:spcBef>
-                <a:spcPct val="30000"/>
-              </a:spcBef>
-              <a:spcAft>
-                <a:spcPts val="450"/>
-              </a:spcAft>
-              <a:buClrTx/>
-              <a:buSzTx/>
-              <a:buFontTx/>
-              <a:buNone/>
-              <a:tabLst/>
-              <a:defRPr/>
-            </a:pPr>
-            <a:r>
-              <a:rPr lang="en-US" dirty="0" smtClean="0"/>
-              <a:t>Instructor Note: In a recent test (1/28 </a:t>
-            </a:r>
-            <a:r>
-              <a:rPr lang="en-US" dirty="0" err="1" smtClean="0"/>
-              <a:t>inspec</a:t>
-            </a:r>
-            <a:r>
-              <a:rPr lang="en-US" dirty="0" smtClean="0"/>
-              <a:t> 0.9.2) the output was a little different:</a:t>
-            </a:r>
-            <a:br>
-              <a:rPr lang="en-US" dirty="0" smtClean="0"/>
-            </a:br>
-            <a:r>
-              <a:rPr lang="en-US" dirty="0" smtClean="0"/>
-              <a:t>[chef@ip-172-31-2-116 profile_01]$ </a:t>
-            </a:r>
-            <a:r>
-              <a:rPr lang="en-US" dirty="0" err="1" smtClean="0"/>
-              <a:t>inspec</a:t>
-            </a:r>
-            <a:r>
-              <a:rPr lang="en-US" dirty="0" smtClean="0"/>
-              <a:t> check ~/</a:t>
-            </a:r>
-            <a:r>
-              <a:rPr lang="en-US" dirty="0" err="1" smtClean="0"/>
-              <a:t>compliance_profiles</a:t>
-            </a:r>
-            <a:r>
-              <a:rPr lang="en-US" dirty="0" smtClean="0"/>
-              <a:t>/profile_01</a:t>
-            </a:r>
-          </a:p>
-          <a:p>
-            <a:pPr marL="0" marR="0" indent="0" algn="l" defTabSz="1217613" rtl="0" eaLnBrk="1" fontAlgn="base" latinLnBrk="0" hangingPunct="1">
-              <a:lnSpc>
-                <a:spcPct val="90000"/>
-              </a:lnSpc>
-              <a:spcBef>
-                <a:spcPct val="30000"/>
-              </a:spcBef>
-              <a:spcAft>
-                <a:spcPts val="450"/>
-              </a:spcAft>
-              <a:buClrTx/>
-              <a:buSzTx/>
-              <a:buFontTx/>
-              <a:buNone/>
-              <a:tabLst/>
-              <a:defRPr/>
-            </a:pPr>
-            <a:r>
-              <a:rPr lang="en-US" dirty="0" smtClean="0"/>
-              <a:t>I, [2016-01-28T22:14:01.897589 #6154]  INFO -- : Checking profile in /home/chef/</a:t>
-            </a:r>
-            <a:r>
-              <a:rPr lang="en-US" dirty="0" err="1" smtClean="0"/>
-              <a:t>compliance_profiles</a:t>
-            </a:r>
-            <a:r>
-              <a:rPr lang="en-US" dirty="0" smtClean="0"/>
-              <a:t>/profile_01</a:t>
-            </a:r>
-          </a:p>
-          <a:p>
-            <a:pPr marL="0" marR="0" indent="0" algn="l" defTabSz="1217613" rtl="0" eaLnBrk="1" fontAlgn="base" latinLnBrk="0" hangingPunct="1">
-              <a:lnSpc>
-                <a:spcPct val="90000"/>
-              </a:lnSpc>
-              <a:spcBef>
-                <a:spcPct val="30000"/>
-              </a:spcBef>
-              <a:spcAft>
-                <a:spcPts val="450"/>
-              </a:spcAft>
-              <a:buClrTx/>
-              <a:buSzTx/>
-              <a:buFontTx/>
-              <a:buNone/>
-              <a:tabLst/>
-              <a:defRPr/>
-            </a:pPr>
-            <a:r>
-              <a:rPr lang="en-US" dirty="0" smtClean="0"/>
-              <a:t>I, [2016-01-28T22:14:01.897815 #6154]  INFO -- : Metadata OK.</a:t>
-            </a:r>
-          </a:p>
-          <a:p>
-            <a:pPr marL="0" marR="0" indent="0" algn="l" defTabSz="1217613" rtl="0" eaLnBrk="1" fontAlgn="base" latinLnBrk="0" hangingPunct="1">
-              <a:lnSpc>
-                <a:spcPct val="90000"/>
-              </a:lnSpc>
-              <a:spcBef>
-                <a:spcPct val="30000"/>
-              </a:spcBef>
-              <a:spcAft>
-                <a:spcPts val="450"/>
-              </a:spcAft>
-              <a:buClrTx/>
-              <a:buSzTx/>
-              <a:buFontTx/>
-              <a:buNone/>
-              <a:tabLst/>
-              <a:defRPr/>
-            </a:pPr>
-            <a:r>
-              <a:rPr lang="en-US" dirty="0" smtClean="0"/>
-              <a:t>D, [2016-01-28T22:14:01.897878 #6154] DEBUG -- : Found 15 rules.</a:t>
-            </a:r>
-          </a:p>
-          <a:p>
-            <a:pPr marL="0" marR="0" indent="0" algn="l" defTabSz="1217613" rtl="0" eaLnBrk="1" fontAlgn="base" latinLnBrk="0" hangingPunct="1">
-              <a:lnSpc>
-                <a:spcPct val="90000"/>
-              </a:lnSpc>
-              <a:spcBef>
-                <a:spcPct val="30000"/>
-              </a:spcBef>
-              <a:spcAft>
-                <a:spcPts val="450"/>
-              </a:spcAft>
-              <a:buClrTx/>
-              <a:buSzTx/>
-              <a:buFontTx/>
-              <a:buNone/>
-              <a:tabLst/>
-              <a:defRPr/>
-            </a:pPr>
-            <a:r>
-              <a:rPr lang="en-US" dirty="0" smtClean="0"/>
-              <a:t>D, [2016-01-28T22:14:01.897926 #6154] DEBUG -- : Verify all rules in  /home/chef/</a:t>
-            </a:r>
-            <a:r>
-              <a:rPr lang="en-US" dirty="0" err="1" smtClean="0"/>
-              <a:t>compliance_profiles</a:t>
-            </a:r>
-            <a:r>
-              <a:rPr lang="en-US" dirty="0" smtClean="0"/>
-              <a:t>/profile_01/test/</a:t>
-            </a:r>
-            <a:r>
-              <a:rPr lang="en-US" dirty="0" err="1" smtClean="0"/>
-              <a:t>tmp.rb</a:t>
-            </a:r>
-            <a:endParaRPr lang="en-US" dirty="0" smtClean="0"/>
-          </a:p>
-          <a:p>
-            <a:pPr marL="0" marR="0" indent="0" algn="l" defTabSz="1217613" rtl="0" eaLnBrk="1" fontAlgn="base" latinLnBrk="0" hangingPunct="1">
-              <a:lnSpc>
-                <a:spcPct val="90000"/>
-              </a:lnSpc>
-              <a:spcBef>
-                <a:spcPct val="30000"/>
-              </a:spcBef>
-              <a:spcAft>
-                <a:spcPts val="450"/>
-              </a:spcAft>
-              <a:buClrTx/>
-              <a:buSzTx/>
-              <a:buFontTx/>
-              <a:buNone/>
-              <a:tabLst/>
-              <a:defRPr/>
-            </a:pPr>
-            <a:r>
-              <a:rPr lang="en-US" b="1" dirty="0" smtClean="0"/>
-              <a:t>I, [2016-01-28T22:14:01.897980 #6154]  INFO -- : Rule definitions OK.</a:t>
+              <a:t>/rb files was verified and its rule definitions are OK.</a:t>
             </a:r>
           </a:p>
           <a:p>
@@ -5767,555 +5553,6 @@
 </p:notes>
 </file>
 
-<file path=ppt/notesSlides/notesSlide28.xml><?xml version="1.0" encoding="utf-8"?>
-<p:notes xmlns:a="http://schemas.openxmlformats.org/drawingml/2006/main" xmlns:r="http://schemas.openxmlformats.org/officeDocument/2006/relationships" xmlns:p="http://schemas.openxmlformats.org/presentationml/2006/main">
-  <p:cSld>
-    <p:spTree>
-      <p:nvGrpSpPr>
-        <p:cNvPr id="1" name=""/>
-        <p:cNvGrpSpPr/>
-        <p:nvPr/>
-      </p:nvGrpSpPr>
-      <p:grpSpPr>
-        <a:xfrm>
-          <a:off x="0" y="0"/>
-          <a:ext cx="0" cy="0"/>
-          <a:chOff x="0" y="0"/>
-          <a:chExt cx="0" cy="0"/>
-        </a:xfrm>
-      </p:grpSpPr>
-      <p:sp>
-        <p:nvSpPr>
-          <p:cNvPr id="2" name="Slide Image Placeholder 1"/>
-          <p:cNvSpPr>
-            <a:spLocks noGrp="1" noRot="1" noChangeAspect="1"/>
-          </p:cNvSpPr>
-          <p:nvPr>
-            <p:ph type="sldImg"/>
-          </p:nvPr>
-        </p:nvSpPr>
-        <p:spPr/>
-      </p:sp>
-      <p:sp>
-        <p:nvSpPr>
-          <p:cNvPr id="3" name="Notes Placeholder 2"/>
-          <p:cNvSpPr>
-            <a:spLocks noGrp="1"/>
-          </p:cNvSpPr>
-          <p:nvPr>
-            <p:ph type="body" idx="1"/>
-          </p:nvPr>
-        </p:nvSpPr>
-        <p:spPr/>
-        <p:txBody>
-          <a:bodyPr>
-            <a:normAutofit/>
-          </a:bodyPr>
-          <a:lstStyle/>
-          <a:p>
-            <a:r>
-              <a:rPr lang="en-US" dirty="0" smtClean="0"/>
-              <a:t>TBD: now do lab for windows too. Also add </a:t>
-            </a:r>
-            <a:r>
-              <a:rPr lang="en-US" dirty="0" err="1" smtClean="0"/>
-              <a:t>inspec</a:t>
-            </a:r>
-            <a:r>
-              <a:rPr lang="en-US" dirty="0" smtClean="0"/>
-              <a:t> reference link that gives </a:t>
-            </a:r>
-            <a:r>
-              <a:rPr lang="en-US" smtClean="0"/>
-              <a:t>writing profile</a:t>
-            </a:r>
-            <a:r>
-              <a:rPr lang="en-US" baseline="0" smtClean="0"/>
-              <a:t> </a:t>
-            </a:r>
-            <a:r>
-              <a:rPr lang="en-US" smtClean="0"/>
-              <a:t>examples</a:t>
-            </a:r>
-            <a:r>
-              <a:rPr lang="en-US" dirty="0" smtClean="0"/>
-              <a:t>. </a:t>
-            </a:r>
-          </a:p>
-          <a:p>
-            <a:endParaRPr lang="en-US" dirty="0" smtClean="0"/>
-          </a:p>
-          <a:p>
-            <a:endParaRPr lang="en-US" dirty="0" smtClean="0"/>
-          </a:p>
-        </p:txBody>
-      </p:sp>
-      <p:sp>
-        <p:nvSpPr>
-          <p:cNvPr id="4" name="Slide Number Placeholder 3"/>
-          <p:cNvSpPr>
-            <a:spLocks noGrp="1"/>
-          </p:cNvSpPr>
-          <p:nvPr>
-            <p:ph type="sldNum" sz="quarter" idx="10"/>
-          </p:nvPr>
-        </p:nvSpPr>
-        <p:spPr/>
-        <p:txBody>
-          <a:bodyPr/>
-          <a:lstStyle/>
-          <a:p>
-            <a:pPr>
-              <a:defRPr/>
-            </a:pPr>
-            <a:fld id="{DC3734AA-3150-D947-AC52-2F5DF48BFCD5}" type="slidenum">
-              <a:rPr lang="en-US" smtClean="0"/>
-              <a:pPr>
-                <a:defRPr/>
-              </a:pPr>
-              <a:t>30</a:t>
-            </a:fld>
-            <a:endParaRPr lang="en-US" dirty="0"/>
-          </a:p>
-        </p:txBody>
-      </p:sp>
-      <p:sp>
-        <p:nvSpPr>
-          <p:cNvPr id="5" name="Header Placeholder 4"/>
-          <p:cNvSpPr>
-            <a:spLocks noGrp="1"/>
-          </p:cNvSpPr>
-          <p:nvPr>
-            <p:ph type="hdr" sz="quarter" idx="11"/>
-          </p:nvPr>
-        </p:nvSpPr>
-        <p:spPr/>
-        <p:txBody>
-          <a:bodyPr/>
-          <a:lstStyle/>
-          <a:p>
-            <a:pPr>
-              <a:defRPr/>
-            </a:pPr>
-            <a:endParaRPr lang="en-US"/>
-          </a:p>
-        </p:txBody>
-      </p:sp>
-      <p:sp>
-        <p:nvSpPr>
-          <p:cNvPr id="6" name="Footer Placeholder 5"/>
-          <p:cNvSpPr>
-            <a:spLocks noGrp="1"/>
-          </p:cNvSpPr>
-          <p:nvPr>
-            <p:ph type="ftr" sz="quarter" idx="12"/>
-          </p:nvPr>
-        </p:nvSpPr>
-        <p:spPr/>
-        <p:txBody>
-          <a:bodyPr/>
-          <a:lstStyle/>
-          <a:p>
-            <a:pPr>
-              <a:defRPr/>
-            </a:pPr>
-            <a:endParaRPr lang="en-US"/>
-          </a:p>
-        </p:txBody>
-      </p:sp>
-    </p:spTree>
-    <p:extLst>
-      <p:ext uri="{BB962C8B-B14F-4D97-AF65-F5344CB8AC3E}">
-        <p14:creationId xmlns:p14="http://schemas.microsoft.com/office/powerpoint/2010/main" val="4089888830"/>
-      </p:ext>
-    </p:extLst>
-  </p:cSld>
-  <p:clrMapOvr>
-    <a:masterClrMapping/>
-  </p:clrMapOvr>
-</p:notes>
-</file>
-
-<file path=ppt/notesSlides/notesSlide29.xml><?xml version="1.0" encoding="utf-8"?>
-<p:notes xmlns:a="http://schemas.openxmlformats.org/drawingml/2006/main" xmlns:r="http://schemas.openxmlformats.org/officeDocument/2006/relationships" xmlns:p="http://schemas.openxmlformats.org/presentationml/2006/main">
-  <p:cSld>
-    <p:spTree>
-      <p:nvGrpSpPr>
-        <p:cNvPr id="1" name=""/>
-        <p:cNvGrpSpPr/>
-        <p:nvPr/>
-      </p:nvGrpSpPr>
-      <p:grpSpPr>
-        <a:xfrm>
-          <a:off x="0" y="0"/>
-          <a:ext cx="0" cy="0"/>
-          <a:chOff x="0" y="0"/>
-          <a:chExt cx="0" cy="0"/>
-        </a:xfrm>
-      </p:grpSpPr>
-      <p:sp>
-        <p:nvSpPr>
-          <p:cNvPr id="2" name="Slide Image Placeholder 1"/>
-          <p:cNvSpPr>
-            <a:spLocks noGrp="1" noRot="1" noChangeAspect="1"/>
-          </p:cNvSpPr>
-          <p:nvPr>
-            <p:ph type="sldImg"/>
-          </p:nvPr>
-        </p:nvSpPr>
-        <p:spPr/>
-      </p:sp>
-      <p:sp>
-        <p:nvSpPr>
-          <p:cNvPr id="3" name="Notes Placeholder 2"/>
-          <p:cNvSpPr>
-            <a:spLocks noGrp="1"/>
-          </p:cNvSpPr>
-          <p:nvPr>
-            <p:ph type="body" idx="1"/>
-          </p:nvPr>
-        </p:nvSpPr>
-        <p:spPr/>
-        <p:txBody>
-          <a:bodyPr>
-            <a:normAutofit fontScale="92500" lnSpcReduction="20000"/>
-          </a:bodyPr>
-          <a:lstStyle/>
-          <a:p>
-            <a:r>
-              <a:rPr lang="en-US" dirty="0" smtClean="0"/>
-              <a:t>https://github.com/chef/inspec/blob/7f555b902d6860ffe236ff23e4b52f20bac28adc/lib/inspec/profile.rb#L81-L129</a:t>
-            </a:r>
-          </a:p>
-          <a:p>
-            <a:endParaRPr lang="en-US" dirty="0" smtClean="0"/>
-          </a:p>
-          <a:p>
-            <a:pPr marL="0" marR="0" indent="0" algn="l" defTabSz="1217613" rtl="0" eaLnBrk="1" fontAlgn="base" latinLnBrk="0" hangingPunct="1">
-              <a:lnSpc>
-                <a:spcPct val="90000"/>
-              </a:lnSpc>
-              <a:spcBef>
-                <a:spcPct val="30000"/>
-              </a:spcBef>
-              <a:spcAft>
-                <a:spcPts val="450"/>
-              </a:spcAft>
-              <a:buClrTx/>
-              <a:buSzTx/>
-              <a:buFontTx/>
-              <a:buNone/>
-              <a:tabLst/>
-              <a:defRPr/>
-            </a:pPr>
-            <a:r>
-              <a:rPr lang="en-US" dirty="0" smtClean="0"/>
-              <a:t>So your</a:t>
-            </a:r>
-            <a:r>
-              <a:rPr lang="en-US" baseline="0" dirty="0" smtClean="0"/>
-              <a:t> cookbooks will have a </a:t>
-            </a:r>
-            <a:r>
-              <a:rPr lang="en-US" dirty="0" smtClean="0"/>
-              <a:t>metadata.rb.</a:t>
-            </a:r>
-            <a:endParaRPr lang="en-US" dirty="0"/>
-          </a:p>
-          <a:p>
-            <a:pPr marL="0" marR="0" indent="0" algn="l" defTabSz="1217613" rtl="0" eaLnBrk="1" fontAlgn="base" latinLnBrk="0" hangingPunct="1">
-              <a:lnSpc>
-                <a:spcPct val="90000"/>
-              </a:lnSpc>
-              <a:spcBef>
-                <a:spcPct val="30000"/>
-              </a:spcBef>
-              <a:spcAft>
-                <a:spcPts val="450"/>
-              </a:spcAft>
-              <a:buClrTx/>
-              <a:buSzTx/>
-              <a:buFontTx/>
-              <a:buNone/>
-              <a:tabLst/>
-              <a:defRPr/>
-            </a:pPr>
-            <a:r>
-              <a:rPr lang="en-US" dirty="0" smtClean="0"/>
-              <a:t>An</a:t>
-            </a:r>
-            <a:r>
-              <a:rPr lang="en-US" baseline="0" dirty="0" smtClean="0"/>
-              <a:t>d your </a:t>
-            </a:r>
-          </a:p>
-          <a:p>
-            <a:pPr marL="0" marR="0" indent="0" algn="l" defTabSz="1217613" rtl="0" eaLnBrk="1" fontAlgn="base" latinLnBrk="0" hangingPunct="1">
-              <a:lnSpc>
-                <a:spcPct val="90000"/>
-              </a:lnSpc>
-              <a:spcBef>
-                <a:spcPct val="30000"/>
-              </a:spcBef>
-              <a:spcAft>
-                <a:spcPts val="450"/>
-              </a:spcAft>
-              <a:buClrTx/>
-              <a:buSzTx/>
-              <a:buFontTx/>
-              <a:buNone/>
-              <a:tabLst/>
-              <a:defRPr/>
-            </a:pPr>
-            <a:endParaRPr lang="en-US" baseline="0" dirty="0" smtClean="0"/>
-          </a:p>
-          <a:p>
-            <a:r>
-              <a:rPr lang="en-US" sz="1200" b="1" i="0" kern="1200" dirty="0" smtClean="0">
-                <a:solidFill>
-                  <a:schemeClr val="tx1"/>
-                </a:solidFill>
-                <a:effectLst/>
-                <a:latin typeface="Arial" panose="020B0604020202020204" pitchFamily="34" charset="0"/>
-                <a:ea typeface="ＭＳ Ｐゴシック" charset="0"/>
-                <a:cs typeface="Arial" panose="020B0604020202020204" pitchFamily="34" charset="0"/>
-              </a:rPr>
-              <a:t>Adding profiles</a:t>
-            </a:r>
-          </a:p>
-          <a:p>
-            <a:r>
-              <a:rPr lang="en-US" sz="1200" b="0" i="0" kern="1200" dirty="0" smtClean="0">
-                <a:solidFill>
-                  <a:schemeClr val="tx1"/>
-                </a:solidFill>
-                <a:effectLst/>
-                <a:latin typeface="Arial" panose="020B0604020202020204" pitchFamily="34" charset="0"/>
-                <a:ea typeface="ＭＳ Ｐゴシック" charset="0"/>
-                <a:cs typeface="Arial" panose="020B0604020202020204" pitchFamily="34" charset="0"/>
-              </a:rPr>
-              <a:t>Compliance profiles must be packaged in to a .tar.gz or .zip file to be uploaded to the Compliance Server. </a:t>
-            </a:r>
-          </a:p>
-          <a:p>
-            <a:r>
-              <a:rPr lang="en-US" sz="1200" b="0" i="0" kern="1200" dirty="0" smtClean="0">
-                <a:solidFill>
-                  <a:schemeClr val="tx1"/>
-                </a:solidFill>
-                <a:effectLst/>
-                <a:latin typeface="Arial" panose="020B0604020202020204" pitchFamily="34" charset="0"/>
-                <a:ea typeface="ＭＳ Ｐゴシック" charset="0"/>
-                <a:cs typeface="Arial" panose="020B0604020202020204" pitchFamily="34" charset="0"/>
-              </a:rPr>
-              <a:t>The directory structure is as follows (note, this is subject to change.  TODO: link to official docs when </a:t>
-            </a:r>
-            <a:r>
-              <a:rPr lang="en-US" sz="1200" b="0" i="0" kern="1200" dirty="0" err="1" smtClean="0">
-                <a:solidFill>
-                  <a:schemeClr val="tx1"/>
-                </a:solidFill>
-                <a:effectLst/>
-                <a:latin typeface="Arial" panose="020B0604020202020204" pitchFamily="34" charset="0"/>
-                <a:ea typeface="ＭＳ Ｐゴシック" charset="0"/>
-                <a:cs typeface="Arial" panose="020B0604020202020204" pitchFamily="34" charset="0"/>
-              </a:rPr>
-              <a:t>avaialble</a:t>
-            </a:r>
-            <a:r>
-              <a:rPr lang="en-US" sz="1200" b="0" i="0" kern="1200" dirty="0" smtClean="0">
-                <a:solidFill>
-                  <a:schemeClr val="tx1"/>
-                </a:solidFill>
-                <a:effectLst/>
-                <a:latin typeface="Arial" panose="020B0604020202020204" pitchFamily="34" charset="0"/>
-                <a:ea typeface="ＭＳ Ｐゴシック" charset="0"/>
-                <a:cs typeface="Arial" panose="020B0604020202020204" pitchFamily="34" charset="0"/>
-              </a:rPr>
-              <a:t>):</a:t>
-            </a:r>
-          </a:p>
-          <a:p>
-            <a:r>
-              <a:rPr lang="en-US" sz="1200" b="0" i="0" kern="1200" dirty="0" smtClean="0">
-                <a:solidFill>
-                  <a:schemeClr val="tx1"/>
-                </a:solidFill>
-                <a:effectLst/>
-                <a:latin typeface="Arial" panose="020B0604020202020204" pitchFamily="34" charset="0"/>
-                <a:ea typeface="ＭＳ Ｐゴシック" charset="0"/>
-                <a:cs typeface="Arial" panose="020B0604020202020204" pitchFamily="34" charset="0"/>
-              </a:rPr>
-              <a:t>xyz.zip:</a:t>
-            </a:r>
-          </a:p>
-          <a:p>
-            <a:r>
-              <a:rPr lang="en-US" dirty="0" smtClean="0"/>
-              <a:t>.</a:t>
-            </a:r>
-            <a:br>
-              <a:rPr lang="en-US" dirty="0" smtClean="0"/>
-            </a:br>
-            <a:r>
-              <a:rPr lang="en-US" dirty="0" smtClean="0"/>
-              <a:t>├── README.md</a:t>
-            </a:r>
-            <a:br>
-              <a:rPr lang="en-US" dirty="0" smtClean="0"/>
-            </a:br>
-            <a:r>
-              <a:rPr lang="en-US" dirty="0" smtClean="0"/>
-              <a:t>├── metadata.rb</a:t>
-            </a:r>
-            <a:br>
-              <a:rPr lang="en-US" dirty="0" smtClean="0"/>
-            </a:br>
-            <a:r>
-              <a:rPr lang="en-US" dirty="0" smtClean="0"/>
-              <a:t>└── test</a:t>
-            </a:r>
-            <a:br>
-              <a:rPr lang="en-US" dirty="0" smtClean="0"/>
-            </a:br>
-            <a:r>
-              <a:rPr lang="en-US" dirty="0" smtClean="0"/>
-              <a:t>  ├── </a:t>
-            </a:r>
-            <a:r>
-              <a:rPr lang="en-US" dirty="0" err="1" smtClean="0"/>
-              <a:t>foo_spec.rb</a:t>
-            </a:r>
-            <a:r>
-              <a:rPr lang="en-US" dirty="0" smtClean="0"/>
-              <a:t/>
-            </a:r>
-            <a:br>
-              <a:rPr lang="en-US" dirty="0" smtClean="0"/>
-            </a:br>
-            <a:r>
-              <a:rPr lang="en-US" dirty="0" smtClean="0"/>
-              <a:t>  └── </a:t>
-            </a:r>
-            <a:r>
-              <a:rPr lang="en-US" dirty="0" err="1" smtClean="0"/>
-              <a:t>bar_spec.rb</a:t>
-            </a:r>
-            <a:endParaRPr lang="en-US" dirty="0" smtClean="0"/>
-          </a:p>
-          <a:p>
-            <a:endParaRPr lang="en-US" dirty="0" smtClean="0"/>
-          </a:p>
-          <a:p>
-            <a:r>
-              <a:rPr lang="en-US" dirty="0" smtClean="0"/>
-              <a:t>As you write controls, </a:t>
-            </a:r>
-            <a:r>
-              <a:rPr lang="en-US" dirty="0" err="1" smtClean="0"/>
-              <a:t>InSpec</a:t>
-            </a:r>
-            <a:r>
-              <a:rPr lang="en-US" dirty="0" smtClean="0"/>
-              <a:t> requires a `test` directory since it </a:t>
-            </a:r>
-            <a:r>
-              <a:rPr lang="en-US" dirty="0" err="1" smtClean="0"/>
-              <a:t>InSpec</a:t>
-            </a:r>
-            <a:r>
-              <a:rPr lang="en-US" dirty="0" smtClean="0"/>
-              <a:t> expect this structure.</a:t>
-            </a:r>
-          </a:p>
-        </p:txBody>
-      </p:sp>
-      <p:sp>
-        <p:nvSpPr>
-          <p:cNvPr id="4" name="Slide Number Placeholder 3"/>
-          <p:cNvSpPr>
-            <a:spLocks noGrp="1"/>
-          </p:cNvSpPr>
-          <p:nvPr>
-            <p:ph type="sldNum" sz="quarter" idx="10"/>
-          </p:nvPr>
-        </p:nvSpPr>
-        <p:spPr/>
-        <p:txBody>
-          <a:bodyPr/>
-          <a:lstStyle/>
-          <a:p>
-            <a:pPr>
-              <a:defRPr/>
-            </a:pPr>
-            <a:fld id="{DC3734AA-3150-D947-AC52-2F5DF48BFCD5}" type="slidenum">
-              <a:rPr lang="en-US" smtClean="0"/>
-              <a:pPr>
-                <a:defRPr/>
-              </a:pPr>
-              <a:t>32</a:t>
-            </a:fld>
-            <a:endParaRPr lang="en-US" dirty="0"/>
-          </a:p>
-        </p:txBody>
-      </p:sp>
-      <p:sp>
-        <p:nvSpPr>
-          <p:cNvPr id="5" name="Header Placeholder 4"/>
-          <p:cNvSpPr>
-            <a:spLocks noGrp="1"/>
-          </p:cNvSpPr>
-          <p:nvPr>
-            <p:ph type="hdr" sz="quarter" idx="11"/>
-          </p:nvPr>
-        </p:nvSpPr>
-        <p:spPr/>
-        <p:txBody>
-          <a:bodyPr/>
-          <a:lstStyle/>
-          <a:p>
-            <a:pPr>
-              <a:defRPr/>
-            </a:pPr>
-            <a:endParaRPr lang="en-US"/>
-          </a:p>
-        </p:txBody>
-      </p:sp>
-      <p:sp>
-        <p:nvSpPr>
-          <p:cNvPr id="6" name="Footer Placeholder 5"/>
-          <p:cNvSpPr>
-            <a:spLocks noGrp="1"/>
-          </p:cNvSpPr>
-          <p:nvPr>
-            <p:ph type="ftr" sz="quarter" idx="12"/>
-          </p:nvPr>
-        </p:nvSpPr>
-        <p:spPr/>
-        <p:txBody>
-          <a:bodyPr/>
-          <a:lstStyle/>
-          <a:p>
-            <a:pPr>
-              <a:defRPr/>
-            </a:pPr>
-            <a:endParaRPr lang="en-US"/>
-          </a:p>
-        </p:txBody>
-      </p:sp>
-    </p:spTree>
-    <p:extLst>
-      <p:ext uri="{BB962C8B-B14F-4D97-AF65-F5344CB8AC3E}">
-        <p14:creationId xmlns:p14="http://schemas.microsoft.com/office/powerpoint/2010/main" val="4234763763"/>
-      </p:ext>
-    </p:extLst>
-  </p:cSld>
-  <p:clrMapOvr>
-    <a:masterClrMapping/>
-  </p:clrMapOvr>
-</p:notes>
-</file>
-
 <file path=ppt/notesSlides/notesSlide3.xml><?xml version="1.0" encoding="utf-8"?>
 <p:notes xmlns:a="http://schemas.openxmlformats.org/drawingml/2006/main" xmlns:r="http://schemas.openxmlformats.org/officeDocument/2006/relationships" xmlns:p="http://schemas.openxmlformats.org/presentationml/2006/main">
   <p:cSld>
@@ -6534,432 +5771,6 @@
     <p:extLst>
       <p:ext uri="{BB962C8B-B14F-4D97-AF65-F5344CB8AC3E}">
         <p14:creationId xmlns:p14="http://schemas.microsoft.com/office/powerpoint/2010/main" val="3964402445"/>
-      </p:ext>
-    </p:extLst>
-  </p:cSld>
-  <p:clrMapOvr>
-    <a:masterClrMapping/>
-  </p:clrMapOvr>
-</p:notes>
-</file>
-
-<file path=ppt/notesSlides/notesSlide30.xml><?xml version="1.0" encoding="utf-8"?>
-<p:notes xmlns:a="http://schemas.openxmlformats.org/drawingml/2006/main" xmlns:r="http://schemas.openxmlformats.org/officeDocument/2006/relationships" xmlns:p="http://schemas.openxmlformats.org/presentationml/2006/main">
-  <p:cSld>
-    <p:spTree>
-      <p:nvGrpSpPr>
-        <p:cNvPr id="1" name=""/>
-        <p:cNvGrpSpPr/>
-        <p:nvPr/>
-      </p:nvGrpSpPr>
-      <p:grpSpPr>
-        <a:xfrm>
-          <a:off x="0" y="0"/>
-          <a:ext cx="0" cy="0"/>
-          <a:chOff x="0" y="0"/>
-          <a:chExt cx="0" cy="0"/>
-        </a:xfrm>
-      </p:grpSpPr>
-      <p:sp>
-        <p:nvSpPr>
-          <p:cNvPr id="2" name="Slide Image Placeholder 1"/>
-          <p:cNvSpPr>
-            <a:spLocks noGrp="1" noRot="1" noChangeAspect="1"/>
-          </p:cNvSpPr>
-          <p:nvPr>
-            <p:ph type="sldImg"/>
-          </p:nvPr>
-        </p:nvSpPr>
-        <p:spPr/>
-      </p:sp>
-      <p:sp>
-        <p:nvSpPr>
-          <p:cNvPr id="3" name="Notes Placeholder 2"/>
-          <p:cNvSpPr>
-            <a:spLocks noGrp="1"/>
-          </p:cNvSpPr>
-          <p:nvPr>
-            <p:ph type="body" idx="1"/>
-          </p:nvPr>
-        </p:nvSpPr>
-        <p:spPr/>
-        <p:txBody>
-          <a:bodyPr>
-            <a:normAutofit fontScale="70000" lnSpcReduction="20000"/>
-          </a:bodyPr>
-          <a:lstStyle/>
-          <a:p>
-            <a:pPr marL="0" marR="0" indent="0" algn="l" defTabSz="1217613" rtl="0" eaLnBrk="1" fontAlgn="base" latinLnBrk="0" hangingPunct="1">
-              <a:lnSpc>
-                <a:spcPct val="90000"/>
-              </a:lnSpc>
-              <a:spcBef>
-                <a:spcPct val="30000"/>
-              </a:spcBef>
-              <a:spcAft>
-                <a:spcPts val="450"/>
-              </a:spcAft>
-              <a:buClrTx/>
-              <a:buSzTx/>
-              <a:buFontTx/>
-              <a:buNone/>
-              <a:tabLst/>
-              <a:defRPr/>
-            </a:pPr>
-            <a:r>
-              <a:rPr lang="en-US" dirty="0" smtClean="0"/>
-              <a:t>The answer is, as you write controls, </a:t>
-            </a:r>
-            <a:r>
-              <a:rPr lang="en-US" dirty="0" err="1" smtClean="0"/>
-              <a:t>InSpec</a:t>
-            </a:r>
-            <a:r>
-              <a:rPr lang="en-US" dirty="0" smtClean="0"/>
-              <a:t> expects a `test` directory at the same</a:t>
-            </a:r>
-            <a:r>
-              <a:rPr lang="en-US" baseline="0" dirty="0" smtClean="0"/>
-              <a:t> </a:t>
-            </a:r>
-            <a:r>
-              <a:rPr lang="en-US" dirty="0" smtClean="0"/>
-              <a:t>level as the metadata.rb.</a:t>
-            </a:r>
-          </a:p>
-          <a:p>
-            <a:r>
-              <a:rPr lang="en-US" dirty="0" smtClean="0"/>
-              <a:t/>
-            </a:r>
-            <a:br>
-              <a:rPr lang="en-US" dirty="0" smtClean="0"/>
-            </a:br>
-            <a:r>
-              <a:rPr lang="en-US" dirty="0" smtClean="0"/>
-              <a:t>├── README.md</a:t>
-            </a:r>
-            <a:br>
-              <a:rPr lang="en-US" dirty="0" smtClean="0"/>
-            </a:br>
-            <a:r>
-              <a:rPr lang="en-US" dirty="0" smtClean="0"/>
-              <a:t>├── metadata.rb</a:t>
-            </a:r>
-            <a:br>
-              <a:rPr lang="en-US" dirty="0" smtClean="0"/>
-            </a:br>
-            <a:r>
-              <a:rPr lang="en-US" dirty="0" smtClean="0"/>
-              <a:t>└── test</a:t>
-            </a:r>
-            <a:br>
-              <a:rPr lang="en-US" dirty="0" smtClean="0"/>
-            </a:br>
-            <a:r>
-              <a:rPr lang="en-US" dirty="0" smtClean="0"/>
-              <a:t>  ├── </a:t>
-            </a:r>
-            <a:r>
-              <a:rPr lang="en-US" dirty="0" err="1" smtClean="0"/>
-              <a:t>foo_spec.rb</a:t>
-            </a:r>
-            <a:r>
-              <a:rPr lang="en-US" dirty="0" smtClean="0"/>
-              <a:t/>
-            </a:r>
-            <a:br>
-              <a:rPr lang="en-US" dirty="0" smtClean="0"/>
-            </a:br>
-            <a:r>
-              <a:rPr lang="en-US" dirty="0" smtClean="0"/>
-              <a:t>  └── </a:t>
-            </a:r>
-            <a:r>
-              <a:rPr lang="en-US" dirty="0" err="1" smtClean="0"/>
-              <a:t>bar_spec.rb</a:t>
-            </a:r>
-            <a:endParaRPr lang="en-US" dirty="0" smtClean="0"/>
-          </a:p>
-          <a:p>
-            <a:endParaRPr lang="en-US" dirty="0" smtClean="0"/>
-          </a:p>
-          <a:p>
-            <a:endParaRPr lang="en-US" dirty="0" smtClean="0"/>
-          </a:p>
-          <a:p>
-            <a:endParaRPr lang="en-US" dirty="0" smtClean="0"/>
-          </a:p>
-          <a:p>
-            <a:endParaRPr lang="en-US" dirty="0" smtClean="0"/>
-          </a:p>
-          <a:p>
-            <a:r>
-              <a:rPr lang="en-US" dirty="0" smtClean="0"/>
-              <a:t>https://github.com/chef/inspec/blob/7f555b902d6860ffe236ff23e4b52f20bac28adc/lib/inspec/profile.rb#L81-L129</a:t>
-            </a:r>
-          </a:p>
-          <a:p>
-            <a:endParaRPr lang="en-US" dirty="0" smtClean="0"/>
-          </a:p>
-          <a:p>
-            <a:pPr marL="0" marR="0" indent="0" algn="l" defTabSz="1217613" rtl="0" eaLnBrk="1" fontAlgn="base" latinLnBrk="0" hangingPunct="1">
-              <a:lnSpc>
-                <a:spcPct val="90000"/>
-              </a:lnSpc>
-              <a:spcBef>
-                <a:spcPct val="30000"/>
-              </a:spcBef>
-              <a:spcAft>
-                <a:spcPts val="450"/>
-              </a:spcAft>
-              <a:buClrTx/>
-              <a:buSzTx/>
-              <a:buFontTx/>
-              <a:buNone/>
-              <a:tabLst/>
-              <a:defRPr/>
-            </a:pPr>
-            <a:endParaRPr lang="en-US" baseline="0" dirty="0" smtClean="0"/>
-          </a:p>
-          <a:p>
-            <a:r>
-              <a:rPr lang="en-US" sz="1200" b="1" i="0" kern="1200" dirty="0" smtClean="0">
-                <a:solidFill>
-                  <a:schemeClr val="tx1"/>
-                </a:solidFill>
-                <a:effectLst/>
-                <a:latin typeface="Arial" panose="020B0604020202020204" pitchFamily="34" charset="0"/>
-                <a:ea typeface="ＭＳ Ｐゴシック" charset="0"/>
-                <a:cs typeface="Arial" panose="020B0604020202020204" pitchFamily="34" charset="0"/>
-              </a:rPr>
-              <a:t>Adding profiles</a:t>
-            </a:r>
-          </a:p>
-          <a:p>
-            <a:r>
-              <a:rPr lang="en-US" sz="1200" b="0" i="0" kern="1200" dirty="0" smtClean="0">
-                <a:solidFill>
-                  <a:schemeClr val="tx1"/>
-                </a:solidFill>
-                <a:effectLst/>
-                <a:latin typeface="Arial" panose="020B0604020202020204" pitchFamily="34" charset="0"/>
-                <a:ea typeface="ＭＳ Ｐゴシック" charset="0"/>
-                <a:cs typeface="Arial" panose="020B0604020202020204" pitchFamily="34" charset="0"/>
-              </a:rPr>
-              <a:t>Compliance profiles must be packaged in to a .tar.gz or .zip file to be uploaded to the Compliance Server. </a:t>
-            </a:r>
-          </a:p>
-          <a:p>
-            <a:r>
-              <a:rPr lang="en-US" sz="1200" b="0" i="0" kern="1200" dirty="0" smtClean="0">
-                <a:solidFill>
-                  <a:schemeClr val="tx1"/>
-                </a:solidFill>
-                <a:effectLst/>
-                <a:latin typeface="Arial" panose="020B0604020202020204" pitchFamily="34" charset="0"/>
-                <a:ea typeface="ＭＳ Ｐゴシック" charset="0"/>
-                <a:cs typeface="Arial" panose="020B0604020202020204" pitchFamily="34" charset="0"/>
-              </a:rPr>
-              <a:t>The directory structure is as follows (note, this is subject to change.  TODO: link to official docs when </a:t>
-            </a:r>
-            <a:r>
-              <a:rPr lang="en-US" sz="1200" b="0" i="0" kern="1200" dirty="0" err="1" smtClean="0">
-                <a:solidFill>
-                  <a:schemeClr val="tx1"/>
-                </a:solidFill>
-                <a:effectLst/>
-                <a:latin typeface="Arial" panose="020B0604020202020204" pitchFamily="34" charset="0"/>
-                <a:ea typeface="ＭＳ Ｐゴシック" charset="0"/>
-                <a:cs typeface="Arial" panose="020B0604020202020204" pitchFamily="34" charset="0"/>
-              </a:rPr>
-              <a:t>availalble</a:t>
-            </a:r>
-            <a:r>
-              <a:rPr lang="en-US" sz="1200" b="0" i="0" kern="1200" dirty="0" smtClean="0">
-                <a:solidFill>
-                  <a:schemeClr val="tx1"/>
-                </a:solidFill>
-                <a:effectLst/>
-                <a:latin typeface="Arial" panose="020B0604020202020204" pitchFamily="34" charset="0"/>
-                <a:ea typeface="ＭＳ Ｐゴシック" charset="0"/>
-                <a:cs typeface="Arial" panose="020B0604020202020204" pitchFamily="34" charset="0"/>
-              </a:rPr>
-              <a:t>):</a:t>
-            </a:r>
-          </a:p>
-          <a:p>
-            <a:r>
-              <a:rPr lang="en-US" sz="1200" b="0" i="0" kern="1200" dirty="0" smtClean="0">
-                <a:solidFill>
-                  <a:schemeClr val="tx1"/>
-                </a:solidFill>
-                <a:effectLst/>
-                <a:latin typeface="Arial" panose="020B0604020202020204" pitchFamily="34" charset="0"/>
-                <a:ea typeface="ＭＳ Ｐゴシック" charset="0"/>
-                <a:cs typeface="Arial" panose="020B0604020202020204" pitchFamily="34" charset="0"/>
-              </a:rPr>
-              <a:t>xyz.zip:</a:t>
-            </a:r>
-          </a:p>
-          <a:p>
-            <a:r>
-              <a:rPr lang="en-US" dirty="0" smtClean="0"/>
-              <a:t>.</a:t>
-            </a:r>
-            <a:br>
-              <a:rPr lang="en-US" dirty="0" smtClean="0"/>
-            </a:br>
-            <a:r>
-              <a:rPr lang="en-US" dirty="0" smtClean="0"/>
-              <a:t>├── README.md</a:t>
-            </a:r>
-            <a:br>
-              <a:rPr lang="en-US" dirty="0" smtClean="0"/>
-            </a:br>
-            <a:r>
-              <a:rPr lang="en-US" dirty="0" smtClean="0"/>
-              <a:t>├── metadata.rb</a:t>
-            </a:r>
-            <a:br>
-              <a:rPr lang="en-US" dirty="0" smtClean="0"/>
-            </a:br>
-            <a:r>
-              <a:rPr lang="en-US" dirty="0" smtClean="0"/>
-              <a:t>└── test</a:t>
-            </a:r>
-            <a:br>
-              <a:rPr lang="en-US" dirty="0" smtClean="0"/>
-            </a:br>
-            <a:r>
-              <a:rPr lang="en-US" dirty="0" smtClean="0"/>
-              <a:t>  ├── </a:t>
-            </a:r>
-            <a:r>
-              <a:rPr lang="en-US" dirty="0" err="1" smtClean="0"/>
-              <a:t>foo_spec.rb</a:t>
-            </a:r>
-            <a:r>
-              <a:rPr lang="en-US" dirty="0" smtClean="0"/>
-              <a:t/>
-            </a:r>
-            <a:br>
-              <a:rPr lang="en-US" dirty="0" smtClean="0"/>
-            </a:br>
-            <a:r>
-              <a:rPr lang="en-US" dirty="0" smtClean="0"/>
-              <a:t>  └── </a:t>
-            </a:r>
-            <a:r>
-              <a:rPr lang="en-US" dirty="0" err="1" smtClean="0"/>
-              <a:t>bar_spec.rb</a:t>
-            </a:r>
-            <a:endParaRPr lang="en-US" dirty="0" smtClean="0"/>
-          </a:p>
-          <a:p>
-            <a:endParaRPr lang="en-US" dirty="0" smtClean="0"/>
-          </a:p>
-          <a:p>
-            <a:r>
-              <a:rPr lang="en-US" dirty="0" smtClean="0"/>
-              <a:t>As you write controls, </a:t>
-            </a:r>
-            <a:r>
-              <a:rPr lang="en-US" dirty="0" err="1" smtClean="0"/>
-              <a:t>InSpec</a:t>
-            </a:r>
-            <a:r>
-              <a:rPr lang="en-US" dirty="0" smtClean="0"/>
-              <a:t> requires a `test` directory since it </a:t>
-            </a:r>
-            <a:r>
-              <a:rPr lang="en-US" dirty="0" err="1" smtClean="0"/>
-              <a:t>InSpec</a:t>
-            </a:r>
-            <a:r>
-              <a:rPr lang="en-US" dirty="0" smtClean="0"/>
-              <a:t> expect this structure.</a:t>
-            </a:r>
-          </a:p>
-        </p:txBody>
-      </p:sp>
-      <p:sp>
-        <p:nvSpPr>
-          <p:cNvPr id="4" name="Slide Number Placeholder 3"/>
-          <p:cNvSpPr>
-            <a:spLocks noGrp="1"/>
-          </p:cNvSpPr>
-          <p:nvPr>
-            <p:ph type="sldNum" sz="quarter" idx="10"/>
-          </p:nvPr>
-        </p:nvSpPr>
-        <p:spPr/>
-        <p:txBody>
-          <a:bodyPr/>
-          <a:lstStyle/>
-          <a:p>
-            <a:pPr>
-              <a:defRPr/>
-            </a:pPr>
-            <a:fld id="{DC3734AA-3150-D947-AC52-2F5DF48BFCD5}" type="slidenum">
-              <a:rPr lang="en-US" smtClean="0"/>
-              <a:pPr>
-                <a:defRPr/>
-              </a:pPr>
-              <a:t>33</a:t>
-            </a:fld>
-            <a:endParaRPr lang="en-US" dirty="0"/>
-          </a:p>
-        </p:txBody>
-      </p:sp>
-      <p:sp>
-        <p:nvSpPr>
-          <p:cNvPr id="5" name="Header Placeholder 4"/>
-          <p:cNvSpPr>
-            <a:spLocks noGrp="1"/>
-          </p:cNvSpPr>
-          <p:nvPr>
-            <p:ph type="hdr" sz="quarter" idx="11"/>
-          </p:nvPr>
-        </p:nvSpPr>
-        <p:spPr/>
-        <p:txBody>
-          <a:bodyPr/>
-          <a:lstStyle/>
-          <a:p>
-            <a:pPr>
-              <a:defRPr/>
-            </a:pPr>
-            <a:endParaRPr lang="en-US"/>
-          </a:p>
-        </p:txBody>
-      </p:sp>
-      <p:sp>
-        <p:nvSpPr>
-          <p:cNvPr id="6" name="Footer Placeholder 5"/>
-          <p:cNvSpPr>
-            <a:spLocks noGrp="1"/>
-          </p:cNvSpPr>
-          <p:nvPr>
-            <p:ph type="ftr" sz="quarter" idx="12"/>
-          </p:nvPr>
-        </p:nvSpPr>
-        <p:spPr/>
-        <p:txBody>
-          <a:bodyPr/>
-          <a:lstStyle/>
-          <a:p>
-            <a:pPr>
-              <a:defRPr/>
-            </a:pPr>
-            <a:endParaRPr lang="en-US"/>
-          </a:p>
-        </p:txBody>
-      </p:sp>
-    </p:spTree>
-    <p:extLst>
-      <p:ext uri="{BB962C8B-B14F-4D97-AF65-F5344CB8AC3E}">
-        <p14:creationId xmlns:p14="http://schemas.microsoft.com/office/powerpoint/2010/main" val="214120394"/>
       </p:ext>
     </p:extLst>
   </p:cSld>
@@ -8776,6 +7587,82 @@
               <a:rPr lang="en-US" baseline="0" dirty="0" smtClean="0"/>
               <a:t>- the error is not explicit of what's wrong.</a:t>
             </a:r>
+          </a:p>
+          <a:p>
+            <a:r>
+              <a:rPr lang="en-US" dirty="0" smtClean="0">
+                <a:effectLst/>
+              </a:rPr>
+              <a:t>This is bad programming error</a:t>
+            </a:r>
+            <a:r>
+              <a:rPr lang="en-US" i="1" dirty="0" smtClean="0">
+                <a:effectLst/>
+              </a:rPr>
+              <a:t/>
+            </a:r>
+            <a:br>
+              <a:rPr lang="en-US" i="1" dirty="0" smtClean="0">
+                <a:effectLst/>
+              </a:rPr>
+            </a:br>
+            <a:r>
+              <a:rPr lang="en-US" dirty="0" smtClean="0">
+                <a:effectLst/>
+              </a:rPr>
+              <a:t>its basically spitting out a null (which is I </a:t>
+            </a:r>
+            <a:r>
+              <a:rPr lang="en-US" dirty="0" err="1" smtClean="0">
+                <a:effectLst/>
+              </a:rPr>
+              <a:t>dont</a:t>
+            </a:r>
+            <a:r>
+              <a:rPr lang="en-US" dirty="0" smtClean="0">
+                <a:effectLst/>
+              </a:rPr>
+              <a:t> know what broke) error</a:t>
+            </a:r>
+            <a:br>
+              <a:rPr lang="en-US" dirty="0" smtClean="0">
+                <a:effectLst/>
+              </a:rPr>
+            </a:br>
+            <a:r>
+              <a:rPr lang="en-US" dirty="0" smtClean="0">
+                <a:effectLst/>
+              </a:rPr>
+              <a:t>The next release of compliance should fix this</a:t>
+            </a:r>
+          </a:p>
+          <a:p>
+            <a:r>
+              <a:rPr lang="en-US" dirty="0" smtClean="0">
+                <a:effectLst/>
+              </a:rPr>
+              <a:t>It should give very explicit warnings/errors around functionality rather than exposing inner workings of the programming</a:t>
+            </a:r>
+          </a:p>
+          <a:p>
+            <a:pPr marL="0" marR="0" indent="0" algn="l" defTabSz="1217613" rtl="0" eaLnBrk="1" fontAlgn="base" latinLnBrk="0" hangingPunct="1">
+              <a:lnSpc>
+                <a:spcPct val="90000"/>
+              </a:lnSpc>
+              <a:spcBef>
+                <a:spcPct val="30000"/>
+              </a:spcBef>
+              <a:spcAft>
+                <a:spcPts val="450"/>
+              </a:spcAft>
+              <a:buClrTx/>
+              <a:buSzTx/>
+              <a:buFontTx/>
+              <a:buNone/>
+              <a:tabLst/>
+              <a:defRPr/>
+            </a:pPr>
+            <a:endParaRPr lang="en-US" baseline="0" dirty="0" smtClean="0"/>
           </a:p>
         </p:txBody>
       </p:sp>
@@ -9430,14 +8317,14 @@
           </a:ln>
           <a:extLst>
             <a:ext uri="{909E8E84-426E-40dd-AFC4-6F175D3DCCD1}">
-              <a14:hiddenFill xmlns:a14="http://schemas.microsoft.com/office/drawing/2010/main" xmlns="">
+              <a14:hiddenFill xmlns="" xmlns:a14="http://schemas.microsoft.com/office/drawing/2010/main">
                 <a:solidFill>
                   <a:srgbClr val="FFFFFF"/>
                 </a:solidFill>
               </a14:hiddenFill>
             </a:ext>
             <a:ext uri="{91240B29-F687-4f45-9708-019B960494DF}">
-              <a14:hiddenLine xmlns:a14="http://schemas.microsoft.com/office/drawing/2010/main" xmlns="" w="9525">
+              <a14:hiddenLine xmlns="" xmlns:a14="http://schemas.microsoft.com/office/drawing/2010/main" w="9525">
                 <a:solidFill>
                   <a:srgbClr val="000000"/>
                 </a:solidFill>
@@ -9585,14 +8472,14 @@
           </a:ln>
           <a:extLst>
             <a:ext uri="{909E8E84-426E-40dd-AFC4-6F175D3DCCD1}">
-              <a14:hiddenFill xmlns:a14="http://schemas.microsoft.com/office/drawing/2010/main" xmlns="">
+              <a14:hiddenFill xmlns="" xmlns:a14="http://schemas.microsoft.com/office/drawing/2010/main">
                 <a:solidFill>
                   <a:srgbClr val="FFFFFF"/>
                 </a:solidFill>
               </a14:hiddenFill>
             </a:ext>
             <a:ext uri="{91240B29-F687-4f45-9708-019B960494DF}">
-              <a14:hiddenLine xmlns:a14="http://schemas.microsoft.com/office/drawing/2010/main" xmlns="" w="9525">
+              <a14:hiddenLine xmlns="" xmlns:a14="http://schemas.microsoft.com/office/drawing/2010/main" w="9525">
                 <a:solidFill>
                   <a:srgbClr val="000000"/>
                 </a:solidFill>
@@ -10083,14 +8970,14 @@
           </a:ln>
           <a:extLst>
             <a:ext uri="{909E8E84-426E-40dd-AFC4-6F175D3DCCD1}">
-              <a14:hiddenFill xmlns:a14="http://schemas.microsoft.com/office/drawing/2010/main" xmlns="">
+              <a14:hiddenFill xmlns="" xmlns:a14="http://schemas.microsoft.com/office/drawing/2010/main">
                 <a:solidFill>
                   <a:srgbClr val="FFFFFF"/>
                 </a:solidFill>
               </a14:hiddenFill>
             </a:ext>
             <a:ext uri="{91240B29-F687-4f45-9708-019B960494DF}">
-              <a14:hiddenLine xmlns:a14="http://schemas.microsoft.com/office/drawing/2010/main" xmlns="" w="9525">
+              <a14:hiddenLine xmlns="" xmlns:a14="http://schemas.microsoft.com/office/drawing/2010/main" w="9525">
                 <a:solidFill>
                   <a:srgbClr val="000000"/>
                 </a:solidFill>
@@ -10616,14 +9503,14 @@
           </a:ln>
           <a:extLst>
             <a:ext uri="{909E8E84-426E-40dd-AFC4-6F175D3DCCD1}">
-              <a14:hiddenFill xmlns:a14="http://schemas.microsoft.com/office/drawing/2010/main" xmlns="">
+              <a14:hiddenFill xmlns="" xmlns:a14="http://schemas.microsoft.com/office/drawing/2010/main">
                 <a:solidFill>
                   <a:srgbClr val="FFFFFF"/>
                 </a:solidFill>
               </a14:hiddenFill>
             </a:ext>
             <a:ext uri="{91240B29-F687-4f45-9708-019B960494DF}">
-              <a14:hiddenLine xmlns:a14="http://schemas.microsoft.com/office/drawing/2010/main" xmlns="" w="9525">
+              <a14:hiddenLine xmlns="" xmlns:a14="http://schemas.microsoft.com/office/drawing/2010/main" w="9525">
                 <a:solidFill>
                   <a:srgbClr val="000000"/>
                 </a:solidFill>
@@ -12247,14 +11134,14 @@
           </a:ln>
           <a:extLst>
             <a:ext uri="{909E8E84-426E-40dd-AFC4-6F175D3DCCD1}">
-              <a14:hiddenFill xmlns:a14="http://schemas.microsoft.com/office/drawing/2010/main" xmlns="">
+              <a14:hiddenFill xmlns="" xmlns:a14="http://schemas.microsoft.com/office/drawing/2010/main">
                 <a:solidFill>
                   <a:srgbClr val="FFFFFF"/>
                 </a:solidFill>
               </a14:hiddenFill>
             </a:ext>
             <a:ext uri="{91240B29-F687-4f45-9708-019B960494DF}">
-              <a14:hiddenLine xmlns:a14="http://schemas.microsoft.com/office/drawing/2010/main" xmlns="" w="9525">
+              <a14:hiddenLine xmlns="" xmlns:a14="http://schemas.microsoft.com/office/drawing/2010/main" w="9525">
                 <a:solidFill>
                   <a:srgbClr val="000000"/>
                 </a:solidFill>
@@ -13608,14 +12495,14 @@
           </a:ln>
           <a:extLst>
             <a:ext uri="{909E8E84-426E-40dd-AFC4-6F175D3DCCD1}">
-              <a14:hiddenFill xmlns:a14="http://schemas.microsoft.com/office/drawing/2010/main" xmlns="">
+              <a14:hiddenFill xmlns="" xmlns:a14="http://schemas.microsoft.com/office/drawing/2010/main">
                 <a:solidFill>
                   <a:srgbClr val="FFFFFF"/>
                 </a:solidFill>
               </a14:hiddenFill>
             </a:ext>
             <a:ext uri="{91240B29-F687-4f45-9708-019B960494DF}">
-              <a14:hiddenLine xmlns:a14="http://schemas.microsoft.com/office/drawing/2010/main" xmlns="" w="9525">
+              <a14:hiddenLine xmlns="" xmlns:a14="http://schemas.microsoft.com/office/drawing/2010/main" w="9525">
                 <a:solidFill>
                   <a:srgbClr val="000000"/>
                 </a:solidFill>
@@ -14121,14 +13008,14 @@
           </a:ln>
           <a:extLst>
             <a:ext uri="{909E8E84-426E-40dd-AFC4-6F175D3DCCD1}">
-              <a14:hiddenFill xmlns:a14="http://schemas.microsoft.com/office/drawing/2010/main" xmlns="">
+              <a14:hiddenFill xmlns="" xmlns:a14="http://schemas.microsoft.com/office/drawing/2010/main">
                 <a:solidFill>
                   <a:srgbClr val="FFFFFF"/>
                 </a:solidFill>
               </a14:hiddenFill>
             </a:ext>
             <a:ext uri="{91240B29-F687-4f45-9708-019B960494DF}">
-              <a14:hiddenLine xmlns:a14="http://schemas.microsoft.com/office/drawing/2010/main" xmlns="" w="9525">
+              <a14:hiddenLine xmlns="" xmlns:a14="http://schemas.microsoft.com/office/drawing/2010/main" w="9525">
                 <a:solidFill>
                   <a:srgbClr val="000000"/>
                 </a:solidFill>
@@ -14695,14 +13582,14 @@
           </a:ln>
           <a:extLst>
             <a:ext uri="{909E8E84-426E-40dd-AFC4-6F175D3DCCD1}">
-              <a14:hiddenFill xmlns:a14="http://schemas.microsoft.com/office/drawing/2010/main" xmlns="">
+              <a14:hiddenFill xmlns="" xmlns:a14="http://schemas.microsoft.com/office/drawing/2010/main">
                 <a:solidFill>
                   <a:srgbClr val="FFFFFF"/>
                 </a:solidFill>
               </a14:hiddenFill>
             </a:ext>
             <a:ext uri="{91240B29-F687-4f45-9708-019B960494DF}">
-              <a14:hiddenLine xmlns:a14="http://schemas.microsoft.com/office/drawing/2010/main" xmlns="" w="9525">
+              <a14:hiddenLine xmlns="" xmlns:a14="http://schemas.microsoft.com/office/drawing/2010/main" w="9525">
                 <a:solidFill>
                   <a:srgbClr val="000000"/>
                 </a:solidFill>
@@ -15642,14 +14529,14 @@
           </a:ln>
           <a:extLst>
             <a:ext uri="{909E8E84-426E-40dd-AFC4-6F175D3DCCD1}">
-              <a14:hiddenFill xmlns:a14="http://schemas.microsoft.com/office/drawing/2010/main" xmlns="">
+              <a14:hiddenFill xmlns="" xmlns:a14="http://schemas.microsoft.com/office/drawing/2010/main">
                 <a:solidFill>
                   <a:srgbClr val="FFFFFF"/>
                 </a:solidFill>
               </a14:hiddenFill>
             </a:ext>
             <a:ext uri="{91240B29-F687-4f45-9708-019B960494DF}">
-              <a14:hiddenLine xmlns:a14="http://schemas.microsoft.com/office/drawing/2010/main" xmlns="" w="9525">
+              <a14:hiddenLine xmlns="" xmlns:a14="http://schemas.microsoft.com/office/drawing/2010/main" w="9525">
                 <a:solidFill>
                   <a:srgbClr val="000000"/>
                 </a:solidFill>
@@ -16402,14 +15289,14 @@
           </a:ln>
           <a:extLst>
             <a:ext uri="{909E8E84-426E-40dd-AFC4-6F175D3DCCD1}">
-              <a14:hiddenFill xmlns:a14="http://schemas.microsoft.com/office/drawing/2010/main" xmlns="">
+              <a14:hiddenFill xmlns="" xmlns:a14="http://schemas.microsoft.com/office/drawing/2010/main">
                 <a:solidFill>
                   <a:srgbClr val="FFFFFF"/>
                 </a:solidFill>
               </a14:hiddenFill>
             </a:ext>
             <a:ext uri="{91240B29-F687-4f45-9708-019B960494DF}">
-              <a14:hiddenLine xmlns:a14="http://schemas.microsoft.com/office/drawing/2010/main" xmlns="" w="9525">
+              <a14:hiddenLine xmlns="" xmlns:a14="http://schemas.microsoft.com/office/drawing/2010/main" w="9525">
                 <a:solidFill>
                   <a:srgbClr val="000000"/>
                 </a:solidFill>
@@ -18666,6 +17553,31 @@
               <a:rPr lang="en-US" b="1" dirty="0" err="1" smtClean="0"/>
               <a:t>tmp.rb</a:t>
             </a:r>
+            <a:endParaRPr lang="en-US" b="1" dirty="0" smtClean="0"/>
+          </a:p>
+          <a:p>
+            <a:r>
+              <a:rPr lang="en-US" dirty="0"/>
+              <a:t>I, </a:t>
+            </a:r>
+            <a:r>
+              <a:rPr lang="en-US" dirty="0" smtClean="0"/>
+              <a:t>[</a:t>
+            </a:r>
+            <a:r>
+              <a:rPr lang="en-US" dirty="0"/>
+              <a:t>2015-12-11T22:53:24.912617 #16092</a:t>
+            </a:r>
+            <a:r>
+              <a:rPr lang="en-US" dirty="0" smtClean="0"/>
+              <a:t>]  </a:t>
+            </a:r>
+            <a:r>
+              <a:rPr lang="en-US" dirty="0"/>
+              <a:t>INFO -- : Rule definitions OK.</a:t>
+            </a:r>
+          </a:p>
+          <a:p>
             <a:endParaRPr lang="en-US" b="1" dirty="0"/>
           </a:p>
         </p:txBody>
@@ -18754,8 +17666,8 @@
         </p:nvSpPr>
         <p:spPr bwMode="auto">
           <a:xfrm>
-            <a:off x="1121104" y="4297680"/>
-            <a:ext cx="14431939" cy="994582"/>
+            <a:off x="1115230" y="4392421"/>
+            <a:ext cx="14431939" cy="1936189"/>
           </a:xfrm>
           <a:prstGeom prst="rect">
             <a:avLst/>
@@ -19859,15 +18771,7 @@
           <a:p>
             <a:r>
               <a:rPr lang="en-US" dirty="0" smtClean="0"/>
-              <a:t>GL: From </a:t>
-            </a:r>
-            <a:r>
-              <a:rPr lang="en-US" dirty="0" smtClean="0"/>
-              <a:t>Your </a:t>
-            </a:r>
-            <a:r>
-              <a:rPr lang="en-US" dirty="0" smtClean="0"/>
-              <a:t>Laptop Run the </a:t>
+              <a:t>GL: From Your Laptop Run the </a:t>
             </a:r>
             <a:r>
               <a:rPr lang="en-US" dirty="0" err="1" smtClean="0"/>
@@ -21021,7 +19925,7 @@
         <p:spPr>
           <a:xfrm>
             <a:off x="297180" y="1856198"/>
-            <a:ext cx="15544800" cy="5345953"/>
+            <a:ext cx="15958820" cy="5345953"/>
           </a:xfrm>
         </p:spPr>
         <p:txBody>
@@ -21030,7 +19934,7 @@
           <a:p>
             <a:r>
               <a:rPr lang="en-US" dirty="0" smtClean="0"/>
-              <a:t>You should also be able to see your custom profile from your Compliance page.</a:t>
+              <a:t>You should also be able to see your custom profile from your Compliance profiles page.</a:t>
             </a:r>
           </a:p>
           <a:p>
@@ -21430,1631 +20334,6 @@
 <file path=ppt/slides/slide30.xml><?xml version="1.0" encoding="utf-8"?>
 <p:sld xmlns:a="http://schemas.openxmlformats.org/drawingml/2006/main" xmlns:r="http://schemas.openxmlformats.org/officeDocument/2006/relationships" xmlns:p="http://schemas.openxmlformats.org/presentationml/2006/main">
   <p:cSld>
-    <p:spTree>
-      <p:nvGrpSpPr>
-        <p:cNvPr id="1" name=""/>
-        <p:cNvGrpSpPr/>
-        <p:nvPr/>
-      </p:nvGrpSpPr>
-      <p:grpSpPr>
-        <a:xfrm>
-          <a:off x="0" y="0"/>
-          <a:ext cx="0" cy="0"/>
-          <a:chOff x="0" y="0"/>
-          <a:chExt cx="0" cy="0"/>
-        </a:xfrm>
-      </p:grpSpPr>
-      <p:sp>
-        <p:nvSpPr>
-          <p:cNvPr id="2" name="Title 1"/>
-          <p:cNvSpPr>
-            <a:spLocks noGrp="1"/>
-          </p:cNvSpPr>
-          <p:nvPr>
-            <p:ph type="title"/>
-          </p:nvPr>
-        </p:nvSpPr>
-        <p:spPr/>
-        <p:txBody>
-          <a:bodyPr>
-            <a:normAutofit/>
-          </a:bodyPr>
-          <a:lstStyle/>
-          <a:p>
-            <a:r>
-              <a:rPr lang="en-US" dirty="0" smtClean="0"/>
-              <a:t>GL: </a:t>
-            </a:r>
-            <a:r>
-              <a:rPr lang="en-US" dirty="0" smtClean="0">
-                <a:solidFill>
-                  <a:srgbClr val="FF0000"/>
-                </a:solidFill>
-              </a:rPr>
-              <a:t>TBD from here to end</a:t>
-            </a:r>
-            <a:endParaRPr lang="en-US" dirty="0">
-              <a:solidFill>
-                <a:srgbClr val="FF0000"/>
-              </a:solidFill>
-            </a:endParaRPr>
-          </a:p>
-        </p:txBody>
-      </p:sp>
-      <p:sp>
-        <p:nvSpPr>
-          <p:cNvPr id="6" name="Text Placeholder 2"/>
-          <p:cNvSpPr>
-            <a:spLocks noGrp="1"/>
-          </p:cNvSpPr>
-          <p:nvPr>
-            <p:ph type="body" sz="quarter" idx="12"/>
-          </p:nvPr>
-        </p:nvSpPr>
-        <p:spPr>
-          <a:xfrm>
-            <a:off x="448573" y="1354386"/>
-            <a:ext cx="14685690" cy="5345953"/>
-          </a:xfrm>
-        </p:spPr>
-        <p:txBody>
-          <a:bodyPr/>
-          <a:lstStyle/>
-          <a:p>
-            <a:r>
-              <a:rPr lang="en-US" dirty="0" smtClean="0"/>
-              <a:t>Show how this is populated by /rb file - see next slide</a:t>
-            </a:r>
-          </a:p>
-          <a:p>
-            <a:r>
-              <a:rPr lang="en-US" dirty="0" smtClean="0"/>
-              <a:t>TBD- Show side by side metadata and </a:t>
-            </a:r>
-            <a:r>
-              <a:rPr lang="en-US" dirty="0" err="1" smtClean="0"/>
-              <a:t>Compl</a:t>
-            </a:r>
-            <a:r>
-              <a:rPr lang="en-US" dirty="0" smtClean="0"/>
-              <a:t> UI profile name to illustrate how the name field is populated.</a:t>
-            </a:r>
-          </a:p>
-          <a:p>
-            <a:endParaRPr lang="en-US" dirty="0"/>
-          </a:p>
-          <a:p>
-            <a:r>
-              <a:rPr lang="en-US" dirty="0" smtClean="0"/>
-              <a:t/>
-            </a:r>
-            <a:br>
-              <a:rPr lang="en-US" dirty="0" smtClean="0"/>
-            </a:br>
-            <a:r>
-              <a:rPr lang="en-US" dirty="0" smtClean="0"/>
-              <a:t/>
-            </a:r>
-            <a:br>
-              <a:rPr lang="en-US" dirty="0" smtClean="0"/>
-            </a:br>
-            <a:r>
-              <a:rPr lang="en-US" dirty="0" smtClean="0"/>
-              <a:t>    </a:t>
-            </a:r>
-          </a:p>
-          <a:p>
-            <a:endParaRPr lang="en-US" dirty="0" smtClean="0"/>
-          </a:p>
-          <a:p>
-            <a:pPr marL="457200" indent="-457200">
-              <a:buFont typeface="Arial" panose="020B0604020202020204" pitchFamily="34" charset="0"/>
-              <a:buChar char="•"/>
-            </a:pPr>
-            <a:endParaRPr lang="en-US" dirty="0"/>
-          </a:p>
-          <a:p>
-            <a:endParaRPr lang="en-US" dirty="0" smtClean="0"/>
-          </a:p>
-          <a:p>
-            <a:pPr marL="457200" indent="-457200">
-              <a:buFont typeface="Arial" panose="020B0604020202020204" pitchFamily="34" charset="0"/>
-              <a:buChar char="•"/>
-            </a:pPr>
-            <a:endParaRPr lang="en-US" dirty="0"/>
-          </a:p>
-        </p:txBody>
-      </p:sp>
-      <p:pic>
-        <p:nvPicPr>
-          <p:cNvPr id="3" name="Picture 2"/>
-          <p:cNvPicPr>
-            <a:picLocks noChangeAspect="1"/>
-          </p:cNvPicPr>
-          <p:nvPr/>
-        </p:nvPicPr>
-        <p:blipFill>
-          <a:blip r:embed="rId3"/>
-          <a:stretch>
-            <a:fillRect/>
-          </a:stretch>
-        </p:blipFill>
-        <p:spPr>
-          <a:xfrm>
-            <a:off x="2098894" y="3244645"/>
-            <a:ext cx="13035369" cy="4517208"/>
-          </a:xfrm>
-          <a:prstGeom prst="rect">
-            <a:avLst/>
-          </a:prstGeom>
-          <a:ln>
-            <a:solidFill>
-              <a:schemeClr val="accent1"/>
-            </a:solidFill>
-          </a:ln>
-        </p:spPr>
-      </p:pic>
-    </p:spTree>
-    <p:extLst>
-      <p:ext uri="{BB962C8B-B14F-4D97-AF65-F5344CB8AC3E}">
-        <p14:creationId xmlns:p14="http://schemas.microsoft.com/office/powerpoint/2010/main" val="3774323270"/>
-      </p:ext>
-    </p:extLst>
-  </p:cSld>
-  <p:clrMapOvr>
-    <a:masterClrMapping/>
-  </p:clrMapOvr>
-  <p:transition spd="med">
-    <p:fade/>
-  </p:transition>
-  <p:timing>
-    <p:tnLst>
-      <p:par>
-        <p:cTn id="1" dur="indefinite" restart="never" nodeType="tmRoot"/>
-      </p:par>
-    </p:tnLst>
-  </p:timing>
-</p:sld>
-</file>
-
-<file path=ppt/slides/slide31.xml><?xml version="1.0" encoding="utf-8"?>
-<p:sld xmlns:a="http://schemas.openxmlformats.org/drawingml/2006/main" xmlns:r="http://schemas.openxmlformats.org/officeDocument/2006/relationships" xmlns:p="http://schemas.openxmlformats.org/presentationml/2006/main">
-  <p:cSld>
-    <p:spTree>
-      <p:nvGrpSpPr>
-        <p:cNvPr id="1" name=""/>
-        <p:cNvGrpSpPr/>
-        <p:nvPr/>
-      </p:nvGrpSpPr>
-      <p:grpSpPr>
-        <a:xfrm>
-          <a:off x="0" y="0"/>
-          <a:ext cx="0" cy="0"/>
-          <a:chOff x="0" y="0"/>
-          <a:chExt cx="0" cy="0"/>
-        </a:xfrm>
-      </p:grpSpPr>
-      <p:sp>
-        <p:nvSpPr>
-          <p:cNvPr id="2" name="Title 1"/>
-          <p:cNvSpPr>
-            <a:spLocks noGrp="1"/>
-          </p:cNvSpPr>
-          <p:nvPr>
-            <p:ph type="title"/>
-          </p:nvPr>
-        </p:nvSpPr>
-        <p:spPr/>
-        <p:txBody>
-          <a:bodyPr/>
-          <a:lstStyle/>
-          <a:p>
-            <a:endParaRPr lang="en-US"/>
-          </a:p>
-        </p:txBody>
-      </p:sp>
-      <p:sp>
-        <p:nvSpPr>
-          <p:cNvPr id="4" name="Text Placeholder 3"/>
-          <p:cNvSpPr>
-            <a:spLocks noGrp="1"/>
-          </p:cNvSpPr>
-          <p:nvPr>
-            <p:ph type="body" sz="quarter" idx="11"/>
-          </p:nvPr>
-        </p:nvSpPr>
-        <p:spPr/>
-        <p:txBody>
-          <a:bodyPr/>
-          <a:lstStyle/>
-          <a:p>
-            <a:endParaRPr lang="en-US"/>
-          </a:p>
-        </p:txBody>
-      </p:sp>
-      <p:sp>
-        <p:nvSpPr>
-          <p:cNvPr id="7" name="Rectangle 1"/>
-          <p:cNvSpPr>
-            <a:spLocks noGrp="1" noChangeArrowheads="1"/>
-          </p:cNvSpPr>
-          <p:nvPr>
-            <p:ph sz="quarter" idx="10"/>
-          </p:nvPr>
-        </p:nvSpPr>
-        <p:spPr bwMode="auto">
-          <a:xfrm>
-            <a:off x="1121104" y="4258556"/>
-            <a:ext cx="10637527" cy="1661993"/>
-          </a:xfrm>
-          <a:prstGeom prst="rect">
-            <a:avLst/>
-          </a:prstGeom>
-          <a:solidFill>
-            <a:srgbClr val="F7F7F7"/>
-          </a:solidFill>
-          <a:ln>
-            <a:noFill/>
-          </a:ln>
-          <a:effectLst/>
-          <a:extLst>
-            <a:ext uri="{91240B29-F687-4f45-9708-019B960494DF}">
-              <a14:hiddenLine xmlns:a14="http://schemas.microsoft.com/office/drawing/2010/main" xmlns="" w="9525">
-                <a:solidFill>
-                  <a:schemeClr val="tx1"/>
-                </a:solidFill>
-                <a:miter lim="800000"/>
-                <a:headEnd/>
-                <a:tailEnd/>
-              </a14:hiddenLine>
-            </a:ext>
-            <a:ext uri="{AF507438-7753-43e0-B8FC-AC1667EBCBE1}">
-              <a14:hiddenEffects xmlns:a14="http://schemas.microsoft.com/office/drawing/2010/main" xmlns="">
-                <a:effectLst>
-                  <a:outerShdw dist="35921" dir="2700000" algn="ctr" rotWithShape="0">
-                    <a:schemeClr val="bg2"/>
-                  </a:outerShdw>
-                </a:effectLst>
-              </a14:hiddenEffects>
-            </a:ext>
-          </a:extLst>
-        </p:spPr>
-        <p:txBody>
-          <a:bodyPr vert="horz" wrap="none" lIns="0" tIns="0" rIns="0" bIns="0" numCol="1" anchor="ctr" anchorCtr="0" compatLnSpc="1">
-            <a:prstTxWarp prst="textNoShape">
-              <a:avLst/>
-            </a:prstTxWarp>
-            <a:spAutoFit/>
-          </a:bodyPr>
-          <a:lstStyle/>
-          <a:p>
-            <a:pPr marL="0" marR="0" lvl="0" indent="0" algn="l" defTabSz="914400" rtl="0" eaLnBrk="0" fontAlgn="base" latinLnBrk="0" hangingPunct="0">
-              <a:lnSpc>
-                <a:spcPct val="100000"/>
-              </a:lnSpc>
-              <a:spcBef>
-                <a:spcPct val="0"/>
-              </a:spcBef>
-              <a:spcAft>
-                <a:spcPct val="0"/>
-              </a:spcAft>
-              <a:buClrTx/>
-              <a:buSzTx/>
-              <a:buFontTx/>
-              <a:buNone/>
-              <a:tabLst/>
-            </a:pPr>
-            <a:r>
-              <a:rPr kumimoji="0" lang="en-US" altLang="en-US" sz="1800" b="0" i="0" u="none" strike="noStrike" cap="none" normalizeH="0" baseline="0" dirty="0" smtClean="0">
-                <a:ln>
-                  <a:noFill/>
-                </a:ln>
-                <a:solidFill>
-                  <a:srgbClr val="222222"/>
-                </a:solidFill>
-                <a:effectLst/>
-                <a:latin typeface="Helvetica" panose="020B0604020202020204" pitchFamily="34" charset="0"/>
-                <a:ea typeface="Calibri" panose="020F0502020204030204" pitchFamily="34" charset="0"/>
-                <a:cs typeface="Arial" panose="020B0604020202020204" pitchFamily="34" charset="0"/>
-              </a:rPr>
-              <a:t>Create /</a:t>
-            </a:r>
-            <a:r>
-              <a:rPr kumimoji="0" lang="en-US" altLang="en-US" sz="1800" b="0" i="0" u="none" strike="noStrike" cap="none" normalizeH="0" baseline="0" dirty="0" err="1" smtClean="0">
-                <a:ln>
-                  <a:noFill/>
-                </a:ln>
-                <a:solidFill>
-                  <a:srgbClr val="222222"/>
-                </a:solidFill>
-                <a:effectLst/>
-                <a:latin typeface="Helvetica" panose="020B0604020202020204" pitchFamily="34" charset="0"/>
-                <a:ea typeface="Calibri" panose="020F0502020204030204" pitchFamily="34" charset="0"/>
-                <a:cs typeface="Arial" panose="020B0604020202020204" pitchFamily="34" charset="0"/>
-              </a:rPr>
-              <a:t>tmp</a:t>
-            </a:r>
-            <a:r>
-              <a:rPr kumimoji="0" lang="en-US" altLang="en-US" sz="1800" b="0" i="0" u="none" strike="noStrike" cap="none" normalizeH="0" baseline="0" dirty="0" smtClean="0">
-                <a:ln>
-                  <a:noFill/>
-                </a:ln>
-                <a:solidFill>
-                  <a:srgbClr val="222222"/>
-                </a:solidFill>
-                <a:effectLst/>
-                <a:latin typeface="Helvetica" panose="020B0604020202020204" pitchFamily="34" charset="0"/>
-                <a:ea typeface="Calibri" panose="020F0502020204030204" pitchFamily="34" charset="0"/>
-                <a:cs typeface="Arial" panose="020B0604020202020204" pitchFamily="34" charset="0"/>
-              </a:rPr>
-              <a:t> </a:t>
-            </a:r>
-            <a:r>
-              <a:rPr kumimoji="0" lang="en-US" altLang="en-US" sz="1800" b="0" i="0" u="none" strike="noStrike" cap="none" normalizeH="0" baseline="0" dirty="0" err="1" smtClean="0">
-                <a:ln>
-                  <a:noFill/>
-                </a:ln>
-                <a:solidFill>
-                  <a:srgbClr val="222222"/>
-                </a:solidFill>
-                <a:effectLst/>
-                <a:latin typeface="Helvetica" panose="020B0604020202020204" pitchFamily="34" charset="0"/>
-                <a:ea typeface="Calibri" panose="020F0502020204030204" pitchFamily="34" charset="0"/>
-                <a:cs typeface="Arial" panose="020B0604020202020204" pitchFamily="34" charset="0"/>
-              </a:rPr>
-              <a:t>directory</a:t>
-            </a:r>
-            <a:r>
-              <a:rPr kumimoji="0" lang="en-US" altLang="en-US" sz="1800" b="0" i="0" u="none" strike="noStrike" cap="none" normalizeH="0" baseline="0" dirty="0" err="1" smtClean="0">
-                <a:ln>
-                  <a:noFill/>
-                </a:ln>
-                <a:solidFill>
-                  <a:srgbClr val="23D0DF"/>
-                </a:solidFill>
-                <a:effectLst/>
-                <a:latin typeface="Helvetica" panose="020B0604020202020204" pitchFamily="34" charset="0"/>
-                <a:ea typeface="Calibri" panose="020F0502020204030204" pitchFamily="34" charset="0"/>
-                <a:cs typeface="Arial" panose="020B0604020202020204" pitchFamily="34" charset="0"/>
-              </a:rPr>
-              <a:t>Minor</a:t>
-            </a:r>
-            <a:r>
-              <a:rPr kumimoji="0" lang="en-US" altLang="en-US" sz="1800" b="0" i="0" u="none" strike="noStrike" cap="none" normalizeH="0" baseline="0" dirty="0" smtClean="0">
-                <a:ln>
-                  <a:noFill/>
-                </a:ln>
-                <a:solidFill>
-                  <a:srgbClr val="23D0DF"/>
-                </a:solidFill>
-                <a:effectLst/>
-                <a:latin typeface="Helvetica" panose="020B0604020202020204" pitchFamily="34" charset="0"/>
-                <a:ea typeface="Calibri" panose="020F0502020204030204" pitchFamily="34" charset="0"/>
-                <a:cs typeface="Arial" panose="020B0604020202020204" pitchFamily="34" charset="0"/>
-              </a:rPr>
-              <a:t> (score: 3.0)</a:t>
-            </a:r>
-            <a:endParaRPr kumimoji="0" lang="en-US" altLang="en-US" sz="1800" b="0" i="0" u="none" strike="noStrike" cap="none" normalizeH="0" baseline="0" dirty="0" smtClean="0">
-              <a:ln>
-                <a:noFill/>
-              </a:ln>
-              <a:solidFill>
-                <a:schemeClr val="tx1"/>
-              </a:solidFill>
-              <a:effectLst/>
-            </a:endParaRPr>
-          </a:p>
-          <a:p>
-            <a:pPr marL="0" marR="0" lvl="0" indent="0" algn="l" defTabSz="914400" rtl="0" eaLnBrk="0" fontAlgn="base" latinLnBrk="0" hangingPunct="0">
-              <a:lnSpc>
-                <a:spcPct val="100000"/>
-              </a:lnSpc>
-              <a:spcBef>
-                <a:spcPct val="0"/>
-              </a:spcBef>
-              <a:spcAft>
-                <a:spcPct val="0"/>
-              </a:spcAft>
-              <a:buClrTx/>
-              <a:buSzTx/>
-              <a:buFontTx/>
-              <a:buNone/>
-              <a:tabLst/>
-            </a:pPr>
-            <a:r>
-              <a:rPr kumimoji="0" lang="en-US" altLang="en-US" sz="1800" b="0" i="0" u="none" strike="noStrike" cap="none" normalizeH="0" baseline="0" dirty="0" smtClean="0">
-                <a:ln>
-                  <a:noFill/>
-                </a:ln>
-                <a:solidFill>
-                  <a:schemeClr val="tx1"/>
-                </a:solidFill>
-                <a:effectLst/>
-                <a:latin typeface="Arial" panose="020B0604020202020204" pitchFamily="34" charset="0"/>
-                <a:ea typeface="Calibri" panose="020F0502020204030204" pitchFamily="34" charset="0"/>
-                <a:cs typeface="Arial" panose="020B0604020202020204" pitchFamily="34" charset="0"/>
-              </a:rPr>
-              <a:t>/</a:t>
-            </a:r>
-            <a:r>
-              <a:rPr kumimoji="0" lang="en-US" altLang="en-US" sz="1800" b="0" i="0" u="none" strike="noStrike" cap="none" normalizeH="0" baseline="0" dirty="0" err="1" smtClean="0">
-                <a:ln>
-                  <a:noFill/>
-                </a:ln>
-                <a:solidFill>
-                  <a:schemeClr val="tx1"/>
-                </a:solidFill>
-                <a:effectLst/>
-                <a:latin typeface="Arial" panose="020B0604020202020204" pitchFamily="34" charset="0"/>
-                <a:ea typeface="Calibri" panose="020F0502020204030204" pitchFamily="34" charset="0"/>
-                <a:cs typeface="Arial" panose="020B0604020202020204" pitchFamily="34" charset="0"/>
-              </a:rPr>
-              <a:t>tmp</a:t>
-            </a:r>
-            <a:r>
-              <a:rPr kumimoji="0" lang="en-US" altLang="en-US" sz="1800" b="0" i="0" u="none" strike="noStrike" cap="none" normalizeH="0" baseline="0" dirty="0" smtClean="0">
-                <a:ln>
-                  <a:noFill/>
-                </a:ln>
-                <a:solidFill>
-                  <a:schemeClr val="tx1"/>
-                </a:solidFill>
-                <a:effectLst/>
-                <a:latin typeface="Arial" panose="020B0604020202020204" pitchFamily="34" charset="0"/>
-                <a:ea typeface="Calibri" panose="020F0502020204030204" pitchFamily="34" charset="0"/>
-                <a:cs typeface="Arial" panose="020B0604020202020204" pitchFamily="34" charset="0"/>
-              </a:rPr>
-              <a:t> directory is owned by the root </a:t>
-            </a:r>
-            <a:r>
-              <a:rPr kumimoji="0" lang="en-US" altLang="en-US" sz="1800" b="0" i="0" u="none" strike="noStrike" cap="none" normalizeH="0" baseline="0" dirty="0" err="1" smtClean="0">
-                <a:ln>
-                  <a:noFill/>
-                </a:ln>
-                <a:solidFill>
-                  <a:schemeClr val="tx1"/>
-                </a:solidFill>
-                <a:effectLst/>
-                <a:latin typeface="Arial" panose="020B0604020202020204" pitchFamily="34" charset="0"/>
-                <a:ea typeface="Calibri" panose="020F0502020204030204" pitchFamily="34" charset="0"/>
-                <a:cs typeface="Arial" panose="020B0604020202020204" pitchFamily="34" charset="0"/>
-              </a:rPr>
-              <a:t>user</a:t>
-            </a:r>
-            <a:r>
-              <a:rPr kumimoji="0" lang="en-US" altLang="en-US" sz="1800" b="0" i="0" u="none" strike="noStrike" cap="none" normalizeH="0" baseline="0" dirty="0" err="1" smtClean="0">
-                <a:ln>
-                  <a:noFill/>
-                </a:ln>
-                <a:solidFill>
-                  <a:srgbClr val="23D0DF"/>
-                </a:solidFill>
-                <a:effectLst/>
-                <a:latin typeface="Helvetica" panose="020B0604020202020204" pitchFamily="34" charset="0"/>
-                <a:ea typeface="Calibri" panose="020F0502020204030204" pitchFamily="34" charset="0"/>
-                <a:cs typeface="Arial" panose="020B0604020202020204" pitchFamily="34" charset="0"/>
-              </a:rPr>
-              <a:t>Minor</a:t>
-            </a:r>
-            <a:r>
-              <a:rPr kumimoji="0" lang="en-US" altLang="en-US" sz="1800" b="0" i="0" u="none" strike="noStrike" cap="none" normalizeH="0" baseline="0" dirty="0" smtClean="0">
-                <a:ln>
-                  <a:noFill/>
-                </a:ln>
-                <a:solidFill>
-                  <a:srgbClr val="23D0DF"/>
-                </a:solidFill>
-                <a:effectLst/>
-                <a:latin typeface="Helvetica" panose="020B0604020202020204" pitchFamily="34" charset="0"/>
-                <a:ea typeface="Calibri" panose="020F0502020204030204" pitchFamily="34" charset="0"/>
-                <a:cs typeface="Arial" panose="020B0604020202020204" pitchFamily="34" charset="0"/>
-              </a:rPr>
-              <a:t> (score: 3.0)</a:t>
-            </a:r>
-            <a:endParaRPr kumimoji="0" lang="en-US" altLang="en-US" sz="1800" b="0" i="0" u="none" strike="noStrike" cap="none" normalizeH="0" baseline="0" dirty="0" smtClean="0">
-              <a:ln>
-                <a:noFill/>
-              </a:ln>
-              <a:solidFill>
-                <a:schemeClr val="tx1"/>
-              </a:solidFill>
-              <a:effectLst/>
-            </a:endParaRPr>
-          </a:p>
-          <a:p>
-            <a:pPr marL="0" marR="0" lvl="0" indent="0" algn="l" defTabSz="914400" rtl="0" eaLnBrk="0" fontAlgn="base" latinLnBrk="0" hangingPunct="0">
-              <a:lnSpc>
-                <a:spcPct val="100000"/>
-              </a:lnSpc>
-              <a:spcBef>
-                <a:spcPct val="0"/>
-              </a:spcBef>
-              <a:spcAft>
-                <a:spcPct val="0"/>
-              </a:spcAft>
-              <a:buClrTx/>
-              <a:buSzTx/>
-              <a:buFontTx/>
-              <a:buNone/>
-              <a:tabLst/>
-            </a:pPr>
-            <a:r>
-              <a:rPr kumimoji="0" lang="en-US" altLang="en-US" sz="1800" b="0" i="0" u="none" strike="noStrike" cap="none" normalizeH="0" baseline="0" dirty="0" smtClean="0">
-                <a:ln>
-                  <a:noFill/>
-                </a:ln>
-                <a:solidFill>
-                  <a:srgbClr val="5B9BD5"/>
-                </a:solidFill>
-                <a:effectLst/>
-                <a:latin typeface="Helvetica" panose="020B0604020202020204" pitchFamily="34" charset="0"/>
-                <a:ea typeface="Calibri" panose="020F0502020204030204" pitchFamily="34" charset="0"/>
-                <a:cs typeface="Arial" panose="020B0604020202020204" pitchFamily="34" charset="0"/>
-              </a:rPr>
-              <a:t>The /</a:t>
-            </a:r>
-            <a:r>
-              <a:rPr kumimoji="0" lang="en-US" altLang="en-US" sz="1800" b="0" i="0" u="none" strike="noStrike" cap="none" normalizeH="0" baseline="0" dirty="0" err="1" smtClean="0">
-                <a:ln>
-                  <a:noFill/>
-                </a:ln>
-                <a:solidFill>
-                  <a:srgbClr val="5B9BD5"/>
-                </a:solidFill>
-                <a:effectLst/>
-                <a:latin typeface="Helvetica" panose="020B0604020202020204" pitchFamily="34" charset="0"/>
-                <a:ea typeface="Calibri" panose="020F0502020204030204" pitchFamily="34" charset="0"/>
-                <a:cs typeface="Arial" panose="020B0604020202020204" pitchFamily="34" charset="0"/>
-              </a:rPr>
-              <a:t>tmp</a:t>
-            </a:r>
-            <a:r>
-              <a:rPr kumimoji="0" lang="en-US" altLang="en-US" sz="1800" b="0" i="0" u="none" strike="noStrike" cap="none" normalizeH="0" baseline="0" dirty="0" smtClean="0">
-                <a:ln>
-                  <a:noFill/>
-                </a:ln>
-                <a:solidFill>
-                  <a:srgbClr val="5B9BD5"/>
-                </a:solidFill>
-                <a:effectLst/>
-                <a:latin typeface="Helvetica" panose="020B0604020202020204" pitchFamily="34" charset="0"/>
-                <a:ea typeface="Calibri" panose="020F0502020204030204" pitchFamily="34" charset="0"/>
-                <a:cs typeface="Arial" panose="020B0604020202020204" pitchFamily="34" charset="0"/>
-              </a:rPr>
-              <a:t> directory must be owned by the root user</a:t>
-            </a:r>
-            <a:endParaRPr kumimoji="0" lang="en-US" altLang="en-US" sz="1800" b="0" i="0" u="none" strike="noStrike" cap="none" normalizeH="0" baseline="0" dirty="0" smtClean="0">
-              <a:ln>
-                <a:noFill/>
-              </a:ln>
-              <a:solidFill>
-                <a:srgbClr val="333333"/>
-              </a:solidFill>
-              <a:effectLst/>
-              <a:latin typeface="Consolas" panose="020B0609020204030204" pitchFamily="49" charset="0"/>
-              <a:ea typeface="Times New Roman" panose="02020603050405020304" pitchFamily="18" charset="0"/>
-              <a:cs typeface="Consolas" panose="020B0609020204030204" pitchFamily="49" charset="0"/>
-            </a:endParaRPr>
-          </a:p>
-          <a:p>
-            <a:pPr marL="0" marR="0" lvl="0" indent="0" algn="l" defTabSz="914400" rtl="0" eaLnBrk="0" fontAlgn="base" latinLnBrk="0" hangingPunct="0">
-              <a:lnSpc>
-                <a:spcPct val="100000"/>
-              </a:lnSpc>
-              <a:spcBef>
-                <a:spcPct val="0"/>
-              </a:spcBef>
-              <a:spcAft>
-                <a:spcPct val="0"/>
-              </a:spcAft>
-              <a:buClrTx/>
-              <a:buSzTx/>
-              <a:buFontTx/>
-              <a:buNone/>
-              <a:tabLst/>
-            </a:pPr>
-            <a:r>
-              <a:rPr kumimoji="0" lang="en-US" altLang="en-US" sz="1800" b="0" i="0" u="none" strike="noStrike" cap="none" normalizeH="0" baseline="0" dirty="0" smtClean="0">
-                <a:ln>
-                  <a:noFill/>
-                </a:ln>
-                <a:solidFill>
-                  <a:srgbClr val="333333"/>
-                </a:solidFill>
-                <a:effectLst/>
-                <a:latin typeface="Consolas" panose="020B0609020204030204" pitchFamily="49" charset="0"/>
-                <a:ea typeface="Times New Roman" panose="02020603050405020304" pitchFamily="18" charset="0"/>
-                <a:cs typeface="Consolas" panose="020B0609020204030204" pitchFamily="49" charset="0"/>
-              </a:rPr>
-              <a:t>control </a:t>
-            </a:r>
-            <a:r>
-              <a:rPr kumimoji="0" lang="en-US" altLang="en-US" sz="1800" b="0" i="0" u="none" strike="noStrike" cap="none" normalizeH="0" baseline="0" dirty="0" smtClean="0">
-                <a:ln>
-                  <a:noFill/>
-                </a:ln>
-                <a:solidFill>
-                  <a:srgbClr val="DD1144"/>
-                </a:solidFill>
-                <a:effectLst/>
-                <a:latin typeface="Consolas" panose="020B0609020204030204" pitchFamily="49" charset="0"/>
-                <a:ea typeface="Times New Roman" panose="02020603050405020304" pitchFamily="18" charset="0"/>
-                <a:cs typeface="Consolas" panose="020B0609020204030204" pitchFamily="49" charset="0"/>
-              </a:rPr>
-              <a:t>"tmp-1.1"</a:t>
-            </a:r>
-            <a:r>
-              <a:rPr kumimoji="0" lang="en-US" altLang="en-US" sz="1800" b="0" i="0" u="none" strike="noStrike" cap="none" normalizeH="0" baseline="0" dirty="0" smtClean="0">
-                <a:ln>
-                  <a:noFill/>
-                </a:ln>
-                <a:solidFill>
-                  <a:srgbClr val="333333"/>
-                </a:solidFill>
-                <a:effectLst/>
-                <a:latin typeface="Consolas" panose="020B0609020204030204" pitchFamily="49" charset="0"/>
-                <a:ea typeface="Times New Roman" panose="02020603050405020304" pitchFamily="18" charset="0"/>
-                <a:cs typeface="Consolas" panose="020B0609020204030204" pitchFamily="49" charset="0"/>
-              </a:rPr>
-              <a:t> </a:t>
-            </a:r>
-            <a:r>
-              <a:rPr kumimoji="0" lang="en-US" altLang="en-US" sz="1800" b="1" i="0" u="none" strike="noStrike" cap="none" normalizeH="0" baseline="0" dirty="0" smtClean="0">
-                <a:ln>
-                  <a:noFill/>
-                </a:ln>
-                <a:solidFill>
-                  <a:srgbClr val="333333"/>
-                </a:solidFill>
-                <a:effectLst/>
-                <a:latin typeface="Consolas" panose="020B0609020204030204" pitchFamily="49" charset="0"/>
-                <a:ea typeface="Times New Roman" panose="02020603050405020304" pitchFamily="18" charset="0"/>
-                <a:cs typeface="Consolas" panose="020B0609020204030204" pitchFamily="49" charset="0"/>
-              </a:rPr>
-              <a:t>do</a:t>
-            </a:r>
-            <a:r>
-              <a:rPr kumimoji="0" lang="en-US" altLang="en-US" sz="1800" b="0" i="0" u="none" strike="noStrike" cap="none" normalizeH="0" baseline="0" dirty="0" smtClean="0">
-                <a:ln>
-                  <a:noFill/>
-                </a:ln>
-                <a:solidFill>
-                  <a:srgbClr val="333333"/>
-                </a:solidFill>
-                <a:effectLst/>
-                <a:latin typeface="Consolas" panose="020B0609020204030204" pitchFamily="49" charset="0"/>
-                <a:ea typeface="Times New Roman" panose="02020603050405020304" pitchFamily="18" charset="0"/>
-                <a:cs typeface="Consolas" panose="020B0609020204030204" pitchFamily="49" charset="0"/>
-              </a:rPr>
-              <a:t>  impact </a:t>
-            </a:r>
-            <a:r>
-              <a:rPr kumimoji="0" lang="en-US" altLang="en-US" sz="1800" b="0" i="0" u="none" strike="noStrike" cap="none" normalizeH="0" baseline="0" dirty="0" smtClean="0">
-                <a:ln>
-                  <a:noFill/>
-                </a:ln>
-                <a:solidFill>
-                  <a:srgbClr val="008080"/>
-                </a:solidFill>
-                <a:effectLst/>
-                <a:latin typeface="Consolas" panose="020B0609020204030204" pitchFamily="49" charset="0"/>
-                <a:ea typeface="Times New Roman" panose="02020603050405020304" pitchFamily="18" charset="0"/>
-                <a:cs typeface="Consolas" panose="020B0609020204030204" pitchFamily="49" charset="0"/>
-              </a:rPr>
-              <a:t>0</a:t>
-            </a:r>
-            <a:r>
-              <a:rPr kumimoji="0" lang="en-US" altLang="en-US" sz="1800" b="0" i="0" u="none" strike="noStrike" cap="none" normalizeH="0" baseline="0" dirty="0" smtClean="0">
-                <a:ln>
-                  <a:noFill/>
-                </a:ln>
-                <a:solidFill>
-                  <a:srgbClr val="333333"/>
-                </a:solidFill>
-                <a:effectLst/>
-                <a:latin typeface="Consolas" panose="020B0609020204030204" pitchFamily="49" charset="0"/>
-                <a:ea typeface="Times New Roman" panose="02020603050405020304" pitchFamily="18" charset="0"/>
-                <a:cs typeface="Consolas" panose="020B0609020204030204" pitchFamily="49" charset="0"/>
-              </a:rPr>
-              <a:t>.</a:t>
-            </a:r>
-            <a:r>
-              <a:rPr kumimoji="0" lang="en-US" altLang="en-US" sz="1800" b="0" i="0" u="none" strike="noStrike" cap="none" normalizeH="0" baseline="0" dirty="0" smtClean="0">
-                <a:ln>
-                  <a:noFill/>
-                </a:ln>
-                <a:solidFill>
-                  <a:srgbClr val="008080"/>
-                </a:solidFill>
-                <a:effectLst/>
-                <a:latin typeface="Consolas" panose="020B0609020204030204" pitchFamily="49" charset="0"/>
-                <a:ea typeface="Times New Roman" panose="02020603050405020304" pitchFamily="18" charset="0"/>
-                <a:cs typeface="Consolas" panose="020B0609020204030204" pitchFamily="49" charset="0"/>
-              </a:rPr>
-              <a:t>3</a:t>
-            </a:r>
-            <a:r>
-              <a:rPr kumimoji="0" lang="en-US" altLang="en-US" sz="1800" b="0" i="0" u="none" strike="noStrike" cap="none" normalizeH="0" baseline="0" dirty="0" smtClean="0">
-                <a:ln>
-                  <a:noFill/>
-                </a:ln>
-                <a:solidFill>
-                  <a:srgbClr val="333333"/>
-                </a:solidFill>
-                <a:effectLst/>
-                <a:latin typeface="Consolas" panose="020B0609020204030204" pitchFamily="49" charset="0"/>
-                <a:ea typeface="Times New Roman" panose="02020603050405020304" pitchFamily="18" charset="0"/>
-                <a:cs typeface="Consolas" panose="020B0609020204030204" pitchFamily="49" charset="0"/>
-              </a:rPr>
-              <a:t>  title </a:t>
-            </a:r>
-            <a:r>
-              <a:rPr kumimoji="0" lang="en-US" altLang="en-US" sz="1800" b="0" i="0" u="none" strike="noStrike" cap="none" normalizeH="0" baseline="0" dirty="0" smtClean="0">
-                <a:ln>
-                  <a:noFill/>
-                </a:ln>
-                <a:solidFill>
-                  <a:srgbClr val="DD1144"/>
-                </a:solidFill>
-                <a:effectLst/>
-                <a:latin typeface="Consolas" panose="020B0609020204030204" pitchFamily="49" charset="0"/>
-                <a:ea typeface="Times New Roman" panose="02020603050405020304" pitchFamily="18" charset="0"/>
-                <a:cs typeface="Consolas" panose="020B0609020204030204" pitchFamily="49" charset="0"/>
-              </a:rPr>
-              <a:t>"</a:t>
-            </a:r>
-            <a:r>
-              <a:rPr kumimoji="0" lang="en-US" altLang="en-US" sz="1800" b="0" i="0" u="none" strike="noStrike" cap="none" normalizeH="0" baseline="0" dirty="0" smtClean="0">
-                <a:ln>
-                  <a:noFill/>
-                </a:ln>
-                <a:solidFill>
-                  <a:srgbClr val="00B050"/>
-                </a:solidFill>
-                <a:effectLst/>
-                <a:latin typeface="Consolas" panose="020B0609020204030204" pitchFamily="49" charset="0"/>
-                <a:ea typeface="Times New Roman" panose="02020603050405020304" pitchFamily="18" charset="0"/>
-                <a:cs typeface="Consolas" panose="020B0609020204030204" pitchFamily="49" charset="0"/>
-              </a:rPr>
-              <a:t>/</a:t>
-            </a:r>
-            <a:r>
-              <a:rPr kumimoji="0" lang="en-US" altLang="en-US" sz="1800" b="0" i="0" u="none" strike="noStrike" cap="none" normalizeH="0" baseline="0" dirty="0" err="1" smtClean="0">
-                <a:ln>
-                  <a:noFill/>
-                </a:ln>
-                <a:solidFill>
-                  <a:srgbClr val="00B050"/>
-                </a:solidFill>
-                <a:effectLst/>
-                <a:latin typeface="Consolas" panose="020B0609020204030204" pitchFamily="49" charset="0"/>
-                <a:ea typeface="Times New Roman" panose="02020603050405020304" pitchFamily="18" charset="0"/>
-                <a:cs typeface="Consolas" panose="020B0609020204030204" pitchFamily="49" charset="0"/>
-              </a:rPr>
-              <a:t>tmp</a:t>
-            </a:r>
-            <a:r>
-              <a:rPr kumimoji="0" lang="en-US" altLang="en-US" sz="1800" b="0" i="0" u="none" strike="noStrike" cap="none" normalizeH="0" baseline="0" dirty="0" smtClean="0">
-                <a:ln>
-                  <a:noFill/>
-                </a:ln>
-                <a:solidFill>
-                  <a:srgbClr val="00B050"/>
-                </a:solidFill>
-                <a:effectLst/>
-                <a:latin typeface="Consolas" panose="020B0609020204030204" pitchFamily="49" charset="0"/>
-                <a:ea typeface="Times New Roman" panose="02020603050405020304" pitchFamily="18" charset="0"/>
-                <a:cs typeface="Consolas" panose="020B0609020204030204" pitchFamily="49" charset="0"/>
-              </a:rPr>
-              <a:t> directory is owned by the root user</a:t>
-            </a:r>
-            <a:r>
-              <a:rPr kumimoji="0" lang="en-US" altLang="en-US" sz="1800" b="0" i="0" u="none" strike="noStrike" cap="none" normalizeH="0" baseline="0" dirty="0" smtClean="0">
-                <a:ln>
-                  <a:noFill/>
-                </a:ln>
-                <a:solidFill>
-                  <a:srgbClr val="DD1144"/>
-                </a:solidFill>
-                <a:effectLst/>
-                <a:latin typeface="Consolas" panose="020B0609020204030204" pitchFamily="49" charset="0"/>
-                <a:ea typeface="Times New Roman" panose="02020603050405020304" pitchFamily="18" charset="0"/>
-                <a:cs typeface="Consolas" panose="020B0609020204030204" pitchFamily="49" charset="0"/>
-              </a:rPr>
-              <a:t>"</a:t>
-            </a:r>
-            <a:r>
-              <a:rPr kumimoji="0" lang="en-US" altLang="en-US" sz="1800" b="0" i="0" u="none" strike="noStrike" cap="none" normalizeH="0" baseline="0" dirty="0" smtClean="0">
-                <a:ln>
-                  <a:noFill/>
-                </a:ln>
-                <a:solidFill>
-                  <a:srgbClr val="333333"/>
-                </a:solidFill>
-                <a:effectLst/>
-                <a:latin typeface="Consolas" panose="020B0609020204030204" pitchFamily="49" charset="0"/>
-                <a:ea typeface="Times New Roman" panose="02020603050405020304" pitchFamily="18" charset="0"/>
-                <a:cs typeface="Consolas" panose="020B0609020204030204" pitchFamily="49" charset="0"/>
-              </a:rPr>
-              <a:t>  </a:t>
-            </a:r>
-          </a:p>
-          <a:p>
-            <a:pPr marL="0" marR="0" lvl="0" indent="0" algn="l" defTabSz="914400" rtl="0" eaLnBrk="0" fontAlgn="base" latinLnBrk="0" hangingPunct="0">
-              <a:lnSpc>
-                <a:spcPct val="100000"/>
-              </a:lnSpc>
-              <a:spcBef>
-                <a:spcPct val="0"/>
-              </a:spcBef>
-              <a:spcAft>
-                <a:spcPct val="0"/>
-              </a:spcAft>
-              <a:buClrTx/>
-              <a:buSzTx/>
-              <a:buFontTx/>
-              <a:buNone/>
-              <a:tabLst/>
-            </a:pPr>
-            <a:r>
-              <a:rPr kumimoji="0" lang="en-US" altLang="en-US" sz="1800" b="0" i="0" u="none" strike="noStrike" cap="none" normalizeH="0" baseline="0" dirty="0" err="1" smtClean="0">
-                <a:ln>
-                  <a:noFill/>
-                </a:ln>
-                <a:solidFill>
-                  <a:srgbClr val="333333"/>
-                </a:solidFill>
-                <a:effectLst/>
-                <a:latin typeface="Consolas" panose="020B0609020204030204" pitchFamily="49" charset="0"/>
-                <a:ea typeface="Times New Roman" panose="02020603050405020304" pitchFamily="18" charset="0"/>
-                <a:cs typeface="Consolas" panose="020B0609020204030204" pitchFamily="49" charset="0"/>
-              </a:rPr>
-              <a:t>desc</a:t>
-            </a:r>
-            <a:r>
-              <a:rPr kumimoji="0" lang="en-US" altLang="en-US" sz="1800" b="0" i="0" u="none" strike="noStrike" cap="none" normalizeH="0" baseline="0" dirty="0" smtClean="0">
-                <a:ln>
-                  <a:noFill/>
-                </a:ln>
-                <a:solidFill>
-                  <a:srgbClr val="333333"/>
-                </a:solidFill>
-                <a:effectLst/>
-                <a:latin typeface="Consolas" panose="020B0609020204030204" pitchFamily="49" charset="0"/>
-                <a:ea typeface="Times New Roman" panose="02020603050405020304" pitchFamily="18" charset="0"/>
-                <a:cs typeface="Consolas" panose="020B0609020204030204" pitchFamily="49" charset="0"/>
-              </a:rPr>
-              <a:t> </a:t>
-            </a:r>
-            <a:r>
-              <a:rPr kumimoji="0" lang="en-US" altLang="en-US" sz="1800" b="0" i="0" u="none" strike="noStrike" cap="none" normalizeH="0" baseline="0" dirty="0" smtClean="0">
-                <a:ln>
-                  <a:noFill/>
-                </a:ln>
-                <a:solidFill>
-                  <a:srgbClr val="DD1144"/>
-                </a:solidFill>
-                <a:effectLst/>
-                <a:latin typeface="Consolas" panose="020B0609020204030204" pitchFamily="49" charset="0"/>
-                <a:ea typeface="Times New Roman" panose="02020603050405020304" pitchFamily="18" charset="0"/>
-                <a:cs typeface="Consolas" panose="020B0609020204030204" pitchFamily="49" charset="0"/>
-              </a:rPr>
-              <a:t>"</a:t>
-            </a:r>
-            <a:r>
-              <a:rPr kumimoji="0" lang="en-US" altLang="en-US" sz="1800" b="0" i="0" u="none" strike="noStrike" cap="none" normalizeH="0" baseline="0" dirty="0" smtClean="0">
-                <a:ln>
-                  <a:noFill/>
-                </a:ln>
-                <a:solidFill>
-                  <a:srgbClr val="5B9BD5"/>
-                </a:solidFill>
-                <a:effectLst/>
-                <a:latin typeface="Consolas" panose="020B0609020204030204" pitchFamily="49" charset="0"/>
-                <a:ea typeface="Times New Roman" panose="02020603050405020304" pitchFamily="18" charset="0"/>
-                <a:cs typeface="Consolas" panose="020B0609020204030204" pitchFamily="49" charset="0"/>
-              </a:rPr>
-              <a:t>The /</a:t>
-            </a:r>
-            <a:r>
-              <a:rPr kumimoji="0" lang="en-US" altLang="en-US" sz="1800" b="0" i="0" u="none" strike="noStrike" cap="none" normalizeH="0" baseline="0" dirty="0" err="1" smtClean="0">
-                <a:ln>
-                  <a:noFill/>
-                </a:ln>
-                <a:solidFill>
-                  <a:srgbClr val="5B9BD5"/>
-                </a:solidFill>
-                <a:effectLst/>
-                <a:latin typeface="Consolas" panose="020B0609020204030204" pitchFamily="49" charset="0"/>
-                <a:ea typeface="Times New Roman" panose="02020603050405020304" pitchFamily="18" charset="0"/>
-                <a:cs typeface="Consolas" panose="020B0609020204030204" pitchFamily="49" charset="0"/>
-              </a:rPr>
-              <a:t>tmp</a:t>
-            </a:r>
-            <a:r>
-              <a:rPr kumimoji="0" lang="en-US" altLang="en-US" sz="1800" b="0" i="0" u="none" strike="noStrike" cap="none" normalizeH="0" baseline="0" dirty="0" smtClean="0">
-                <a:ln>
-                  <a:noFill/>
-                </a:ln>
-                <a:solidFill>
-                  <a:srgbClr val="5B9BD5"/>
-                </a:solidFill>
-                <a:effectLst/>
-                <a:latin typeface="Consolas" panose="020B0609020204030204" pitchFamily="49" charset="0"/>
-                <a:ea typeface="Times New Roman" panose="02020603050405020304" pitchFamily="18" charset="0"/>
-                <a:cs typeface="Consolas" panose="020B0609020204030204" pitchFamily="49" charset="0"/>
-              </a:rPr>
-              <a:t> directory must be owned by the root user</a:t>
-            </a:r>
-            <a:r>
-              <a:rPr kumimoji="0" lang="en-US" altLang="en-US" sz="1800" b="0" i="0" u="none" strike="noStrike" cap="none" normalizeH="0" baseline="0" dirty="0" smtClean="0">
-                <a:ln>
-                  <a:noFill/>
-                </a:ln>
-                <a:solidFill>
-                  <a:srgbClr val="DD1144"/>
-                </a:solidFill>
-                <a:effectLst/>
-                <a:latin typeface="Consolas" panose="020B0609020204030204" pitchFamily="49" charset="0"/>
-                <a:ea typeface="Times New Roman" panose="02020603050405020304" pitchFamily="18" charset="0"/>
-                <a:cs typeface="Consolas" panose="020B0609020204030204" pitchFamily="49" charset="0"/>
-              </a:rPr>
-              <a:t>"</a:t>
-            </a:r>
-            <a:r>
-              <a:rPr kumimoji="0" lang="en-US" altLang="en-US" sz="1800" b="0" i="0" u="none" strike="noStrike" cap="none" normalizeH="0" baseline="0" dirty="0" smtClean="0">
-                <a:ln>
-                  <a:noFill/>
-                </a:ln>
-                <a:solidFill>
-                  <a:srgbClr val="333333"/>
-                </a:solidFill>
-                <a:effectLst/>
-                <a:latin typeface="Consolas" panose="020B0609020204030204" pitchFamily="49" charset="0"/>
-                <a:ea typeface="Times New Roman" panose="02020603050405020304" pitchFamily="18" charset="0"/>
-                <a:cs typeface="Consolas" panose="020B0609020204030204" pitchFamily="49" charset="0"/>
-              </a:rPr>
-              <a:t>  </a:t>
-            </a:r>
-          </a:p>
-          <a:p>
-            <a:pPr marL="0" marR="0" lvl="0" indent="0" algn="l" defTabSz="914400" rtl="0" eaLnBrk="0" fontAlgn="base" latinLnBrk="0" hangingPunct="0">
-              <a:lnSpc>
-                <a:spcPct val="100000"/>
-              </a:lnSpc>
-              <a:spcBef>
-                <a:spcPct val="0"/>
-              </a:spcBef>
-              <a:spcAft>
-                <a:spcPct val="0"/>
-              </a:spcAft>
-              <a:buClrTx/>
-              <a:buSzTx/>
-              <a:buFontTx/>
-              <a:buNone/>
-              <a:tabLst/>
-            </a:pPr>
-            <a:r>
-              <a:rPr kumimoji="0" lang="en-US" altLang="en-US" sz="1800" b="0" i="0" u="none" strike="noStrike" cap="none" normalizeH="0" baseline="0" dirty="0" smtClean="0">
-                <a:ln>
-                  <a:noFill/>
-                </a:ln>
-                <a:solidFill>
-                  <a:srgbClr val="333333"/>
-                </a:solidFill>
-                <a:effectLst/>
-                <a:latin typeface="Consolas" panose="020B0609020204030204" pitchFamily="49" charset="0"/>
-                <a:ea typeface="Times New Roman" panose="02020603050405020304" pitchFamily="18" charset="0"/>
-                <a:cs typeface="Consolas" panose="020B0609020204030204" pitchFamily="49" charset="0"/>
-              </a:rPr>
-              <a:t>describe file(</a:t>
-            </a:r>
-            <a:r>
-              <a:rPr kumimoji="0" lang="en-US" altLang="en-US" sz="1800" b="0" i="0" u="none" strike="noStrike" cap="none" normalizeH="0" baseline="0" dirty="0" smtClean="0">
-                <a:ln>
-                  <a:noFill/>
-                </a:ln>
-                <a:solidFill>
-                  <a:srgbClr val="DD1144"/>
-                </a:solidFill>
-                <a:effectLst/>
-                <a:latin typeface="Consolas" panose="020B0609020204030204" pitchFamily="49" charset="0"/>
-                <a:ea typeface="Times New Roman" panose="02020603050405020304" pitchFamily="18" charset="0"/>
-                <a:cs typeface="Consolas" panose="020B0609020204030204" pitchFamily="49" charset="0"/>
-              </a:rPr>
-              <a:t>'/</a:t>
-            </a:r>
-            <a:r>
-              <a:rPr kumimoji="0" lang="en-US" altLang="en-US" sz="1800" b="0" i="0" u="none" strike="noStrike" cap="none" normalizeH="0" baseline="0" dirty="0" err="1" smtClean="0">
-                <a:ln>
-                  <a:noFill/>
-                </a:ln>
-                <a:solidFill>
-                  <a:srgbClr val="DD1144"/>
-                </a:solidFill>
-                <a:effectLst/>
-                <a:latin typeface="Consolas" panose="020B0609020204030204" pitchFamily="49" charset="0"/>
-                <a:ea typeface="Times New Roman" panose="02020603050405020304" pitchFamily="18" charset="0"/>
-                <a:cs typeface="Consolas" panose="020B0609020204030204" pitchFamily="49" charset="0"/>
-              </a:rPr>
-              <a:t>tmp</a:t>
-            </a:r>
-            <a:r>
-              <a:rPr kumimoji="0" lang="en-US" altLang="en-US" sz="1800" b="0" i="0" u="none" strike="noStrike" cap="none" normalizeH="0" baseline="0" dirty="0" smtClean="0">
-                <a:ln>
-                  <a:noFill/>
-                </a:ln>
-                <a:solidFill>
-                  <a:srgbClr val="DD1144"/>
-                </a:solidFill>
-                <a:effectLst/>
-                <a:latin typeface="Consolas" panose="020B0609020204030204" pitchFamily="49" charset="0"/>
-                <a:ea typeface="Times New Roman" panose="02020603050405020304" pitchFamily="18" charset="0"/>
-                <a:cs typeface="Consolas" panose="020B0609020204030204" pitchFamily="49" charset="0"/>
-              </a:rPr>
-              <a:t>'</a:t>
-            </a:r>
-            <a:r>
-              <a:rPr kumimoji="0" lang="en-US" altLang="en-US" sz="1800" b="0" i="0" u="none" strike="noStrike" cap="none" normalizeH="0" baseline="0" dirty="0" smtClean="0">
-                <a:ln>
-                  <a:noFill/>
-                </a:ln>
-                <a:solidFill>
-                  <a:srgbClr val="333333"/>
-                </a:solidFill>
-                <a:effectLst/>
-                <a:latin typeface="Consolas" panose="020B0609020204030204" pitchFamily="49" charset="0"/>
-                <a:ea typeface="Times New Roman" panose="02020603050405020304" pitchFamily="18" charset="0"/>
-                <a:cs typeface="Consolas" panose="020B0609020204030204" pitchFamily="49" charset="0"/>
-              </a:rPr>
-              <a:t>) </a:t>
-            </a:r>
-            <a:r>
-              <a:rPr kumimoji="0" lang="en-US" altLang="en-US" sz="1800" b="1" i="0" u="none" strike="noStrike" cap="none" normalizeH="0" baseline="0" dirty="0" smtClean="0">
-                <a:ln>
-                  <a:noFill/>
-                </a:ln>
-                <a:solidFill>
-                  <a:srgbClr val="333333"/>
-                </a:solidFill>
-                <a:effectLst/>
-                <a:latin typeface="Consolas" panose="020B0609020204030204" pitchFamily="49" charset="0"/>
-                <a:ea typeface="Times New Roman" panose="02020603050405020304" pitchFamily="18" charset="0"/>
-                <a:cs typeface="Consolas" panose="020B0609020204030204" pitchFamily="49" charset="0"/>
-              </a:rPr>
-              <a:t>do</a:t>
-            </a:r>
-            <a:r>
-              <a:rPr kumimoji="0" lang="en-US" altLang="en-US" sz="1800" b="0" i="0" u="none" strike="noStrike" cap="none" normalizeH="0" baseline="0" dirty="0" smtClean="0">
-                <a:ln>
-                  <a:noFill/>
-                </a:ln>
-                <a:solidFill>
-                  <a:srgbClr val="333333"/>
-                </a:solidFill>
-                <a:effectLst/>
-                <a:latin typeface="Consolas" panose="020B0609020204030204" pitchFamily="49" charset="0"/>
-                <a:ea typeface="Times New Roman" panose="02020603050405020304" pitchFamily="18" charset="0"/>
-                <a:cs typeface="Consolas" panose="020B0609020204030204" pitchFamily="49" charset="0"/>
-              </a:rPr>
-              <a:t>  it { should </a:t>
-            </a:r>
-            <a:r>
-              <a:rPr kumimoji="0" lang="en-US" altLang="en-US" sz="1800" b="0" i="0" u="none" strike="noStrike" cap="none" normalizeH="0" baseline="0" dirty="0" err="1" smtClean="0">
-                <a:ln>
-                  <a:noFill/>
-                </a:ln>
-                <a:solidFill>
-                  <a:srgbClr val="333333"/>
-                </a:solidFill>
-                <a:effectLst/>
-                <a:latin typeface="Consolas" panose="020B0609020204030204" pitchFamily="49" charset="0"/>
-                <a:ea typeface="Times New Roman" panose="02020603050405020304" pitchFamily="18" charset="0"/>
-                <a:cs typeface="Consolas" panose="020B0609020204030204" pitchFamily="49" charset="0"/>
-              </a:rPr>
-              <a:t>be_owned_by</a:t>
-            </a:r>
-            <a:r>
-              <a:rPr kumimoji="0" lang="en-US" altLang="en-US" sz="1800" b="0" i="0" u="none" strike="noStrike" cap="none" normalizeH="0" baseline="0" dirty="0" smtClean="0">
-                <a:ln>
-                  <a:noFill/>
-                </a:ln>
-                <a:solidFill>
-                  <a:srgbClr val="333333"/>
-                </a:solidFill>
-                <a:effectLst/>
-                <a:latin typeface="Consolas" panose="020B0609020204030204" pitchFamily="49" charset="0"/>
-                <a:ea typeface="Times New Roman" panose="02020603050405020304" pitchFamily="18" charset="0"/>
-                <a:cs typeface="Consolas" panose="020B0609020204030204" pitchFamily="49" charset="0"/>
-              </a:rPr>
-              <a:t> </a:t>
-            </a:r>
-            <a:r>
-              <a:rPr kumimoji="0" lang="en-US" altLang="en-US" sz="1800" b="0" i="0" u="none" strike="noStrike" cap="none" normalizeH="0" baseline="0" dirty="0" smtClean="0">
-                <a:ln>
-                  <a:noFill/>
-                </a:ln>
-                <a:solidFill>
-                  <a:srgbClr val="DD1144"/>
-                </a:solidFill>
-                <a:effectLst/>
-                <a:latin typeface="Consolas" panose="020B0609020204030204" pitchFamily="49" charset="0"/>
-                <a:ea typeface="Times New Roman" panose="02020603050405020304" pitchFamily="18" charset="0"/>
-                <a:cs typeface="Consolas" panose="020B0609020204030204" pitchFamily="49" charset="0"/>
-              </a:rPr>
-              <a:t>'root'</a:t>
-            </a:r>
-            <a:r>
-              <a:rPr kumimoji="0" lang="en-US" altLang="en-US" sz="1800" b="0" i="0" u="none" strike="noStrike" cap="none" normalizeH="0" baseline="0" dirty="0" smtClean="0">
-                <a:ln>
-                  <a:noFill/>
-                </a:ln>
-                <a:solidFill>
-                  <a:srgbClr val="333333"/>
-                </a:solidFill>
-                <a:effectLst/>
-                <a:latin typeface="Consolas" panose="020B0609020204030204" pitchFamily="49" charset="0"/>
-                <a:ea typeface="Times New Roman" panose="02020603050405020304" pitchFamily="18" charset="0"/>
-                <a:cs typeface="Consolas" panose="020B0609020204030204" pitchFamily="49" charset="0"/>
-              </a:rPr>
-              <a:t> }</a:t>
-            </a:r>
-            <a:r>
-              <a:rPr kumimoji="0" lang="en-US" altLang="en-US" sz="1800" b="0" i="0" u="none" strike="noStrike" cap="none" normalizeH="0" baseline="0" dirty="0" smtClean="0">
-                <a:ln>
-                  <a:noFill/>
-                </a:ln>
-                <a:solidFill>
-                  <a:schemeClr val="tx1"/>
-                </a:solidFill>
-                <a:effectLst/>
-                <a:latin typeface="Arial Unicode MS" panose="020B0604020202020204" pitchFamily="34" charset="-128"/>
-                <a:ea typeface="Times New Roman" panose="02020603050405020304" pitchFamily="18" charset="0"/>
-              </a:rPr>
-              <a:t> </a:t>
-            </a:r>
-            <a:endParaRPr kumimoji="0" lang="en-US" altLang="en-US" sz="1800" b="0" i="0" u="none" strike="noStrike" cap="none" normalizeH="0" baseline="0" dirty="0" smtClean="0">
-              <a:ln>
-                <a:noFill/>
-              </a:ln>
-              <a:solidFill>
-                <a:schemeClr val="tx1"/>
-              </a:solidFill>
-              <a:effectLst/>
-              <a:latin typeface="Arial" panose="020B0604020202020204" pitchFamily="34" charset="0"/>
-            </a:endParaRPr>
-          </a:p>
-        </p:txBody>
-      </p:sp>
-    </p:spTree>
-    <p:extLst>
-      <p:ext uri="{BB962C8B-B14F-4D97-AF65-F5344CB8AC3E}">
-        <p14:creationId xmlns:p14="http://schemas.microsoft.com/office/powerpoint/2010/main" val="3312136152"/>
-      </p:ext>
-    </p:extLst>
-  </p:cSld>
-  <p:clrMapOvr>
-    <a:masterClrMapping/>
-  </p:clrMapOvr>
-  <p:transition spd="med">
-    <p:fade/>
-  </p:transition>
-  <p:timing>
-    <p:tnLst>
-      <p:par>
-        <p:cTn id="1" dur="indefinite" restart="never" nodeType="tmRoot"/>
-      </p:par>
-    </p:tnLst>
-  </p:timing>
-</p:sld>
-</file>
-
-<file path=ppt/slides/slide32.xml><?xml version="1.0" encoding="utf-8"?>
-<p:sld xmlns:a="http://schemas.openxmlformats.org/drawingml/2006/main" xmlns:r="http://schemas.openxmlformats.org/officeDocument/2006/relationships" xmlns:p="http://schemas.openxmlformats.org/presentationml/2006/main">
-  <p:cSld>
-    <p:spTree>
-      <p:nvGrpSpPr>
-        <p:cNvPr id="1" name=""/>
-        <p:cNvGrpSpPr/>
-        <p:nvPr/>
-      </p:nvGrpSpPr>
-      <p:grpSpPr>
-        <a:xfrm>
-          <a:off x="0" y="0"/>
-          <a:ext cx="0" cy="0"/>
-          <a:chOff x="0" y="0"/>
-          <a:chExt cx="0" cy="0"/>
-        </a:xfrm>
-      </p:grpSpPr>
-      <p:sp>
-        <p:nvSpPr>
-          <p:cNvPr id="2" name="Title 1"/>
-          <p:cNvSpPr>
-            <a:spLocks noGrp="1"/>
-          </p:cNvSpPr>
-          <p:nvPr>
-            <p:ph type="title"/>
-          </p:nvPr>
-        </p:nvSpPr>
-        <p:spPr/>
-        <p:txBody>
-          <a:bodyPr/>
-          <a:lstStyle/>
-          <a:p>
-            <a:r>
-              <a:rPr lang="en-US" dirty="0" smtClean="0"/>
-              <a:t>GL: Save this</a:t>
-            </a:r>
-            <a:endParaRPr lang="en-US" dirty="0"/>
-          </a:p>
-        </p:txBody>
-      </p:sp>
-      <p:sp>
-        <p:nvSpPr>
-          <p:cNvPr id="6" name="Text Placeholder 2"/>
-          <p:cNvSpPr>
-            <a:spLocks noGrp="1"/>
-          </p:cNvSpPr>
-          <p:nvPr>
-            <p:ph type="body" sz="quarter" idx="12"/>
-          </p:nvPr>
-        </p:nvSpPr>
-        <p:spPr>
-          <a:xfrm>
-            <a:off x="609599" y="1559018"/>
-            <a:ext cx="14042065" cy="5961922"/>
-          </a:xfrm>
-        </p:spPr>
-        <p:txBody>
-          <a:bodyPr/>
-          <a:lstStyle/>
-          <a:p>
-            <a:pPr marL="457200" indent="-457200">
-              <a:buFont typeface="Arial" panose="020B0604020202020204" pitchFamily="34" charset="0"/>
-              <a:buChar char="•"/>
-            </a:pPr>
-            <a:r>
-              <a:rPr lang="en-US" dirty="0">
-                <a:hlinkClick r:id="rId3"/>
-              </a:rPr>
-              <a:t>https://</a:t>
-            </a:r>
-            <a:r>
-              <a:rPr lang="en-US" dirty="0" smtClean="0">
-                <a:hlinkClick r:id="rId3"/>
-              </a:rPr>
-              <a:t>github.com/chef/inspec/blob/7f555b902d6860ffe236ff23e4b52f20bac28adc/lib/inspec/profile.rb#L81-L129</a:t>
-            </a:r>
-            <a:endParaRPr lang="en-US" dirty="0" smtClean="0"/>
-          </a:p>
-          <a:p>
-            <a:pPr marL="457200" indent="-457200">
-              <a:buFont typeface="Arial" panose="020B0604020202020204" pitchFamily="34" charset="0"/>
-              <a:buChar char="•"/>
-            </a:pPr>
-            <a:endParaRPr lang="en-US" dirty="0"/>
-          </a:p>
-          <a:p>
-            <a:pPr marL="457200" indent="-457200">
-              <a:buFont typeface="Arial" panose="020B0604020202020204" pitchFamily="34" charset="0"/>
-              <a:buChar char="•"/>
-            </a:pPr>
-            <a:endParaRPr lang="en-US" dirty="0" smtClean="0"/>
-          </a:p>
-          <a:p>
-            <a:pPr marL="457200" indent="-457200">
-              <a:buFont typeface="Arial" panose="020B0604020202020204" pitchFamily="34" charset="0"/>
-              <a:buChar char="•"/>
-            </a:pPr>
-            <a:r>
-              <a:rPr lang="en-US" dirty="0" smtClean="0"/>
-              <a:t>and Check uses the </a:t>
-            </a:r>
-            <a:r>
-              <a:rPr lang="en-US" dirty="0"/>
-              <a:t>above from here:</a:t>
-            </a:r>
-            <a:br>
-              <a:rPr lang="en-US" dirty="0"/>
-            </a:br>
-            <a:r>
-              <a:rPr lang="en-US" dirty="0">
-                <a:hlinkClick r:id="rId4"/>
-              </a:rPr>
-              <a:t>https://</a:t>
-            </a:r>
-            <a:r>
-              <a:rPr lang="en-US" dirty="0" smtClean="0">
-                <a:hlinkClick r:id="rId4"/>
-              </a:rPr>
-              <a:t>github.com/chef/inspec/blob/b1ec95e343aac75ee1a21e3d1a09a32a5a8c1dd2/bin/inspec#L70-L78</a:t>
-            </a:r>
-            <a:endParaRPr lang="en-US" dirty="0" smtClean="0"/>
-          </a:p>
-          <a:p>
-            <a:pPr marL="457200" indent="-457200">
-              <a:buFont typeface="Arial" panose="020B0604020202020204" pitchFamily="34" charset="0"/>
-              <a:buChar char="•"/>
-            </a:pPr>
-            <a:endParaRPr lang="en-US" dirty="0"/>
-          </a:p>
-          <a:p>
-            <a:pPr marL="457200" indent="-457200">
-              <a:buFont typeface="Arial" panose="020B0604020202020204" pitchFamily="34" charset="0"/>
-              <a:buChar char="•"/>
-            </a:pPr>
-            <a:r>
-              <a:rPr lang="en-US" dirty="0">
-                <a:hlinkClick r:id="rId5"/>
-              </a:rPr>
-              <a:t>https://</a:t>
-            </a:r>
-            <a:r>
-              <a:rPr lang="en-US" dirty="0" smtClean="0">
-                <a:hlinkClick r:id="rId5"/>
-              </a:rPr>
-              <a:t>chefio.atlassian.net/wiki/pages/viewpage.action?spaceKey=SE&amp;title=Week+1#Week1-Addingprofiles</a:t>
-            </a:r>
-            <a:endParaRPr lang="en-US" dirty="0" smtClean="0"/>
-          </a:p>
-          <a:p>
-            <a:pPr marL="457200" indent="-457200">
-              <a:buFont typeface="Arial" panose="020B0604020202020204" pitchFamily="34" charset="0"/>
-              <a:buChar char="•"/>
-            </a:pPr>
-            <a:endParaRPr lang="en-US" dirty="0" smtClean="0"/>
-          </a:p>
-          <a:p>
-            <a:pPr marL="457200" indent="-457200">
-              <a:buFont typeface="Arial" panose="020B0604020202020204" pitchFamily="34" charset="0"/>
-              <a:buChar char="•"/>
-            </a:pPr>
-            <a:endParaRPr lang="en-US" dirty="0"/>
-          </a:p>
-          <a:p>
-            <a:endParaRPr lang="en-US" dirty="0" smtClean="0"/>
-          </a:p>
-          <a:p>
-            <a:pPr marL="457200" indent="-457200">
-              <a:buFont typeface="Arial" panose="020B0604020202020204" pitchFamily="34" charset="0"/>
-              <a:buChar char="•"/>
-            </a:pPr>
-            <a:endParaRPr lang="en-US" dirty="0"/>
-          </a:p>
-        </p:txBody>
-      </p:sp>
-    </p:spTree>
-    <p:extLst>
-      <p:ext uri="{BB962C8B-B14F-4D97-AF65-F5344CB8AC3E}">
-        <p14:creationId xmlns:p14="http://schemas.microsoft.com/office/powerpoint/2010/main" val="420890300"/>
-      </p:ext>
-    </p:extLst>
-  </p:cSld>
-  <p:clrMapOvr>
-    <a:masterClrMapping/>
-  </p:clrMapOvr>
-  <p:transition spd="med">
-    <p:fade/>
-  </p:transition>
-  <p:timing>
-    <p:tnLst>
-      <p:par>
-        <p:cTn id="1" dur="indefinite" restart="never" nodeType="tmRoot"/>
-      </p:par>
-    </p:tnLst>
-  </p:timing>
-</p:sld>
-</file>
-
-<file path=ppt/slides/slide33.xml><?xml version="1.0" encoding="utf-8"?>
-<p:sld xmlns:a="http://schemas.openxmlformats.org/drawingml/2006/main" xmlns:r="http://schemas.openxmlformats.org/officeDocument/2006/relationships" xmlns:p="http://schemas.openxmlformats.org/presentationml/2006/main">
-  <p:cSld>
-    <p:spTree>
-      <p:nvGrpSpPr>
-        <p:cNvPr id="1" name=""/>
-        <p:cNvGrpSpPr/>
-        <p:nvPr/>
-      </p:nvGrpSpPr>
-      <p:grpSpPr>
-        <a:xfrm>
-          <a:off x="0" y="0"/>
-          <a:ext cx="0" cy="0"/>
-          <a:chOff x="0" y="0"/>
-          <a:chExt cx="0" cy="0"/>
-        </a:xfrm>
-      </p:grpSpPr>
-      <p:sp>
-        <p:nvSpPr>
-          <p:cNvPr id="2" name="Title 1"/>
-          <p:cNvSpPr>
-            <a:spLocks noGrp="1"/>
-          </p:cNvSpPr>
-          <p:nvPr>
-            <p:ph type="title"/>
-          </p:nvPr>
-        </p:nvSpPr>
-        <p:spPr/>
-        <p:txBody>
-          <a:bodyPr>
-            <a:normAutofit/>
-          </a:bodyPr>
-          <a:lstStyle/>
-          <a:p>
-            <a:r>
-              <a:rPr lang="en-US" dirty="0" smtClean="0"/>
-              <a:t>TBD delete later.</a:t>
-            </a:r>
-            <a:endParaRPr lang="en-US" dirty="0"/>
-          </a:p>
-        </p:txBody>
-      </p:sp>
-      <p:sp>
-        <p:nvSpPr>
-          <p:cNvPr id="6" name="Text Placeholder 2"/>
-          <p:cNvSpPr>
-            <a:spLocks noGrp="1"/>
-          </p:cNvSpPr>
-          <p:nvPr>
-            <p:ph type="body" sz="quarter" idx="12"/>
-          </p:nvPr>
-        </p:nvSpPr>
-        <p:spPr>
-          <a:xfrm>
-            <a:off x="609599" y="1559018"/>
-            <a:ext cx="14042065" cy="5961922"/>
-          </a:xfrm>
-        </p:spPr>
-        <p:txBody>
-          <a:bodyPr/>
-          <a:lstStyle/>
-          <a:p>
-            <a:r>
-              <a:rPr lang="en-US" dirty="0"/>
-              <a:t>As you write controls, </a:t>
-            </a:r>
-            <a:r>
-              <a:rPr lang="en-US" dirty="0" err="1"/>
-              <a:t>InSpec</a:t>
-            </a:r>
-            <a:r>
-              <a:rPr lang="en-US" dirty="0"/>
-              <a:t> </a:t>
-            </a:r>
-            <a:r>
-              <a:rPr lang="en-US" dirty="0" smtClean="0"/>
-              <a:t>expects a specific directory structure. In our case, we need a `test` directory to be in our profile as follows:</a:t>
-            </a:r>
-            <a:endParaRPr lang="en-US" dirty="0"/>
-          </a:p>
-          <a:p>
-            <a:r>
-              <a:rPr lang="en-US" dirty="0" smtClean="0"/>
-              <a:t>├── </a:t>
-            </a:r>
-            <a:r>
-              <a:rPr lang="en-US" dirty="0"/>
-              <a:t>README.md</a:t>
-            </a:r>
-            <a:br>
-              <a:rPr lang="en-US" dirty="0"/>
-            </a:br>
-            <a:r>
-              <a:rPr lang="en-US" dirty="0"/>
-              <a:t>├── metadata.rb</a:t>
-            </a:r>
-            <a:br>
-              <a:rPr lang="en-US" dirty="0"/>
-            </a:br>
-            <a:r>
-              <a:rPr lang="en-US" dirty="0"/>
-              <a:t>└── test</a:t>
-            </a:r>
-            <a:br>
-              <a:rPr lang="en-US" dirty="0"/>
-            </a:br>
-            <a:r>
-              <a:rPr lang="en-US" dirty="0"/>
-              <a:t>  ├── </a:t>
-            </a:r>
-            <a:r>
-              <a:rPr lang="en-US" dirty="0" err="1"/>
-              <a:t>foo_spec.rb</a:t>
-            </a:r>
-            <a:r>
-              <a:rPr lang="en-US" dirty="0"/>
-              <a:t/>
-            </a:r>
-            <a:br>
-              <a:rPr lang="en-US" dirty="0"/>
-            </a:br>
-            <a:r>
-              <a:rPr lang="en-US" dirty="0"/>
-              <a:t>  └── </a:t>
-            </a:r>
-            <a:r>
-              <a:rPr lang="en-US" dirty="0" err="1"/>
-              <a:t>bar_spec.rb</a:t>
-            </a:r>
-            <a:endParaRPr lang="en-US" dirty="0"/>
-          </a:p>
-          <a:p>
-            <a:endParaRPr lang="en-US" dirty="0" smtClean="0">
-              <a:hlinkClick r:id="rId3"/>
-            </a:endParaRPr>
-          </a:p>
-          <a:p>
-            <a:r>
-              <a:rPr lang="en-US" dirty="0" smtClean="0">
-                <a:hlinkClick r:id="rId3"/>
-              </a:rPr>
-              <a:t>https</a:t>
-            </a:r>
-            <a:r>
-              <a:rPr lang="en-US" dirty="0">
-                <a:hlinkClick r:id="rId3"/>
-              </a:rPr>
-              <a:t>://</a:t>
-            </a:r>
-            <a:r>
-              <a:rPr lang="en-US" dirty="0" smtClean="0">
-                <a:hlinkClick r:id="rId3"/>
-              </a:rPr>
-              <a:t>chefio.atlassian.net/wiki/pages/viewpage.action?spaceKey=SE&amp;title=Week+1#Week1-Addingprofiles</a:t>
-            </a:r>
-            <a:endParaRPr lang="en-US" dirty="0" smtClean="0"/>
-          </a:p>
-          <a:p>
-            <a:pPr marL="457200" indent="-457200">
-              <a:buFont typeface="Arial" panose="020B0604020202020204" pitchFamily="34" charset="0"/>
-              <a:buChar char="•"/>
-            </a:pPr>
-            <a:endParaRPr lang="en-US" dirty="0" smtClean="0"/>
-          </a:p>
-          <a:p>
-            <a:pPr marL="457200" indent="-457200">
-              <a:buFont typeface="Arial" panose="020B0604020202020204" pitchFamily="34" charset="0"/>
-              <a:buChar char="•"/>
-            </a:pPr>
-            <a:endParaRPr lang="en-US" dirty="0"/>
-          </a:p>
-          <a:p>
-            <a:endParaRPr lang="en-US" dirty="0" smtClean="0"/>
-          </a:p>
-          <a:p>
-            <a:pPr marL="457200" indent="-457200">
-              <a:buFont typeface="Arial" panose="020B0604020202020204" pitchFamily="34" charset="0"/>
-              <a:buChar char="•"/>
-            </a:pPr>
-            <a:endParaRPr lang="en-US" dirty="0"/>
-          </a:p>
-        </p:txBody>
-      </p:sp>
-    </p:spTree>
-    <p:extLst>
-      <p:ext uri="{BB962C8B-B14F-4D97-AF65-F5344CB8AC3E}">
-        <p14:creationId xmlns:p14="http://schemas.microsoft.com/office/powerpoint/2010/main" val="576921078"/>
-      </p:ext>
-    </p:extLst>
-  </p:cSld>
-  <p:clrMapOvr>
-    <a:masterClrMapping/>
-  </p:clrMapOvr>
-  <p:transition spd="med">
-    <p:fade/>
-  </p:transition>
-  <p:timing>
-    <p:tnLst>
-      <p:par>
-        <p:cTn id="1" dur="indefinite" restart="never" nodeType="tmRoot"/>
-      </p:par>
-    </p:tnLst>
-  </p:timing>
-</p:sld>
-</file>
-
-<file path=ppt/slides/slide34.xml><?xml version="1.0" encoding="utf-8"?>
-<p:sld xmlns:a="http://schemas.openxmlformats.org/drawingml/2006/main" xmlns:r="http://schemas.openxmlformats.org/officeDocument/2006/relationships" xmlns:p="http://schemas.openxmlformats.org/presentationml/2006/main">
-  <p:cSld>
     <p:bg>
       <p:bgPr>
         <a:gradFill rotWithShape="0">
@@ -23239,7 +20518,7 @@
 </p:sld>
 </file>
 
-<file path=ppt/slides/slide35.xml><?xml version="1.0" encoding="utf-8"?>
+<file path=ppt/slides/slide31.xml><?xml version="1.0" encoding="utf-8"?>
 <p:sld xmlns:a="http://schemas.openxmlformats.org/drawingml/2006/main" xmlns:r="http://schemas.openxmlformats.org/officeDocument/2006/relationships" xmlns:p="http://schemas.openxmlformats.org/presentationml/2006/main">
   <p:cSld>
     <p:spTree>
@@ -26032,61 +23311,6 @@
 </file>
 
 <file path=customXml/item1.xml><?xml version="1.0" encoding="utf-8"?>
-<?mso-contentType ?>
-<FormTemplates xmlns="http://schemas.microsoft.com/sharepoint/v3/contenttype/forms">
-  <Display>DocumentLibraryForm</Display>
-  <Edit>DocumentLibraryForm</Edit>
-  <New>DocumentLibraryForm</New>
-</FormTemplates>
-</file>
-
-<file path=customXml/item2.xml><?xml version="1.0" encoding="utf-8"?>
-<?mso-contentType ?>
-<spe:Receivers xmlns:spe="http://schemas.microsoft.com/sharepoint/events">
-  <Receiver>
-    <Name>Document ID Generator</Name>
-    <Synchronization>Synchronous</Synchronization>
-    <Type>10001</Type>
-    <SequenceNumber>1000</SequenceNumber>
-    <Assembly>Microsoft.Office.DocumentManagement, Version=14.0.0.0, Culture=neutral, PublicKeyToken=71e9bce111e9429c</Assembly>
-    <Class>Microsoft.Office.DocumentManagement.Internal.DocIdHandler</Class>
-    <Data/>
-    <Filter/>
-  </Receiver>
-  <Receiver>
-    <Name>Document ID Generator</Name>
-    <Synchronization>Synchronous</Synchronization>
-    <Type>10002</Type>
-    <SequenceNumber>1001</SequenceNumber>
-    <Assembly>Microsoft.Office.DocumentManagement, Version=14.0.0.0, Culture=neutral, PublicKeyToken=71e9bce111e9429c</Assembly>
-    <Class>Microsoft.Office.DocumentManagement.Internal.DocIdHandler</Class>
-    <Data/>
-    <Filter/>
-  </Receiver>
-  <Receiver>
-    <Name>Document ID Generator</Name>
-    <Synchronization>Synchronous</Synchronization>
-    <Type>10004</Type>
-    <SequenceNumber>1002</SequenceNumber>
-    <Assembly>Microsoft.Office.DocumentManagement, Version=14.0.0.0, Culture=neutral, PublicKeyToken=71e9bce111e9429c</Assembly>
-    <Class>Microsoft.Office.DocumentManagement.Internal.DocIdHandler</Class>
-    <Data/>
-    <Filter/>
-  </Receiver>
-  <Receiver>
-    <Name>Document ID Generator</Name>
-    <Synchronization>Synchronous</Synchronization>
-    <Type>10006</Type>
-    <SequenceNumber>1003</SequenceNumber>
-    <Assembly>Microsoft.Office.DocumentManagement, Version=14.0.0.0, Culture=neutral, PublicKeyToken=71e9bce111e9429c</Assembly>
-    <Class>Microsoft.Office.DocumentManagement.Internal.DocIdHandler</Class>
-    <Data/>
-    <Filter/>
-  </Receiver>
-</spe:Receivers>
-</file>
-
-<file path=customXml/item3.xml><?xml version="1.0" encoding="utf-8"?>
 <ct:contentTypeSchema xmlns:ct="http://schemas.microsoft.com/office/2006/metadata/contentType" xmlns:ma="http://schemas.microsoft.com/office/2006/metadata/properties/metaAttributes" ct:_="" ma:_="" ma:contentTypeName="Document" ma:contentTypeID="0x0101000812F700BE7F874999720E88173FE491" ma:contentTypeVersion="0" ma:contentTypeDescription="Create a new document." ma:contentTypeScope="" ma:versionID="3f79f408e2ca720b7aba6e0e32464d0c">
   <xsd:schema xmlns:xsd="http://www.w3.org/2001/XMLSchema" xmlns:xs="http://www.w3.org/2001/XMLSchema" xmlns:p="http://schemas.microsoft.com/office/2006/metadata/properties" xmlns:ns2="7bb5d761-a2ea-4873-95f7-7a6658fb3ef0" targetNamespace="http://schemas.microsoft.com/office/2006/metadata/properties" ma:root="true" ma:fieldsID="1e062cd38ba31e406bfc4340fbc7f87a" ns2:_="">
     <xsd:import namespace="7bb5d761-a2ea-4873-95f7-7a6658fb3ef0"/>
@@ -26231,6 +23455,61 @@
 </ct:contentTypeSchema>
 </file>
 
+<file path=customXml/item2.xml><?xml version="1.0" encoding="utf-8"?>
+<?mso-contentType ?>
+<spe:Receivers xmlns:spe="http://schemas.microsoft.com/sharepoint/events">
+  <Receiver>
+    <Name>Document ID Generator</Name>
+    <Synchronization>Synchronous</Synchronization>
+    <Type>10001</Type>
+    <SequenceNumber>1000</SequenceNumber>
+    <Assembly>Microsoft.Office.DocumentManagement, Version=14.0.0.0, Culture=neutral, PublicKeyToken=71e9bce111e9429c</Assembly>
+    <Class>Microsoft.Office.DocumentManagement.Internal.DocIdHandler</Class>
+    <Data/>
+    <Filter/>
+  </Receiver>
+  <Receiver>
+    <Name>Document ID Generator</Name>
+    <Synchronization>Synchronous</Synchronization>
+    <Type>10002</Type>
+    <SequenceNumber>1001</SequenceNumber>
+    <Assembly>Microsoft.Office.DocumentManagement, Version=14.0.0.0, Culture=neutral, PublicKeyToken=71e9bce111e9429c</Assembly>
+    <Class>Microsoft.Office.DocumentManagement.Internal.DocIdHandler</Class>
+    <Data/>
+    <Filter/>
+  </Receiver>
+  <Receiver>
+    <Name>Document ID Generator</Name>
+    <Synchronization>Synchronous</Synchronization>
+    <Type>10004</Type>
+    <SequenceNumber>1002</SequenceNumber>
+    <Assembly>Microsoft.Office.DocumentManagement, Version=14.0.0.0, Culture=neutral, PublicKeyToken=71e9bce111e9429c</Assembly>
+    <Class>Microsoft.Office.DocumentManagement.Internal.DocIdHandler</Class>
+    <Data/>
+    <Filter/>
+  </Receiver>
+  <Receiver>
+    <Name>Document ID Generator</Name>
+    <Synchronization>Synchronous</Synchronization>
+    <Type>10006</Type>
+    <SequenceNumber>1003</SequenceNumber>
+    <Assembly>Microsoft.Office.DocumentManagement, Version=14.0.0.0, Culture=neutral, PublicKeyToken=71e9bce111e9429c</Assembly>
+    <Class>Microsoft.Office.DocumentManagement.Internal.DocIdHandler</Class>
+    <Data/>
+    <Filter/>
+  </Receiver>
+</spe:Receivers>
+</file>
+
+<file path=customXml/item3.xml><?xml version="1.0" encoding="utf-8"?>
+<?mso-contentType ?>
+<FormTemplates xmlns="http://schemas.microsoft.com/sharepoint/v3/contenttype/forms">
+  <Display>DocumentLibraryForm</Display>
+  <Edit>DocumentLibraryForm</Edit>
+  <New>DocumentLibraryForm</New>
+</FormTemplates>
+</file>
+
 <file path=customXml/item4.xml><?xml version="1.0" encoding="utf-8"?>
 <p:properties xmlns:p="http://schemas.microsoft.com/office/2006/metadata/properties" xmlns:xsi="http://www.w3.org/2001/XMLSchema-instance" xmlns:pc="http://schemas.microsoft.com/office/infopath/2007/PartnerControls">
   <documentManagement>
@@ -26244,9 +23523,19 @@
 </file>
 
 <file path=customXml/itemProps1.xml><?xml version="1.0" encoding="utf-8"?>
-<ds:datastoreItem xmlns:ds="http://schemas.openxmlformats.org/officeDocument/2006/customXml" ds:itemID="{5CDEB364-43EC-4510-9881-539C2A3FCE9E}">
+<ds:datastoreItem xmlns:ds="http://schemas.openxmlformats.org/officeDocument/2006/customXml" ds:itemID="{164479E5-0B02-49AC-B79E-EC1D6164DDD3}">
   <ds:schemaRefs>
-    <ds:schemaRef ds:uri="http://schemas.microsoft.com/sharepoint/v3/contenttype/forms"/>
+    <ds:schemaRef ds:uri="http://schemas.microsoft.com/office/2006/metadata/contentType"/>
+    <ds:schemaRef ds:uri="http://schemas.microsoft.com/office/2006/metadata/properties/metaAttributes"/>
+    <ds:schemaRef ds:uri="http://www.w3.org/2001/XMLSchema"/>
+    <ds:schemaRef ds:uri="http://schemas.microsoft.com/office/2006/metadata/properties"/>
+    <ds:schemaRef ds:uri="7bb5d761-a2ea-4873-95f7-7a6658fb3ef0"/>
+    <ds:schemaRef ds:uri="http://schemas.microsoft.com/office/2006/documentManagement/types"/>
+    <ds:schemaRef ds:uri="http://schemas.microsoft.com/office/infopath/2007/PartnerControls"/>
+    <ds:schemaRef ds:uri="http://schemas.openxmlformats.org/package/2006/metadata/core-properties"/>
+    <ds:schemaRef ds:uri="http://purl.org/dc/elements/1.1/"/>
+    <ds:schemaRef ds:uri="http://purl.org/dc/terms/"/>
+    <ds:schemaRef ds:uri="http://schemas.microsoft.com/internal/obd"/>
   </ds:schemaRefs>
 </ds:datastoreItem>
 </file>
@@ -26260,19 +23549,9 @@
 </file>
 
 <file path=customXml/itemProps3.xml><?xml version="1.0" encoding="utf-8"?>
-<ds:datastoreItem xmlns:ds="http://schemas.openxmlformats.org/officeDocument/2006/customXml" ds:itemID="{164479E5-0B02-49AC-B79E-EC1D6164DDD3}">
+<ds:datastoreItem xmlns:ds="http://schemas.openxmlformats.org/officeDocument/2006/customXml" ds:itemID="{5CDEB364-43EC-4510-9881-539C2A3FCE9E}">
   <ds:schemaRefs>
-    <ds:schemaRef ds:uri="http://schemas.microsoft.com/office/2006/metadata/contentType"/>
-    <ds:schemaRef ds:uri="http://schemas.microsoft.com/office/2006/metadata/properties/metaAttributes"/>
-    <ds:schemaRef ds:uri="http://www.w3.org/2001/XMLSchema"/>
-    <ds:schemaRef ds:uri="http://schemas.microsoft.com/office/2006/metadata/properties"/>
-    <ds:schemaRef ds:uri="7bb5d761-a2ea-4873-95f7-7a6658fb3ef0"/>
-    <ds:schemaRef ds:uri="http://schemas.microsoft.com/office/2006/documentManagement/types"/>
-    <ds:schemaRef ds:uri="http://schemas.microsoft.com/office/infopath/2007/PartnerControls"/>
-    <ds:schemaRef ds:uri="http://schemas.openxmlformats.org/package/2006/metadata/core-properties"/>
-    <ds:schemaRef ds:uri="http://purl.org/dc/elements/1.1/"/>
-    <ds:schemaRef ds:uri="http://purl.org/dc/terms/"/>
-    <ds:schemaRef ds:uri="http://schemas.microsoft.com/internal/obd"/>
+    <ds:schemaRef ds:uri="http://schemas.microsoft.com/sharepoint/v3/contenttype/forms"/>
   </ds:schemaRefs>
 </ds:datastoreItem>
 </file>

</xml_diff>

<commit_message>
edited instructor note on 5-29 InSpec Directory Structure Roadmap slide I might add a Windows lab to this module after we see how the end-of-Feb Compliance software works.
</commit_message>
<xml_diff>
--- a/05-creating-custom-profiles.pptx
+++ b/05-creating-custom-profiles.pptx
@@ -5430,7 +5430,31 @@
                 <a:ea typeface="ＭＳ Ｐゴシック" charset="0"/>
                 <a:cs typeface="Arial" panose="020B0604020202020204" pitchFamily="34" charset="0"/>
               </a:rPr>
-              <a:t> would not be</a:t>
+              <a:t> </a:t>
+            </a:r>
+            <a:r>
+              <a:rPr lang="en-US" sz="1200" b="0" i="0" kern="1200" dirty="0" smtClean="0">
+                <a:solidFill>
+                  <a:schemeClr val="tx1"/>
+                </a:solidFill>
+                <a:effectLst/>
+                <a:latin typeface="Arial" panose="020B0604020202020204" pitchFamily="34" charset="0"/>
+                <a:ea typeface="ＭＳ Ｐゴシック" charset="0"/>
+                <a:cs typeface="Arial" panose="020B0604020202020204" pitchFamily="34" charset="0"/>
+              </a:rPr>
+              <a:t>and Compliance Server would </a:t>
+            </a:r>
+            <a:r>
+              <a:rPr lang="en-US" sz="1200" b="0" i="0" kern="1200" dirty="0" smtClean="0">
+                <a:solidFill>
+                  <a:schemeClr val="tx1"/>
+                </a:solidFill>
+                <a:effectLst/>
+                <a:latin typeface="Arial" panose="020B0604020202020204" pitchFamily="34" charset="0"/>
+                <a:ea typeface="ＭＳ Ｐゴシック" charset="0"/>
+                <a:cs typeface="Arial" panose="020B0604020202020204" pitchFamily="34" charset="0"/>
+              </a:rPr>
+              <a:t>not be</a:t>
             </a:r>
             <a:r>
               <a:rPr lang="en-US" sz="1200" b="0" i="0" kern="1200" baseline="0" dirty="0" smtClean="0">
@@ -5442,8 +5466,88 @@
                 <a:ea typeface="ＭＳ Ｐゴシック" charset="0"/>
                 <a:cs typeface="Arial" panose="020B0604020202020204" pitchFamily="34" charset="0"/>
               </a:rPr>
-              <a:t> an awesome message to tell. Here is a link to where the image on the right was derived: https://github.com/chef/inspec/blob/1f325b1cfd02391fab14a996693a034da37aadd8/docs/profiles.rst </a:t>
-            </a:r>
+              <a:t> </a:t>
+            </a:r>
+            <a:r>
+              <a:rPr lang="en-US" sz="1200" b="0" i="0" kern="1200" baseline="0" dirty="0" smtClean="0">
+                <a:solidFill>
+                  <a:schemeClr val="tx1"/>
+                </a:solidFill>
+                <a:effectLst/>
+                <a:latin typeface="Arial" panose="020B0604020202020204" pitchFamily="34" charset="0"/>
+                <a:ea typeface="ＭＳ Ｐゴシック" charset="0"/>
+                <a:cs typeface="Arial" panose="020B0604020202020204" pitchFamily="34" charset="0"/>
+              </a:rPr>
+              <a:t>the best message </a:t>
+            </a:r>
+            <a:r>
+              <a:rPr lang="en-US" sz="1200" b="0" i="0" kern="1200" baseline="0" dirty="0" smtClean="0">
+                <a:solidFill>
+                  <a:schemeClr val="tx1"/>
+                </a:solidFill>
+                <a:effectLst/>
+                <a:latin typeface="Arial" panose="020B0604020202020204" pitchFamily="34" charset="0"/>
+                <a:ea typeface="ＭＳ Ｐゴシック" charset="0"/>
+                <a:cs typeface="Arial" panose="020B0604020202020204" pitchFamily="34" charset="0"/>
+              </a:rPr>
+              <a:t>to tell. Here is a link to where the image on the right was derived: https://github.com/chef/inspec/blob/1f325b1cfd02391fab14a996693a034da37aadd8/docs/profiles.rst </a:t>
+            </a:r>
+            <a:endParaRPr lang="en-US" sz="1200" b="0" i="0" kern="1200" baseline="0" dirty="0" smtClean="0">
+              <a:solidFill>
+                <a:schemeClr val="tx1"/>
+              </a:solidFill>
+              <a:effectLst/>
+              <a:latin typeface="Arial" panose="020B0604020202020204" pitchFamily="34" charset="0"/>
+              <a:ea typeface="ＭＳ Ｐゴシック" charset="0"/>
+              <a:cs typeface="Arial" panose="020B0604020202020204" pitchFamily="34" charset="0"/>
+            </a:endParaRPr>
+          </a:p>
+          <a:p>
+            <a:r>
+              <a:rPr lang="en-US" sz="1200" b="0" i="0" kern="1200" baseline="0" dirty="0" smtClean="0">
+                <a:solidFill>
+                  <a:schemeClr val="tx1"/>
+                </a:solidFill>
+                <a:effectLst/>
+                <a:latin typeface="Arial" panose="020B0604020202020204" pitchFamily="34" charset="0"/>
+                <a:ea typeface="ＭＳ Ｐゴシック" charset="0"/>
+                <a:cs typeface="Arial" panose="020B0604020202020204" pitchFamily="34" charset="0"/>
+              </a:rPr>
+              <a:t>By end of Feb 2016 we expect a new version of Compliance Server and ChefDK, which will both include a newer version (0.10.1?) of </a:t>
+            </a:r>
+            <a:r>
+              <a:rPr lang="en-US" sz="1200" b="0" i="0" kern="1200" baseline="0" dirty="0" err="1" smtClean="0">
+                <a:solidFill>
+                  <a:schemeClr val="tx1"/>
+                </a:solidFill>
+                <a:effectLst/>
+                <a:latin typeface="Arial" panose="020B0604020202020204" pitchFamily="34" charset="0"/>
+                <a:ea typeface="ＭＳ Ｐゴシック" charset="0"/>
+                <a:cs typeface="Arial" panose="020B0604020202020204" pitchFamily="34" charset="0"/>
+              </a:rPr>
+              <a:t>inspec</a:t>
+            </a:r>
+            <a:r>
+              <a:rPr lang="en-US" sz="1200" b="0" i="0" kern="1200" baseline="0" dirty="0" smtClean="0">
+                <a:solidFill>
+                  <a:schemeClr val="tx1"/>
+                </a:solidFill>
+                <a:effectLst/>
+                <a:latin typeface="Arial" panose="020B0604020202020204" pitchFamily="34" charset="0"/>
+                <a:ea typeface="ＭＳ Ｐゴシック" charset="0"/>
+                <a:cs typeface="Arial" panose="020B0604020202020204" pitchFamily="34" charset="0"/>
+              </a:rPr>
+              <a:t>. At that point we'll rev this course accordingly.</a:t>
+            </a:r>
+            <a:endParaRPr lang="en-US" sz="1200" b="0" i="0" kern="1200" baseline="0" dirty="0" smtClean="0">
+              <a:solidFill>
+                <a:schemeClr val="tx1"/>
+              </a:solidFill>
+              <a:effectLst/>
+              <a:latin typeface="Arial" panose="020B0604020202020204" pitchFamily="34" charset="0"/>
+              <a:ea typeface="ＭＳ Ｐゴシック" charset="0"/>
+              <a:cs typeface="Arial" panose="020B0604020202020204" pitchFamily="34" charset="0"/>
+            </a:endParaRPr>
           </a:p>
           <a:p>
             <a:endParaRPr lang="en-US" sz="1200" b="0" i="0" kern="1200" baseline="0" dirty="0" smtClean="0">
@@ -8317,14 +8421,14 @@
           </a:ln>
           <a:extLst>
             <a:ext uri="{909E8E84-426E-40dd-AFC4-6F175D3DCCD1}">
-              <a14:hiddenFill xmlns="" xmlns:a14="http://schemas.microsoft.com/office/drawing/2010/main">
+              <a14:hiddenFill xmlns:a14="http://schemas.microsoft.com/office/drawing/2010/main" xmlns="">
                 <a:solidFill>
                   <a:srgbClr val="FFFFFF"/>
                 </a:solidFill>
               </a14:hiddenFill>
             </a:ext>
             <a:ext uri="{91240B29-F687-4f45-9708-019B960494DF}">
-              <a14:hiddenLine xmlns="" xmlns:a14="http://schemas.microsoft.com/office/drawing/2010/main" w="9525">
+              <a14:hiddenLine xmlns:a14="http://schemas.microsoft.com/office/drawing/2010/main" xmlns="" w="9525">
                 <a:solidFill>
                   <a:srgbClr val="000000"/>
                 </a:solidFill>
@@ -8472,14 +8576,14 @@
           </a:ln>
           <a:extLst>
             <a:ext uri="{909E8E84-426E-40dd-AFC4-6F175D3DCCD1}">
-              <a14:hiddenFill xmlns="" xmlns:a14="http://schemas.microsoft.com/office/drawing/2010/main">
+              <a14:hiddenFill xmlns:a14="http://schemas.microsoft.com/office/drawing/2010/main" xmlns="">
                 <a:solidFill>
                   <a:srgbClr val="FFFFFF"/>
                 </a:solidFill>
               </a14:hiddenFill>
             </a:ext>
             <a:ext uri="{91240B29-F687-4f45-9708-019B960494DF}">
-              <a14:hiddenLine xmlns="" xmlns:a14="http://schemas.microsoft.com/office/drawing/2010/main" w="9525">
+              <a14:hiddenLine xmlns:a14="http://schemas.microsoft.com/office/drawing/2010/main" xmlns="" w="9525">
                 <a:solidFill>
                   <a:srgbClr val="000000"/>
                 </a:solidFill>
@@ -8970,14 +9074,14 @@
           </a:ln>
           <a:extLst>
             <a:ext uri="{909E8E84-426E-40dd-AFC4-6F175D3DCCD1}">
-              <a14:hiddenFill xmlns="" xmlns:a14="http://schemas.microsoft.com/office/drawing/2010/main">
+              <a14:hiddenFill xmlns:a14="http://schemas.microsoft.com/office/drawing/2010/main" xmlns="">
                 <a:solidFill>
                   <a:srgbClr val="FFFFFF"/>
                 </a:solidFill>
               </a14:hiddenFill>
             </a:ext>
             <a:ext uri="{91240B29-F687-4f45-9708-019B960494DF}">
-              <a14:hiddenLine xmlns="" xmlns:a14="http://schemas.microsoft.com/office/drawing/2010/main" w="9525">
+              <a14:hiddenLine xmlns:a14="http://schemas.microsoft.com/office/drawing/2010/main" xmlns="" w="9525">
                 <a:solidFill>
                   <a:srgbClr val="000000"/>
                 </a:solidFill>
@@ -9503,14 +9607,14 @@
           </a:ln>
           <a:extLst>
             <a:ext uri="{909E8E84-426E-40dd-AFC4-6F175D3DCCD1}">
-              <a14:hiddenFill xmlns="" xmlns:a14="http://schemas.microsoft.com/office/drawing/2010/main">
+              <a14:hiddenFill xmlns:a14="http://schemas.microsoft.com/office/drawing/2010/main" xmlns="">
                 <a:solidFill>
                   <a:srgbClr val="FFFFFF"/>
                 </a:solidFill>
               </a14:hiddenFill>
             </a:ext>
             <a:ext uri="{91240B29-F687-4f45-9708-019B960494DF}">
-              <a14:hiddenLine xmlns="" xmlns:a14="http://schemas.microsoft.com/office/drawing/2010/main" w="9525">
+              <a14:hiddenLine xmlns:a14="http://schemas.microsoft.com/office/drawing/2010/main" xmlns="" w="9525">
                 <a:solidFill>
                   <a:srgbClr val="000000"/>
                 </a:solidFill>
@@ -11134,14 +11238,14 @@
           </a:ln>
           <a:extLst>
             <a:ext uri="{909E8E84-426E-40dd-AFC4-6F175D3DCCD1}">
-              <a14:hiddenFill xmlns="" xmlns:a14="http://schemas.microsoft.com/office/drawing/2010/main">
+              <a14:hiddenFill xmlns:a14="http://schemas.microsoft.com/office/drawing/2010/main" xmlns="">
                 <a:solidFill>
                   <a:srgbClr val="FFFFFF"/>
                 </a:solidFill>
               </a14:hiddenFill>
             </a:ext>
             <a:ext uri="{91240B29-F687-4f45-9708-019B960494DF}">
-              <a14:hiddenLine xmlns="" xmlns:a14="http://schemas.microsoft.com/office/drawing/2010/main" w="9525">
+              <a14:hiddenLine xmlns:a14="http://schemas.microsoft.com/office/drawing/2010/main" xmlns="" w="9525">
                 <a:solidFill>
                   <a:srgbClr val="000000"/>
                 </a:solidFill>
@@ -12495,14 +12599,14 @@
           </a:ln>
           <a:extLst>
             <a:ext uri="{909E8E84-426E-40dd-AFC4-6F175D3DCCD1}">
-              <a14:hiddenFill xmlns="" xmlns:a14="http://schemas.microsoft.com/office/drawing/2010/main">
+              <a14:hiddenFill xmlns:a14="http://schemas.microsoft.com/office/drawing/2010/main" xmlns="">
                 <a:solidFill>
                   <a:srgbClr val="FFFFFF"/>
                 </a:solidFill>
               </a14:hiddenFill>
             </a:ext>
             <a:ext uri="{91240B29-F687-4f45-9708-019B960494DF}">
-              <a14:hiddenLine xmlns="" xmlns:a14="http://schemas.microsoft.com/office/drawing/2010/main" w="9525">
+              <a14:hiddenLine xmlns:a14="http://schemas.microsoft.com/office/drawing/2010/main" xmlns="" w="9525">
                 <a:solidFill>
                   <a:srgbClr val="000000"/>
                 </a:solidFill>
@@ -13008,14 +13112,14 @@
           </a:ln>
           <a:extLst>
             <a:ext uri="{909E8E84-426E-40dd-AFC4-6F175D3DCCD1}">
-              <a14:hiddenFill xmlns="" xmlns:a14="http://schemas.microsoft.com/office/drawing/2010/main">
+              <a14:hiddenFill xmlns:a14="http://schemas.microsoft.com/office/drawing/2010/main" xmlns="">
                 <a:solidFill>
                   <a:srgbClr val="FFFFFF"/>
                 </a:solidFill>
               </a14:hiddenFill>
             </a:ext>
             <a:ext uri="{91240B29-F687-4f45-9708-019B960494DF}">
-              <a14:hiddenLine xmlns="" xmlns:a14="http://schemas.microsoft.com/office/drawing/2010/main" w="9525">
+              <a14:hiddenLine xmlns:a14="http://schemas.microsoft.com/office/drawing/2010/main" xmlns="" w="9525">
                 <a:solidFill>
                   <a:srgbClr val="000000"/>
                 </a:solidFill>
@@ -13582,14 +13686,14 @@
           </a:ln>
           <a:extLst>
             <a:ext uri="{909E8E84-426E-40dd-AFC4-6F175D3DCCD1}">
-              <a14:hiddenFill xmlns="" xmlns:a14="http://schemas.microsoft.com/office/drawing/2010/main">
+              <a14:hiddenFill xmlns:a14="http://schemas.microsoft.com/office/drawing/2010/main" xmlns="">
                 <a:solidFill>
                   <a:srgbClr val="FFFFFF"/>
                 </a:solidFill>
               </a14:hiddenFill>
             </a:ext>
             <a:ext uri="{91240B29-F687-4f45-9708-019B960494DF}">
-              <a14:hiddenLine xmlns="" xmlns:a14="http://schemas.microsoft.com/office/drawing/2010/main" w="9525">
+              <a14:hiddenLine xmlns:a14="http://schemas.microsoft.com/office/drawing/2010/main" xmlns="" w="9525">
                 <a:solidFill>
                   <a:srgbClr val="000000"/>
                 </a:solidFill>
@@ -14529,14 +14633,14 @@
           </a:ln>
           <a:extLst>
             <a:ext uri="{909E8E84-426E-40dd-AFC4-6F175D3DCCD1}">
-              <a14:hiddenFill xmlns="" xmlns:a14="http://schemas.microsoft.com/office/drawing/2010/main">
+              <a14:hiddenFill xmlns:a14="http://schemas.microsoft.com/office/drawing/2010/main" xmlns="">
                 <a:solidFill>
                   <a:srgbClr val="FFFFFF"/>
                 </a:solidFill>
               </a14:hiddenFill>
             </a:ext>
             <a:ext uri="{91240B29-F687-4f45-9708-019B960494DF}">
-              <a14:hiddenLine xmlns="" xmlns:a14="http://schemas.microsoft.com/office/drawing/2010/main" w="9525">
+              <a14:hiddenLine xmlns:a14="http://schemas.microsoft.com/office/drawing/2010/main" xmlns="" w="9525">
                 <a:solidFill>
                   <a:srgbClr val="000000"/>
                 </a:solidFill>
@@ -15289,14 +15393,14 @@
           </a:ln>
           <a:extLst>
             <a:ext uri="{909E8E84-426E-40dd-AFC4-6F175D3DCCD1}">
-              <a14:hiddenFill xmlns="" xmlns:a14="http://schemas.microsoft.com/office/drawing/2010/main">
+              <a14:hiddenFill xmlns:a14="http://schemas.microsoft.com/office/drawing/2010/main" xmlns="">
                 <a:solidFill>
                   <a:srgbClr val="FFFFFF"/>
                 </a:solidFill>
               </a14:hiddenFill>
             </a:ext>
             <a:ext uri="{91240B29-F687-4f45-9708-019B960494DF}">
-              <a14:hiddenLine xmlns="" xmlns:a14="http://schemas.microsoft.com/office/drawing/2010/main" w="9525">
+              <a14:hiddenLine xmlns:a14="http://schemas.microsoft.com/office/drawing/2010/main" xmlns="" w="9525">
                 <a:solidFill>
                   <a:srgbClr val="000000"/>
                 </a:solidFill>
@@ -23311,6 +23415,61 @@
 </file>
 
 <file path=customXml/item1.xml><?xml version="1.0" encoding="utf-8"?>
+<?mso-contentType ?>
+<FormTemplates xmlns="http://schemas.microsoft.com/sharepoint/v3/contenttype/forms">
+  <Display>DocumentLibraryForm</Display>
+  <Edit>DocumentLibraryForm</Edit>
+  <New>DocumentLibraryForm</New>
+</FormTemplates>
+</file>
+
+<file path=customXml/item2.xml><?xml version="1.0" encoding="utf-8"?>
+<?mso-contentType ?>
+<spe:Receivers xmlns:spe="http://schemas.microsoft.com/sharepoint/events">
+  <Receiver>
+    <Name>Document ID Generator</Name>
+    <Synchronization>Synchronous</Synchronization>
+    <Type>10001</Type>
+    <SequenceNumber>1000</SequenceNumber>
+    <Assembly>Microsoft.Office.DocumentManagement, Version=14.0.0.0, Culture=neutral, PublicKeyToken=71e9bce111e9429c</Assembly>
+    <Class>Microsoft.Office.DocumentManagement.Internal.DocIdHandler</Class>
+    <Data/>
+    <Filter/>
+  </Receiver>
+  <Receiver>
+    <Name>Document ID Generator</Name>
+    <Synchronization>Synchronous</Synchronization>
+    <Type>10002</Type>
+    <SequenceNumber>1001</SequenceNumber>
+    <Assembly>Microsoft.Office.DocumentManagement, Version=14.0.0.0, Culture=neutral, PublicKeyToken=71e9bce111e9429c</Assembly>
+    <Class>Microsoft.Office.DocumentManagement.Internal.DocIdHandler</Class>
+    <Data/>
+    <Filter/>
+  </Receiver>
+  <Receiver>
+    <Name>Document ID Generator</Name>
+    <Synchronization>Synchronous</Synchronization>
+    <Type>10004</Type>
+    <SequenceNumber>1002</SequenceNumber>
+    <Assembly>Microsoft.Office.DocumentManagement, Version=14.0.0.0, Culture=neutral, PublicKeyToken=71e9bce111e9429c</Assembly>
+    <Class>Microsoft.Office.DocumentManagement.Internal.DocIdHandler</Class>
+    <Data/>
+    <Filter/>
+  </Receiver>
+  <Receiver>
+    <Name>Document ID Generator</Name>
+    <Synchronization>Synchronous</Synchronization>
+    <Type>10006</Type>
+    <SequenceNumber>1003</SequenceNumber>
+    <Assembly>Microsoft.Office.DocumentManagement, Version=14.0.0.0, Culture=neutral, PublicKeyToken=71e9bce111e9429c</Assembly>
+    <Class>Microsoft.Office.DocumentManagement.Internal.DocIdHandler</Class>
+    <Data/>
+    <Filter/>
+  </Receiver>
+</spe:Receivers>
+</file>
+
+<file path=customXml/item3.xml><?xml version="1.0" encoding="utf-8"?>
 <ct:contentTypeSchema xmlns:ct="http://schemas.microsoft.com/office/2006/metadata/contentType" xmlns:ma="http://schemas.microsoft.com/office/2006/metadata/properties/metaAttributes" ct:_="" ma:_="" ma:contentTypeName="Document" ma:contentTypeID="0x0101000812F700BE7F874999720E88173FE491" ma:contentTypeVersion="0" ma:contentTypeDescription="Create a new document." ma:contentTypeScope="" ma:versionID="3f79f408e2ca720b7aba6e0e32464d0c">
   <xsd:schema xmlns:xsd="http://www.w3.org/2001/XMLSchema" xmlns:xs="http://www.w3.org/2001/XMLSchema" xmlns:p="http://schemas.microsoft.com/office/2006/metadata/properties" xmlns:ns2="7bb5d761-a2ea-4873-95f7-7a6658fb3ef0" targetNamespace="http://schemas.microsoft.com/office/2006/metadata/properties" ma:root="true" ma:fieldsID="1e062cd38ba31e406bfc4340fbc7f87a" ns2:_="">
     <xsd:import namespace="7bb5d761-a2ea-4873-95f7-7a6658fb3ef0"/>
@@ -23455,61 +23614,6 @@
 </ct:contentTypeSchema>
 </file>
 
-<file path=customXml/item2.xml><?xml version="1.0" encoding="utf-8"?>
-<?mso-contentType ?>
-<spe:Receivers xmlns:spe="http://schemas.microsoft.com/sharepoint/events">
-  <Receiver>
-    <Name>Document ID Generator</Name>
-    <Synchronization>Synchronous</Synchronization>
-    <Type>10001</Type>
-    <SequenceNumber>1000</SequenceNumber>
-    <Assembly>Microsoft.Office.DocumentManagement, Version=14.0.0.0, Culture=neutral, PublicKeyToken=71e9bce111e9429c</Assembly>
-    <Class>Microsoft.Office.DocumentManagement.Internal.DocIdHandler</Class>
-    <Data/>
-    <Filter/>
-  </Receiver>
-  <Receiver>
-    <Name>Document ID Generator</Name>
-    <Synchronization>Synchronous</Synchronization>
-    <Type>10002</Type>
-    <SequenceNumber>1001</SequenceNumber>
-    <Assembly>Microsoft.Office.DocumentManagement, Version=14.0.0.0, Culture=neutral, PublicKeyToken=71e9bce111e9429c</Assembly>
-    <Class>Microsoft.Office.DocumentManagement.Internal.DocIdHandler</Class>
-    <Data/>
-    <Filter/>
-  </Receiver>
-  <Receiver>
-    <Name>Document ID Generator</Name>
-    <Synchronization>Synchronous</Synchronization>
-    <Type>10004</Type>
-    <SequenceNumber>1002</SequenceNumber>
-    <Assembly>Microsoft.Office.DocumentManagement, Version=14.0.0.0, Culture=neutral, PublicKeyToken=71e9bce111e9429c</Assembly>
-    <Class>Microsoft.Office.DocumentManagement.Internal.DocIdHandler</Class>
-    <Data/>
-    <Filter/>
-  </Receiver>
-  <Receiver>
-    <Name>Document ID Generator</Name>
-    <Synchronization>Synchronous</Synchronization>
-    <Type>10006</Type>
-    <SequenceNumber>1003</SequenceNumber>
-    <Assembly>Microsoft.Office.DocumentManagement, Version=14.0.0.0, Culture=neutral, PublicKeyToken=71e9bce111e9429c</Assembly>
-    <Class>Microsoft.Office.DocumentManagement.Internal.DocIdHandler</Class>
-    <Data/>
-    <Filter/>
-  </Receiver>
-</spe:Receivers>
-</file>
-
-<file path=customXml/item3.xml><?xml version="1.0" encoding="utf-8"?>
-<?mso-contentType ?>
-<FormTemplates xmlns="http://schemas.microsoft.com/sharepoint/v3/contenttype/forms">
-  <Display>DocumentLibraryForm</Display>
-  <Edit>DocumentLibraryForm</Edit>
-  <New>DocumentLibraryForm</New>
-</FormTemplates>
-</file>
-
 <file path=customXml/item4.xml><?xml version="1.0" encoding="utf-8"?>
 <p:properties xmlns:p="http://schemas.microsoft.com/office/2006/metadata/properties" xmlns:xsi="http://www.w3.org/2001/XMLSchema-instance" xmlns:pc="http://schemas.microsoft.com/office/infopath/2007/PartnerControls">
   <documentManagement>
@@ -23523,6 +23627,22 @@
 </file>
 
 <file path=customXml/itemProps1.xml><?xml version="1.0" encoding="utf-8"?>
+<ds:datastoreItem xmlns:ds="http://schemas.openxmlformats.org/officeDocument/2006/customXml" ds:itemID="{5CDEB364-43EC-4510-9881-539C2A3FCE9E}">
+  <ds:schemaRefs>
+    <ds:schemaRef ds:uri="http://schemas.microsoft.com/sharepoint/v3/contenttype/forms"/>
+  </ds:schemaRefs>
+</ds:datastoreItem>
+</file>
+
+<file path=customXml/itemProps2.xml><?xml version="1.0" encoding="utf-8"?>
+<ds:datastoreItem xmlns:ds="http://schemas.openxmlformats.org/officeDocument/2006/customXml" ds:itemID="{B13EBC30-FE27-4C6A-B723-23FC2188F7DC}">
+  <ds:schemaRefs>
+    <ds:schemaRef ds:uri="http://schemas.microsoft.com/sharepoint/events"/>
+  </ds:schemaRefs>
+</ds:datastoreItem>
+</file>
+
+<file path=customXml/itemProps3.xml><?xml version="1.0" encoding="utf-8"?>
 <ds:datastoreItem xmlns:ds="http://schemas.openxmlformats.org/officeDocument/2006/customXml" ds:itemID="{164479E5-0B02-49AC-B79E-EC1D6164DDD3}">
   <ds:schemaRefs>
     <ds:schemaRef ds:uri="http://schemas.microsoft.com/office/2006/metadata/contentType"/>
@@ -23536,22 +23656,6 @@
     <ds:schemaRef ds:uri="http://purl.org/dc/elements/1.1/"/>
     <ds:schemaRef ds:uri="http://purl.org/dc/terms/"/>
     <ds:schemaRef ds:uri="http://schemas.microsoft.com/internal/obd"/>
-  </ds:schemaRefs>
-</ds:datastoreItem>
-</file>
-
-<file path=customXml/itemProps2.xml><?xml version="1.0" encoding="utf-8"?>
-<ds:datastoreItem xmlns:ds="http://schemas.openxmlformats.org/officeDocument/2006/customXml" ds:itemID="{B13EBC30-FE27-4C6A-B723-23FC2188F7DC}">
-  <ds:schemaRefs>
-    <ds:schemaRef ds:uri="http://schemas.microsoft.com/sharepoint/events"/>
-  </ds:schemaRefs>
-</ds:datastoreItem>
-</file>
-
-<file path=customXml/itemProps3.xml><?xml version="1.0" encoding="utf-8"?>
-<ds:datastoreItem xmlns:ds="http://schemas.openxmlformats.org/officeDocument/2006/customXml" ds:itemID="{5CDEB364-43EC-4510-9881-539C2A3FCE9E}">
-  <ds:schemaRefs>
-    <ds:schemaRef ds:uri="http://schemas.microsoft.com/sharepoint/v3/contenttype/forms"/>
   </ds:schemaRefs>
 </ds:datastoreItem>
 </file>

</xml_diff>

<commit_message>
05-creating-custom-profiles removed TBDs and added one quiz question more questions will be added when we test this course on the Late February v1.0 Compliance software since inspec.yml will replace the inspec requirement of metadata.rb. Plus the new  command will change the way we create profiles too.
</commit_message>
<xml_diff>
--- a/05-creating-custom-profiles.pptx
+++ b/05-creating-custom-profiles.pptx
@@ -304,7 +304,7 @@
               <a:pPr>
                 <a:defRPr/>
               </a:pPr>
-              <a:t>2016-02-10</a:t>
+              <a:t>2016-02-11</a:t>
             </a:fld>
             <a:endParaRPr lang="en-US" dirty="0"/>
           </a:p>
@@ -487,7 +487,7 @@
               <a:pPr>
                 <a:defRPr/>
               </a:pPr>
-              <a:t>2016-02-10</a:t>
+              <a:t>2016-02-11</a:t>
             </a:fld>
             <a:endParaRPr lang="en-US" dirty="0"/>
           </a:p>
@@ -1598,54 +1598,6 @@
               <a:tabLst/>
               <a:defRPr/>
             </a:pPr>
-            <a:endParaRPr lang="en-US" baseline="0" dirty="0" smtClean="0"/>
-          </a:p>
-          <a:p>
-            <a:pPr marL="0" marR="0" indent="0" algn="l" defTabSz="1217613" rtl="0" eaLnBrk="1" fontAlgn="base" latinLnBrk="0" hangingPunct="1">
-              <a:lnSpc>
-                <a:spcPct val="90000"/>
-              </a:lnSpc>
-              <a:spcBef>
-                <a:spcPct val="30000"/>
-              </a:spcBef>
-              <a:spcAft>
-                <a:spcPts val="450"/>
-              </a:spcAft>
-              <a:buClrTx/>
-              <a:buSzTx/>
-              <a:buFontTx/>
-              <a:buNone/>
-              <a:tabLst/>
-              <a:defRPr/>
-            </a:pPr>
-            <a:r>
-              <a:rPr lang="en-US" baseline="0" dirty="0" err="1" smtClean="0"/>
-              <a:t>tbd</a:t>
-            </a:r>
-            <a:r>
-              <a:rPr lang="en-US" baseline="0" dirty="0" smtClean="0"/>
-              <a:t> Let's find out where the 14 rules are found on 5-14.</a:t>
-            </a:r>
-            <a:endParaRPr lang="en-US" dirty="0" smtClean="0"/>
-          </a:p>
-          <a:p>
-            <a:pPr marL="0" marR="0" indent="0" algn="l" defTabSz="1217613" rtl="0" eaLnBrk="1" fontAlgn="base" latinLnBrk="0" hangingPunct="1">
-              <a:lnSpc>
-                <a:spcPct val="90000"/>
-              </a:lnSpc>
-              <a:spcBef>
-                <a:spcPct val="30000"/>
-              </a:spcBef>
-              <a:spcAft>
-                <a:spcPts val="450"/>
-              </a:spcAft>
-              <a:buClrTx/>
-              <a:buSzTx/>
-              <a:buFontTx/>
-              <a:buNone/>
-              <a:tabLst/>
-              <a:defRPr/>
-            </a:pPr>
             <a:endParaRPr lang="en-US" dirty="0" smtClean="0"/>
           </a:p>
         </p:txBody>
@@ -1778,7 +1730,7 @@
         <p:spPr/>
         <p:txBody>
           <a:bodyPr>
-            <a:normAutofit fontScale="47500" lnSpcReduction="20000"/>
+            <a:normAutofit fontScale="55000" lnSpcReduction="20000"/>
           </a:bodyPr>
           <a:lstStyle/>
           <a:p>
@@ -1800,95 +1752,16 @@
               <a:defRPr/>
             </a:pPr>
             <a:r>
-              <a:rPr lang="en-US" dirty="0" err="1" smtClean="0"/>
-              <a:t>tbd</a:t>
-            </a:r>
-            <a:r>
-              <a:rPr lang="en-US" dirty="0" smtClean="0"/>
-              <a:t> - Note: I</a:t>
-            </a:r>
-            <a:r>
-              <a:rPr lang="en-US" sz="1200" b="0" i="0" kern="1200" dirty="0" smtClean="0">
-                <a:solidFill>
-                  <a:schemeClr val="tx1"/>
-                </a:solidFill>
-                <a:effectLst/>
-                <a:latin typeface="Arial" panose="020B0604020202020204" pitchFamily="34" charset="0"/>
-                <a:ea typeface="ＭＳ Ｐゴシック" charset="0"/>
-                <a:cs typeface="Arial" panose="020B0604020202020204" pitchFamily="34" charset="0"/>
-              </a:rPr>
-              <a:t>t's generally correct to use single quotes unless string interpolation is used, in which doubles are correct. Check with </a:t>
-            </a:r>
-            <a:r>
-              <a:rPr lang="en-US" sz="1200" b="0" i="0" kern="1200" dirty="0" err="1" smtClean="0">
-                <a:solidFill>
-                  <a:schemeClr val="tx1"/>
-                </a:solidFill>
-                <a:effectLst/>
-                <a:latin typeface="Arial" panose="020B0604020202020204" pitchFamily="34" charset="0"/>
-                <a:ea typeface="ＭＳ Ｐゴシック" charset="0"/>
-                <a:cs typeface="Arial" panose="020B0604020202020204" pitchFamily="34" charset="0"/>
-              </a:rPr>
-              <a:t>inspec</a:t>
-            </a:r>
-            <a:r>
-              <a:rPr lang="en-US" sz="1200" b="0" i="0" kern="1200" dirty="0" smtClean="0">
-                <a:solidFill>
-                  <a:schemeClr val="tx1"/>
-                </a:solidFill>
-                <a:effectLst/>
-                <a:latin typeface="Arial" panose="020B0604020202020204" pitchFamily="34" charset="0"/>
-                <a:ea typeface="ＭＳ Ｐゴシック" charset="0"/>
-                <a:cs typeface="Arial" panose="020B0604020202020204" pitchFamily="34" charset="0"/>
-              </a:rPr>
-              <a:t> team about describe statement correctness</a:t>
-            </a:r>
-          </a:p>
-          <a:p>
-            <a:pPr marL="0" marR="0" indent="0" algn="l" defTabSz="1217613" rtl="0" eaLnBrk="1" fontAlgn="base" latinLnBrk="0" hangingPunct="1">
-              <a:lnSpc>
-                <a:spcPct val="90000"/>
-              </a:lnSpc>
-              <a:spcBef>
-                <a:spcPct val="30000"/>
-              </a:spcBef>
-              <a:spcAft>
-                <a:spcPts val="450"/>
-              </a:spcAft>
-              <a:buClrTx/>
-              <a:buSzTx/>
-              <a:buFontTx/>
-              <a:buNone/>
-              <a:tabLst/>
-              <a:defRPr/>
-            </a:pPr>
-            <a:endParaRPr lang="en-US" dirty="0" smtClean="0"/>
-          </a:p>
-          <a:p>
-            <a:pPr marL="0" marR="0" indent="0" algn="l" defTabSz="1217613" rtl="0" eaLnBrk="1" fontAlgn="base" latinLnBrk="0" hangingPunct="1">
-              <a:lnSpc>
-                <a:spcPct val="90000"/>
-              </a:lnSpc>
-              <a:spcBef>
-                <a:spcPct val="30000"/>
-              </a:spcBef>
-              <a:spcAft>
-                <a:spcPts val="450"/>
-              </a:spcAft>
-              <a:buClrTx/>
-              <a:buSzTx/>
-              <a:buFontTx/>
-              <a:buNone/>
-              <a:tabLst/>
-              <a:defRPr/>
-            </a:pPr>
-            <a:r>
               <a:rPr lang="en-US" dirty="0" smtClean="0"/>
               <a:t>Create</a:t>
             </a:r>
             <a:r>
               <a:rPr lang="en-US" baseline="0" dirty="0" smtClean="0"/>
-              <a:t> the </a:t>
+              <a:t> </a:t>
+            </a:r>
+            <a:r>
+              <a:rPr lang="en-US" baseline="0" dirty="0" smtClean="0"/>
+              <a:t>the </a:t>
             </a:r>
             <a:r>
               <a:rPr lang="en-US" dirty="0" smtClean="0"/>
@@ -2596,6 +2469,141 @@
               </a:rPr>
               <a:t>end</a:t>
             </a:r>
+          </a:p>
+          <a:p>
+            <a:pPr marL="0" marR="0" indent="0" algn="l" defTabSz="1217613" rtl="0" eaLnBrk="1" fontAlgn="base" latinLnBrk="0" hangingPunct="1">
+              <a:lnSpc>
+                <a:spcPct val="90000"/>
+              </a:lnSpc>
+              <a:spcBef>
+                <a:spcPct val="30000"/>
+              </a:spcBef>
+              <a:spcAft>
+                <a:spcPts val="450"/>
+              </a:spcAft>
+              <a:buClrTx/>
+              <a:buSzTx/>
+              <a:buFontTx/>
+              <a:buNone/>
+              <a:tabLst/>
+              <a:defRPr/>
+            </a:pPr>
+            <a:endParaRPr lang="en-US" b="1" dirty="0" smtClean="0">
+              <a:latin typeface="Courier New" panose="02070309020205020404" pitchFamily="49" charset="0"/>
+              <a:cs typeface="Courier New" panose="02070309020205020404" pitchFamily="49" charset="0"/>
+            </a:endParaRPr>
+          </a:p>
+          <a:p>
+            <a:pPr marL="0" marR="0" indent="0" algn="l" defTabSz="1217613" rtl="0" eaLnBrk="1" fontAlgn="base" latinLnBrk="0" hangingPunct="1">
+              <a:lnSpc>
+                <a:spcPct val="90000"/>
+              </a:lnSpc>
+              <a:spcBef>
+                <a:spcPct val="30000"/>
+              </a:spcBef>
+              <a:spcAft>
+                <a:spcPts val="450"/>
+              </a:spcAft>
+              <a:buClrTx/>
+              <a:buSzTx/>
+              <a:buFontTx/>
+              <a:buNone/>
+              <a:tabLst/>
+              <a:defRPr/>
+            </a:pPr>
+            <a:r>
+              <a:rPr lang="en-US" dirty="0" smtClean="0"/>
+              <a:t>Instructor</a:t>
+            </a:r>
+            <a:r>
+              <a:rPr lang="en-US" baseline="0" dirty="0" smtClean="0"/>
+              <a:t> </a:t>
+            </a:r>
+            <a:r>
+              <a:rPr lang="en-US" dirty="0" smtClean="0"/>
+              <a:t>Note: I</a:t>
+            </a:r>
+            <a:r>
+              <a:rPr lang="en-US" sz="1200" b="0" i="0" kern="1200" dirty="0" smtClean="0">
+                <a:solidFill>
+                  <a:schemeClr val="tx1"/>
+                </a:solidFill>
+                <a:effectLst/>
+                <a:latin typeface="Arial" panose="020B0604020202020204" pitchFamily="34" charset="0"/>
+                <a:ea typeface="ＭＳ Ｐゴシック" charset="0"/>
+                <a:cs typeface="Arial" panose="020B0604020202020204" pitchFamily="34" charset="0"/>
+              </a:rPr>
+              <a:t>t's generally correct to use single quotes unless string interpolation is used, in which doubles are correct. Check with </a:t>
+            </a:r>
+            <a:r>
+              <a:rPr lang="en-US" sz="1200" b="0" i="0" kern="1200" dirty="0" err="1" smtClean="0">
+                <a:solidFill>
+                  <a:schemeClr val="tx1"/>
+                </a:solidFill>
+                <a:effectLst/>
+                <a:latin typeface="Arial" panose="020B0604020202020204" pitchFamily="34" charset="0"/>
+                <a:ea typeface="ＭＳ Ｐゴシック" charset="0"/>
+                <a:cs typeface="Arial" panose="020B0604020202020204" pitchFamily="34" charset="0"/>
+              </a:rPr>
+              <a:t>inspec</a:t>
+            </a:r>
+            <a:r>
+              <a:rPr lang="en-US" sz="1200" b="0" i="0" kern="1200" dirty="0" smtClean="0">
+                <a:solidFill>
+                  <a:schemeClr val="tx1"/>
+                </a:solidFill>
+                <a:effectLst/>
+                <a:latin typeface="Arial" panose="020B0604020202020204" pitchFamily="34" charset="0"/>
+                <a:ea typeface="ＭＳ Ｐゴシック" charset="0"/>
+                <a:cs typeface="Arial" panose="020B0604020202020204" pitchFamily="34" charset="0"/>
+              </a:rPr>
+              <a:t> team about describe statement correctness. We need to make</a:t>
+            </a:r>
+            <a:r>
+              <a:rPr lang="en-US" sz="1200" b="0" i="0" kern="1200" baseline="0" dirty="0" smtClean="0">
+                <a:solidFill>
+                  <a:schemeClr val="tx1"/>
+                </a:solidFill>
+                <a:effectLst/>
+                <a:latin typeface="Arial" panose="020B0604020202020204" pitchFamily="34" charset="0"/>
+                <a:ea typeface="ＭＳ Ｐゴシック" charset="0"/>
+                <a:cs typeface="Arial" panose="020B0604020202020204" pitchFamily="34" charset="0"/>
+              </a:rPr>
+              <a:t> this example consistent </a:t>
+            </a:r>
+            <a:r>
+              <a:rPr lang="en-US" sz="1200" b="0" i="0" kern="1200" baseline="0" dirty="0" err="1" smtClean="0">
+                <a:solidFill>
+                  <a:schemeClr val="tx1"/>
+                </a:solidFill>
+                <a:effectLst/>
+                <a:latin typeface="Arial" panose="020B0604020202020204" pitchFamily="34" charset="0"/>
+                <a:ea typeface="ＭＳ Ｐゴシック" charset="0"/>
+                <a:cs typeface="Arial" panose="020B0604020202020204" pitchFamily="34" charset="0"/>
+              </a:rPr>
+              <a:t>wrt</a:t>
+            </a:r>
+            <a:r>
+              <a:rPr lang="en-US" sz="1200" b="0" i="0" kern="1200" baseline="0" dirty="0" smtClean="0">
+                <a:solidFill>
+                  <a:schemeClr val="tx1"/>
+                </a:solidFill>
+                <a:effectLst/>
+                <a:latin typeface="Arial" panose="020B0604020202020204" pitchFamily="34" charset="0"/>
+                <a:ea typeface="ＭＳ Ｐゴシック" charset="0"/>
+                <a:cs typeface="Arial" panose="020B0604020202020204" pitchFamily="34" charset="0"/>
+              </a:rPr>
+              <a:t> quotes.</a:t>
+            </a:r>
+            <a:endParaRPr lang="en-US" sz="1200" b="0" i="0" kern="1200" dirty="0" smtClean="0">
+              <a:solidFill>
+                <a:schemeClr val="tx1"/>
+              </a:solidFill>
+              <a:effectLst/>
+              <a:latin typeface="Arial" panose="020B0604020202020204" pitchFamily="34" charset="0"/>
+              <a:ea typeface="ＭＳ Ｐゴシック" charset="0"/>
+              <a:cs typeface="Arial" panose="020B0604020202020204" pitchFamily="34" charset="0"/>
+            </a:endParaRPr>
           </a:p>
           <a:p>
             <a:pPr marL="0" marR="0" indent="0" algn="l" defTabSz="1217613" rtl="0" eaLnBrk="1" fontAlgn="base" latinLnBrk="0" hangingPunct="1">
@@ -2823,6 +2831,70 @@
               <a:tabLst/>
               <a:defRPr/>
             </a:pPr>
+            <a:endParaRPr lang="en-US" baseline="0" dirty="0" smtClean="0"/>
+          </a:p>
+          <a:p>
+            <a:pPr marL="0" marR="0" indent="0" algn="l" defTabSz="1217613" rtl="0" eaLnBrk="1" fontAlgn="base" latinLnBrk="0" hangingPunct="1">
+              <a:lnSpc>
+                <a:spcPct val="90000"/>
+              </a:lnSpc>
+              <a:spcBef>
+                <a:spcPct val="30000"/>
+              </a:spcBef>
+              <a:spcAft>
+                <a:spcPts val="450"/>
+              </a:spcAft>
+              <a:buClrTx/>
+              <a:buSzTx/>
+              <a:buFontTx/>
+              <a:buNone/>
+              <a:tabLst/>
+              <a:defRPr/>
+            </a:pPr>
+            <a:r>
+              <a:rPr lang="en-US" baseline="0" dirty="0" smtClean="0"/>
+              <a:t>The 14 rules found in this example is not accurate (it should be 2 rules found) and this output is has been corrected in the latest release.</a:t>
+            </a:r>
+            <a:endParaRPr lang="en-US" dirty="0" smtClean="0"/>
+          </a:p>
+          <a:p>
+            <a:pPr marL="0" marR="0" indent="0" algn="l" defTabSz="1217613" rtl="0" eaLnBrk="1" fontAlgn="base" latinLnBrk="0" hangingPunct="1">
+              <a:lnSpc>
+                <a:spcPct val="90000"/>
+              </a:lnSpc>
+              <a:spcBef>
+                <a:spcPct val="30000"/>
+              </a:spcBef>
+              <a:spcAft>
+                <a:spcPts val="450"/>
+              </a:spcAft>
+              <a:buClrTx/>
+              <a:buSzTx/>
+              <a:buFontTx/>
+              <a:buNone/>
+              <a:tabLst/>
+              <a:defRPr/>
+            </a:pPr>
+            <a:endParaRPr lang="en-US" baseline="0" dirty="0" smtClean="0"/>
+          </a:p>
+          <a:p>
+            <a:pPr marL="0" marR="0" indent="0" algn="l" defTabSz="1217613" rtl="0" eaLnBrk="1" fontAlgn="base" latinLnBrk="0" hangingPunct="1">
+              <a:lnSpc>
+                <a:spcPct val="90000"/>
+              </a:lnSpc>
+              <a:spcBef>
+                <a:spcPct val="30000"/>
+              </a:spcBef>
+              <a:spcAft>
+                <a:spcPts val="450"/>
+              </a:spcAft>
+              <a:buClrTx/>
+              <a:buSzTx/>
+              <a:buFontTx/>
+              <a:buNone/>
+              <a:tabLst/>
+              <a:defRPr/>
+            </a:pPr>
             <a:endParaRPr lang="en-US" dirty="0" smtClean="0"/>
           </a:p>
           <a:p>
@@ -5430,31 +5502,7 @@
                 <a:ea typeface="ＭＳ Ｐゴシック" charset="0"/>
                 <a:cs typeface="Arial" panose="020B0604020202020204" pitchFamily="34" charset="0"/>
               </a:rPr>
-              <a:t> </a:t>
-            </a:r>
-            <a:r>
-              <a:rPr lang="en-US" sz="1200" b="0" i="0" kern="1200" dirty="0" smtClean="0">
-                <a:solidFill>
-                  <a:schemeClr val="tx1"/>
-                </a:solidFill>
-                <a:effectLst/>
-                <a:latin typeface="Arial" panose="020B0604020202020204" pitchFamily="34" charset="0"/>
-                <a:ea typeface="ＭＳ Ｐゴシック" charset="0"/>
-                <a:cs typeface="Arial" panose="020B0604020202020204" pitchFamily="34" charset="0"/>
-              </a:rPr>
-              <a:t>and Compliance Server would </a:t>
-            </a:r>
-            <a:r>
-              <a:rPr lang="en-US" sz="1200" b="0" i="0" kern="1200" dirty="0" smtClean="0">
-                <a:solidFill>
-                  <a:schemeClr val="tx1"/>
-                </a:solidFill>
-                <a:effectLst/>
-                <a:latin typeface="Arial" panose="020B0604020202020204" pitchFamily="34" charset="0"/>
-                <a:ea typeface="ＭＳ Ｐゴシック" charset="0"/>
-                <a:cs typeface="Arial" panose="020B0604020202020204" pitchFamily="34" charset="0"/>
-              </a:rPr>
-              <a:t>not be</a:t>
+              <a:t> and Compliance Server would not be</a:t>
             </a:r>
             <a:r>
               <a:rPr lang="en-US" sz="1200" b="0" i="0" kern="1200" baseline="0" dirty="0" smtClean="0">
@@ -5466,41 +5514,8 @@
                 <a:ea typeface="ＭＳ Ｐゴシック" charset="0"/>
                 <a:cs typeface="Arial" panose="020B0604020202020204" pitchFamily="34" charset="0"/>
               </a:rPr>
-              <a:t> </a:t>
-            </a:r>
-            <a:r>
-              <a:rPr lang="en-US" sz="1200" b="0" i="0" kern="1200" baseline="0" dirty="0" smtClean="0">
-                <a:solidFill>
-                  <a:schemeClr val="tx1"/>
-                </a:solidFill>
-                <a:effectLst/>
-                <a:latin typeface="Arial" panose="020B0604020202020204" pitchFamily="34" charset="0"/>
-                <a:ea typeface="ＭＳ Ｐゴシック" charset="0"/>
-                <a:cs typeface="Arial" panose="020B0604020202020204" pitchFamily="34" charset="0"/>
-              </a:rPr>
-              <a:t>the best message </a:t>
-            </a:r>
-            <a:r>
-              <a:rPr lang="en-US" sz="1200" b="0" i="0" kern="1200" baseline="0" dirty="0" smtClean="0">
-                <a:solidFill>
-                  <a:schemeClr val="tx1"/>
-                </a:solidFill>
-                <a:effectLst/>
-                <a:latin typeface="Arial" panose="020B0604020202020204" pitchFamily="34" charset="0"/>
-                <a:ea typeface="ＭＳ Ｐゴシック" charset="0"/>
-                <a:cs typeface="Arial" panose="020B0604020202020204" pitchFamily="34" charset="0"/>
-              </a:rPr>
-              <a:t>to tell. Here is a link to where the image on the right was derived: https://github.com/chef/inspec/blob/1f325b1cfd02391fab14a996693a034da37aadd8/docs/profiles.rst </a:t>
-            </a:r>
-            <a:endParaRPr lang="en-US" sz="1200" b="0" i="0" kern="1200" baseline="0" dirty="0" smtClean="0">
-              <a:solidFill>
-                <a:schemeClr val="tx1"/>
-              </a:solidFill>
-              <a:effectLst/>
-              <a:latin typeface="Arial" panose="020B0604020202020204" pitchFamily="34" charset="0"/>
-              <a:ea typeface="ＭＳ Ｐゴシック" charset="0"/>
-              <a:cs typeface="Arial" panose="020B0604020202020204" pitchFamily="34" charset="0"/>
-            </a:endParaRPr>
+              <a:t> the best message to tell. Here is a link to where the image on the right was derived: https://github.com/chef/inspec/blob/1f325b1cfd02391fab14a996693a034da37aadd8/docs/profiles.rst </a:t>
+            </a:r>
           </a:p>
           <a:p>
             <a:r>
@@ -5539,15 +5554,6 @@
               </a:rPr>
               <a:t>. At that point we'll rev this course accordingly.</a:t>
             </a:r>
-            <a:endParaRPr lang="en-US" sz="1200" b="0" i="0" kern="1200" baseline="0" dirty="0" smtClean="0">
-              <a:solidFill>
-                <a:schemeClr val="tx1"/>
-              </a:solidFill>
-              <a:effectLst/>
-              <a:latin typeface="Arial" panose="020B0604020202020204" pitchFamily="34" charset="0"/>
-              <a:ea typeface="ＭＳ Ｐゴシック" charset="0"/>
-              <a:cs typeface="Arial" panose="020B0604020202020204" pitchFamily="34" charset="0"/>
-            </a:endParaRPr>
           </a:p>
           <a:p>
             <a:endParaRPr lang="en-US" sz="1200" b="0" i="0" kern="1200" baseline="0" dirty="0" smtClean="0">
@@ -5648,6 +5654,200 @@
     <p:extLst>
       <p:ext uri="{BB962C8B-B14F-4D97-AF65-F5344CB8AC3E}">
         <p14:creationId xmlns:p14="http://schemas.microsoft.com/office/powerpoint/2010/main" val="3908413370"/>
+      </p:ext>
+    </p:extLst>
+  </p:cSld>
+  <p:clrMapOvr>
+    <a:masterClrMapping/>
+  </p:clrMapOvr>
+</p:notes>
+</file>
+
+<file path=ppt/notesSlides/notesSlide28.xml><?xml version="1.0" encoding="utf-8"?>
+<p:notes xmlns:a="http://schemas.openxmlformats.org/drawingml/2006/main" xmlns:r="http://schemas.openxmlformats.org/officeDocument/2006/relationships" xmlns:p="http://schemas.openxmlformats.org/presentationml/2006/main">
+  <p:cSld>
+    <p:spTree>
+      <p:nvGrpSpPr>
+        <p:cNvPr id="1" name=""/>
+        <p:cNvGrpSpPr/>
+        <p:nvPr/>
+      </p:nvGrpSpPr>
+      <p:grpSpPr>
+        <a:xfrm>
+          <a:off x="0" y="0"/>
+          <a:ext cx="0" cy="0"/>
+          <a:chOff x="0" y="0"/>
+          <a:chExt cx="0" cy="0"/>
+        </a:xfrm>
+      </p:grpSpPr>
+      <p:sp>
+        <p:nvSpPr>
+          <p:cNvPr id="2" name="Slide Image Placeholder 1"/>
+          <p:cNvSpPr>
+            <a:spLocks noGrp="1" noRot="1" noChangeAspect="1"/>
+          </p:cNvSpPr>
+          <p:nvPr>
+            <p:ph type="sldImg"/>
+          </p:nvPr>
+        </p:nvSpPr>
+        <p:spPr/>
+      </p:sp>
+      <p:sp>
+        <p:nvSpPr>
+          <p:cNvPr id="3" name="Notes Placeholder 2"/>
+          <p:cNvSpPr>
+            <a:spLocks noGrp="1"/>
+          </p:cNvSpPr>
+          <p:nvPr>
+            <p:ph type="body" idx="1"/>
+          </p:nvPr>
+        </p:nvSpPr>
+        <p:spPr/>
+        <p:txBody>
+          <a:bodyPr/>
+          <a:lstStyle/>
+          <a:p>
+            <a:r>
+              <a:rPr lang="en-US" dirty="0" smtClean="0"/>
+              <a:t>Instructor Note Answers: </a:t>
+            </a:r>
+            <a:br>
+              <a:rPr lang="en-US" dirty="0" smtClean="0"/>
+            </a:br>
+            <a:r>
+              <a:rPr lang="en-US" dirty="0" smtClean="0"/>
+              <a:t>1. `</a:t>
+            </a:r>
+            <a:r>
+              <a:rPr lang="en-US" dirty="0" err="1" smtClean="0"/>
+              <a:t>inspec</a:t>
+            </a:r>
+            <a:r>
+              <a:rPr lang="en-US" dirty="0" smtClean="0"/>
+              <a:t> check` just verifies the code--it doesn't actually test a system. `</a:t>
+            </a:r>
+            <a:r>
+              <a:rPr lang="en-US" dirty="0" err="1" smtClean="0"/>
+              <a:t>inspec</a:t>
+            </a:r>
+            <a:r>
+              <a:rPr lang="en-US" dirty="0" smtClean="0"/>
+              <a:t> exec' will run the tests against a system.</a:t>
+            </a:r>
+          </a:p>
+          <a:p>
+            <a:r>
+              <a:rPr lang="en-US" dirty="0" smtClean="0"/>
+              <a:t>Additional questions will be added when we test this course</a:t>
+            </a:r>
+            <a:r>
+              <a:rPr lang="en-US" baseline="0" dirty="0" smtClean="0"/>
+              <a:t> on the Late February v1.0 Compliance software since </a:t>
+            </a:r>
+            <a:r>
+              <a:rPr lang="en-US" baseline="0" dirty="0" err="1" smtClean="0"/>
+              <a:t>inspec.yml</a:t>
+            </a:r>
+            <a:r>
+              <a:rPr lang="en-US" baseline="0" dirty="0" smtClean="0"/>
+              <a:t> will replace the </a:t>
+            </a:r>
+            <a:r>
+              <a:rPr lang="en-US" baseline="0" dirty="0" err="1" smtClean="0"/>
+              <a:t>inspec</a:t>
+            </a:r>
+            <a:r>
+              <a:rPr lang="en-US" baseline="0" dirty="0" smtClean="0"/>
+              <a:t> requirement of metadata.rb. Plus the new `generate profile` command will change the way we </a:t>
+            </a:r>
+            <a:r>
+              <a:rPr lang="en-US" baseline="0" smtClean="0"/>
+              <a:t>create profiles too.</a:t>
+            </a:r>
+            <a:endParaRPr lang="en-US" dirty="0" smtClean="0"/>
+          </a:p>
+          <a:p>
+            <a:endParaRPr lang="en-US" dirty="0"/>
+          </a:p>
+        </p:txBody>
+      </p:sp>
+      <p:sp>
+        <p:nvSpPr>
+          <p:cNvPr id="4" name="Slide Number Placeholder 3"/>
+          <p:cNvSpPr>
+            <a:spLocks noGrp="1"/>
+          </p:cNvSpPr>
+          <p:nvPr>
+            <p:ph type="sldNum" sz="quarter" idx="10"/>
+          </p:nvPr>
+        </p:nvSpPr>
+        <p:spPr/>
+        <p:txBody>
+          <a:bodyPr/>
+          <a:lstStyle/>
+          <a:p>
+            <a:pPr>
+              <a:defRPr/>
+            </a:pPr>
+            <a:fld id="{DC3734AA-3150-D947-AC52-2F5DF48BFCD5}" type="slidenum">
+              <a:rPr lang="en-US" smtClean="0"/>
+              <a:pPr>
+                <a:defRPr/>
+              </a:pPr>
+              <a:t>30</a:t>
+            </a:fld>
+            <a:endParaRPr lang="en-US" dirty="0"/>
+          </a:p>
+        </p:txBody>
+      </p:sp>
+      <p:sp>
+        <p:nvSpPr>
+          <p:cNvPr id="5" name="Header Placeholder 4"/>
+          <p:cNvSpPr>
+            <a:spLocks noGrp="1"/>
+          </p:cNvSpPr>
+          <p:nvPr>
+            <p:ph type="hdr" sz="quarter" idx="11"/>
+          </p:nvPr>
+        </p:nvSpPr>
+        <p:spPr/>
+        <p:txBody>
+          <a:bodyPr/>
+          <a:lstStyle/>
+          <a:p>
+            <a:pPr>
+              <a:defRPr/>
+            </a:pPr>
+            <a:endParaRPr lang="en-US"/>
+          </a:p>
+        </p:txBody>
+      </p:sp>
+      <p:sp>
+        <p:nvSpPr>
+          <p:cNvPr id="6" name="Footer Placeholder 5"/>
+          <p:cNvSpPr>
+            <a:spLocks noGrp="1"/>
+          </p:cNvSpPr>
+          <p:nvPr>
+            <p:ph type="ftr" sz="quarter" idx="12"/>
+          </p:nvPr>
+        </p:nvSpPr>
+        <p:spPr/>
+        <p:txBody>
+          <a:bodyPr/>
+          <a:lstStyle/>
+          <a:p>
+            <a:pPr>
+              <a:defRPr/>
+            </a:pPr>
+            <a:endParaRPr lang="en-US"/>
+          </a:p>
+        </p:txBody>
+      </p:sp>
+    </p:spTree>
+    <p:extLst>
+      <p:ext uri="{BB962C8B-B14F-4D97-AF65-F5344CB8AC3E}">
+        <p14:creationId xmlns:p14="http://schemas.microsoft.com/office/powerpoint/2010/main" val="1950899682"/>
       </p:ext>
     </p:extLst>
   </p:cSld>
@@ -7684,37 +7884,58 @@
               <a:defRPr/>
             </a:pPr>
             <a:r>
+              <a:rPr lang="en-US" baseline="0" dirty="0" smtClean="0"/>
+              <a:t>Instructor Note: The (</a:t>
+            </a:r>
+            <a:r>
               <a:rPr lang="en-US" baseline="0" dirty="0" err="1" smtClean="0"/>
-              <a:t>tbd</a:t>
+              <a:t>noMethodError</a:t>
             </a:r>
             <a:r>
               <a:rPr lang="en-US" baseline="0" dirty="0" smtClean="0"/>
-              <a:t>- the error is not explicit of what's wrong.</a:t>
-            </a:r>
-          </a:p>
-          <a:p>
+              <a:t>)</a:t>
+            </a:r>
             <a:r>
               <a:rPr lang="en-US" dirty="0" smtClean="0">
                 <a:effectLst/>
               </a:rPr>
-              <a:t>This is bad programming error</a:t>
-            </a:r>
-            <a:r>
-              <a:rPr lang="en-US" i="1" dirty="0" smtClean="0">
-                <a:effectLst/>
-              </a:rPr>
-              <a:t/>
-            </a:r>
-            <a:br>
-              <a:rPr lang="en-US" i="1" dirty="0" smtClean="0">
-                <a:effectLst/>
-              </a:rPr>
-            </a:br>
+              <a:t> </a:t>
+            </a:r>
             <a:r>
               <a:rPr lang="en-US" dirty="0" smtClean="0">
                 <a:effectLst/>
               </a:rPr>
-              <a:t>its basically spitting out a null (which is I </a:t>
+              <a:t>is </a:t>
+            </a:r>
+            <a:r>
+              <a:rPr lang="en-US" dirty="0" smtClean="0">
+                <a:effectLst/>
+              </a:rPr>
+              <a:t>a bad </a:t>
+            </a:r>
+            <a:r>
+              <a:rPr lang="en-US" dirty="0" smtClean="0">
+                <a:effectLst/>
+              </a:rPr>
+              <a:t>programming </a:t>
+            </a:r>
+            <a:r>
+              <a:rPr lang="en-US" dirty="0" smtClean="0">
+                <a:effectLst/>
+              </a:rPr>
+              <a:t>error. It's </a:t>
+            </a:r>
+            <a:r>
+              <a:rPr lang="en-US" dirty="0" smtClean="0">
+                <a:effectLst/>
+              </a:rPr>
+              <a:t>basically spitting out a null (which is </a:t>
+            </a:r>
+            <a:r>
+              <a:rPr lang="en-US" dirty="0" smtClean="0">
+                <a:effectLst/>
+              </a:rPr>
+              <a:t>"I </a:t>
             </a:r>
             <a:r>
               <a:rPr lang="en-US" dirty="0" err="1" smtClean="0">
@@ -7726,7 +7947,19 @@
               <a:rPr lang="en-US" dirty="0" smtClean="0">
                 <a:effectLst/>
               </a:rPr>
-              <a:t> know what broke) error</a:t>
+              <a:t> know what </a:t>
+            </a:r>
+            <a:r>
+              <a:rPr lang="en-US" dirty="0" smtClean="0">
+                <a:effectLst/>
+              </a:rPr>
+              <a:t>broke") </a:t>
+            </a:r>
+            <a:r>
+              <a:rPr lang="en-US" dirty="0" smtClean="0">
+                <a:effectLst/>
+              </a:rPr>
+              <a:t>error</a:t>
             </a:r>
             <a:br>
               <a:rPr lang="en-US" dirty="0" smtClean="0">
@@ -7737,16 +7970,53 @@
               <a:rPr lang="en-US" dirty="0" smtClean="0">
                 <a:effectLst/>
               </a:rPr>
-              <a:t>The next release of compliance should fix this</a:t>
-            </a:r>
-          </a:p>
-          <a:p>
+              <a:t>The next release of compliance </a:t>
+            </a:r>
             <a:r>
               <a:rPr lang="en-US" dirty="0" smtClean="0">
                 <a:effectLst/>
               </a:rPr>
-              <a:t>It should give very explicit warnings/errors around functionality rather than exposing inner workings of the programming</a:t>
-            </a:r>
+              <a:t>in late</a:t>
+            </a:r>
+            <a:r>
+              <a:rPr lang="en-US" baseline="0" dirty="0" smtClean="0">
+                <a:effectLst/>
+              </a:rPr>
+              <a:t> Feb 2016 </a:t>
+            </a:r>
+            <a:r>
+              <a:rPr lang="en-US" dirty="0" smtClean="0">
+                <a:effectLst/>
+              </a:rPr>
+              <a:t>should </a:t>
+            </a:r>
+            <a:r>
+              <a:rPr lang="en-US" dirty="0" smtClean="0">
+                <a:effectLst/>
+              </a:rPr>
+              <a:t>fix </a:t>
+            </a:r>
+            <a:r>
+              <a:rPr lang="en-US" dirty="0" smtClean="0">
+                <a:effectLst/>
+              </a:rPr>
+              <a:t>this. It </a:t>
+            </a:r>
+            <a:r>
+              <a:rPr lang="en-US" dirty="0" smtClean="0">
+                <a:effectLst/>
+              </a:rPr>
+              <a:t>should give very explicit warnings/errors around functionality rather than exposing inner workings of the </a:t>
+            </a:r>
+            <a:r>
+              <a:rPr lang="en-US" dirty="0" smtClean="0">
+                <a:effectLst/>
+              </a:rPr>
+              <a:t>programming.</a:t>
+            </a:r>
+            <a:endParaRPr lang="en-US" dirty="0" smtClean="0">
+              <a:effectLst/>
+            </a:endParaRPr>
           </a:p>
           <a:p>
             <a:pPr marL="0" marR="0" indent="0" algn="l" defTabSz="1217613" rtl="0" eaLnBrk="1" fontAlgn="base" latinLnBrk="0" hangingPunct="1">
@@ -17302,215 +17572,215 @@
         <p:spPr/>
         <p:txBody>
           <a:bodyPr>
-            <a:normAutofit fontScale="55000" lnSpcReduction="20000"/>
+            <a:normAutofit fontScale="47500" lnSpcReduction="20000"/>
           </a:bodyPr>
           <a:lstStyle/>
           <a:p>
             <a:r>
-              <a:rPr lang="en-US" b="1" dirty="0"/>
+              <a:rPr lang="en-US" sz="3300" b="1" dirty="0"/>
               <a:t>title '/</a:t>
             </a:r>
             <a:r>
-              <a:rPr lang="en-US" b="1" dirty="0" err="1"/>
+              <a:rPr lang="en-US" sz="3300" b="1" dirty="0" err="1"/>
               <a:t>tmp</a:t>
             </a:r>
             <a:r>
-              <a:rPr lang="en-US" b="1" dirty="0"/>
+              <a:rPr lang="en-US" sz="3300" b="1" dirty="0"/>
               <a:t> profile'</a:t>
             </a:r>
           </a:p>
           <a:p>
-            <a:endParaRPr lang="en-US" b="1" dirty="0"/>
-          </a:p>
-          <a:p>
-            <a:r>
-              <a:rPr lang="en-US" b="1" dirty="0"/>
+            <a:endParaRPr lang="en-US" sz="3300" b="1" dirty="0"/>
+          </a:p>
+          <a:p>
+            <a:r>
+              <a:rPr lang="en-US" sz="3300" b="1" dirty="0"/>
               <a:t>control "tmp-1.0" </a:t>
             </a:r>
             <a:r>
-              <a:rPr lang="en-US" b="1" dirty="0" smtClean="0"/>
+              <a:rPr lang="en-US" sz="3300" b="1" dirty="0" smtClean="0"/>
               <a:t>do</a:t>
             </a:r>
-            <a:endParaRPr lang="en-US" b="1" dirty="0"/>
-          </a:p>
-          <a:p>
-            <a:r>
-              <a:rPr lang="en-US" b="1" dirty="0"/>
+            <a:endParaRPr lang="en-US" sz="3300" b="1" dirty="0"/>
+          </a:p>
+          <a:p>
+            <a:r>
+              <a:rPr lang="en-US" sz="3300" b="1" dirty="0"/>
               <a:t>  impact 0.3</a:t>
             </a:r>
           </a:p>
           <a:p>
             <a:r>
-              <a:rPr lang="en-US" b="1" dirty="0"/>
+              <a:rPr lang="en-US" sz="3300" b="1" dirty="0"/>
               <a:t>  title "Create /</a:t>
             </a:r>
             <a:r>
-              <a:rPr lang="en-US" b="1" dirty="0" err="1"/>
+              <a:rPr lang="en-US" sz="3300" b="1" dirty="0" err="1"/>
               <a:t>tmp</a:t>
             </a:r>
             <a:r>
-              <a:rPr lang="en-US" b="1" dirty="0"/>
+              <a:rPr lang="en-US" sz="3300" b="1" dirty="0"/>
               <a:t> directory"</a:t>
             </a:r>
           </a:p>
           <a:p>
             <a:r>
-              <a:rPr lang="en-US" b="1" dirty="0"/>
+              <a:rPr lang="en-US" sz="3300" b="1" dirty="0"/>
               <a:t>  </a:t>
             </a:r>
             <a:r>
-              <a:rPr lang="en-US" b="1" dirty="0" err="1"/>
+              <a:rPr lang="en-US" sz="3300" b="1" dirty="0" err="1"/>
               <a:t>desc</a:t>
             </a:r>
             <a:r>
-              <a:rPr lang="en-US" b="1" dirty="0"/>
+              <a:rPr lang="en-US" sz="3300" b="1" dirty="0"/>
               <a:t> "A /</a:t>
             </a:r>
             <a:r>
-              <a:rPr lang="en-US" b="1" dirty="0" err="1"/>
+              <a:rPr lang="en-US" sz="3300" b="1" dirty="0" err="1"/>
               <a:t>tmp</a:t>
             </a:r>
             <a:r>
-              <a:rPr lang="en-US" b="1" dirty="0"/>
+              <a:rPr lang="en-US" sz="3300" b="1" dirty="0"/>
               <a:t> directory must exist"</a:t>
             </a:r>
           </a:p>
           <a:p>
             <a:r>
-              <a:rPr lang="en-US" b="1" dirty="0"/>
+              <a:rPr lang="en-US" sz="3300" b="1" dirty="0"/>
               <a:t>  describe file('/</a:t>
             </a:r>
             <a:r>
-              <a:rPr lang="en-US" b="1" dirty="0" err="1"/>
+              <a:rPr lang="en-US" sz="3300" b="1" dirty="0" err="1"/>
               <a:t>tmp</a:t>
             </a:r>
             <a:r>
-              <a:rPr lang="en-US" b="1" dirty="0"/>
+              <a:rPr lang="en-US" sz="3300" b="1" dirty="0"/>
               <a:t>') do</a:t>
             </a:r>
           </a:p>
           <a:p>
             <a:r>
-              <a:rPr lang="en-US" b="1" dirty="0"/>
+              <a:rPr lang="en-US" sz="3300" b="1" dirty="0"/>
               <a:t>    it { should </a:t>
             </a:r>
             <a:r>
-              <a:rPr lang="en-US" b="1" dirty="0" err="1"/>
+              <a:rPr lang="en-US" sz="3300" b="1" dirty="0" err="1"/>
               <a:t>be_directory</a:t>
             </a:r>
             <a:r>
-              <a:rPr lang="en-US" b="1" dirty="0"/>
+              <a:rPr lang="en-US" sz="3300" b="1" dirty="0"/>
               <a:t> }</a:t>
             </a:r>
           </a:p>
           <a:p>
             <a:r>
-              <a:rPr lang="en-US" b="1" dirty="0"/>
+              <a:rPr lang="en-US" sz="3300" b="1" dirty="0"/>
               <a:t>  end</a:t>
             </a:r>
           </a:p>
           <a:p>
             <a:r>
-              <a:rPr lang="en-US" b="1" dirty="0"/>
+              <a:rPr lang="en-US" sz="3300" b="1" dirty="0"/>
               <a:t>end</a:t>
             </a:r>
           </a:p>
           <a:p>
-            <a:endParaRPr lang="en-US" b="1" dirty="0"/>
-          </a:p>
-          <a:p>
-            <a:r>
-              <a:rPr lang="en-US" b="1" dirty="0"/>
+            <a:endParaRPr lang="en-US" sz="3300" b="1" dirty="0"/>
+          </a:p>
+          <a:p>
+            <a:r>
+              <a:rPr lang="en-US" sz="3300" b="1" dirty="0"/>
               <a:t>control "tmp-1.1" do</a:t>
             </a:r>
           </a:p>
           <a:p>
             <a:r>
-              <a:rPr lang="en-US" b="1" dirty="0"/>
+              <a:rPr lang="en-US" sz="3300" b="1" dirty="0"/>
               <a:t>  impact 0.3</a:t>
             </a:r>
           </a:p>
           <a:p>
             <a:r>
-              <a:rPr lang="en-US" b="1" dirty="0"/>
+              <a:rPr lang="en-US" sz="3300" b="1" dirty="0"/>
               <a:t>  title "/</a:t>
             </a:r>
             <a:r>
-              <a:rPr lang="en-US" b="1" dirty="0" err="1"/>
+              <a:rPr lang="en-US" sz="3300" b="1" dirty="0" err="1"/>
               <a:t>tmp</a:t>
             </a:r>
             <a:r>
-              <a:rPr lang="en-US" b="1" dirty="0"/>
+              <a:rPr lang="en-US" sz="3300" b="1" dirty="0"/>
               <a:t> directory is owned by the root user"</a:t>
             </a:r>
           </a:p>
           <a:p>
             <a:r>
-              <a:rPr lang="en-US" b="1" dirty="0"/>
+              <a:rPr lang="en-US" sz="3300" b="1" dirty="0"/>
               <a:t>  </a:t>
             </a:r>
             <a:r>
-              <a:rPr lang="en-US" b="1" dirty="0" err="1"/>
+              <a:rPr lang="en-US" sz="3300" b="1" dirty="0" err="1"/>
               <a:t>desc</a:t>
             </a:r>
             <a:r>
-              <a:rPr lang="en-US" b="1" dirty="0"/>
+              <a:rPr lang="en-US" sz="3300" b="1" dirty="0"/>
               <a:t> "The /</a:t>
             </a:r>
             <a:r>
-              <a:rPr lang="en-US" b="1" dirty="0" err="1"/>
+              <a:rPr lang="en-US" sz="3300" b="1" dirty="0" err="1"/>
               <a:t>tmp</a:t>
             </a:r>
             <a:r>
-              <a:rPr lang="en-US" b="1" dirty="0"/>
+              <a:rPr lang="en-US" sz="3300" b="1" dirty="0"/>
               <a:t> directory must be owned by the root user"</a:t>
             </a:r>
           </a:p>
           <a:p>
             <a:r>
-              <a:rPr lang="en-US" b="1" dirty="0"/>
+              <a:rPr lang="en-US" sz="3300" b="1" dirty="0"/>
               <a:t>  describe file('/</a:t>
             </a:r>
             <a:r>
-              <a:rPr lang="en-US" b="1" dirty="0" err="1"/>
+              <a:rPr lang="en-US" sz="3300" b="1" dirty="0" err="1"/>
               <a:t>tmp</a:t>
             </a:r>
             <a:r>
-              <a:rPr lang="en-US" b="1" dirty="0"/>
+              <a:rPr lang="en-US" sz="3300" b="1" dirty="0"/>
               <a:t>') do</a:t>
             </a:r>
           </a:p>
           <a:p>
             <a:r>
-              <a:rPr lang="en-US" b="1" dirty="0"/>
+              <a:rPr lang="en-US" sz="3300" b="1" dirty="0"/>
               <a:t> </a:t>
             </a:r>
             <a:r>
-              <a:rPr lang="en-US" b="1" dirty="0" smtClean="0"/>
+              <a:rPr lang="en-US" sz="3300" b="1" dirty="0" smtClean="0"/>
               <a:t>   </a:t>
             </a:r>
             <a:r>
-              <a:rPr lang="en-US" b="1" dirty="0"/>
+              <a:rPr lang="en-US" sz="3300" b="1" dirty="0"/>
               <a:t>it { should </a:t>
             </a:r>
             <a:r>
-              <a:rPr lang="en-US" b="1" dirty="0" err="1"/>
+              <a:rPr lang="en-US" sz="3300" b="1" dirty="0" err="1"/>
               <a:t>be_owned_by</a:t>
             </a:r>
             <a:r>
-              <a:rPr lang="en-US" b="1" dirty="0"/>
+              <a:rPr lang="en-US" sz="3300" b="1" dirty="0"/>
               <a:t> 'root' }</a:t>
             </a:r>
           </a:p>
           <a:p>
             <a:r>
-              <a:rPr lang="en-US" b="1" dirty="0"/>
+              <a:rPr lang="en-US" sz="3300" b="1" dirty="0"/>
               <a:t>  end</a:t>
             </a:r>
           </a:p>
           <a:p>
             <a:r>
-              <a:rPr lang="en-US" b="1" dirty="0"/>
+              <a:rPr lang="en-US" sz="3300" b="1" dirty="0"/>
               <a:t>end</a:t>
             </a:r>
           </a:p>
@@ -18397,14 +18667,13 @@
               <a:t>Write a custom </a:t>
             </a:r>
             <a:r>
-              <a:rPr lang="en-US"/>
+              <a:rPr lang="en-US" dirty="0"/>
               <a:t>c</a:t>
             </a:r>
             <a:r>
-              <a:rPr lang="en-US" smtClean="0"/>
+              <a:rPr lang="en-US" dirty="0" smtClean="0"/>
               <a:t>ompliance profile.</a:t>
             </a:r>
-            <a:endParaRPr lang="en-US" dirty="0" smtClean="0"/>
           </a:p>
           <a:p>
             <a:pPr marL="457200" indent="-457200">
@@ -20512,90 +20781,40 @@
             </a:pPr>
             <a:r>
               <a:rPr lang="en-US" dirty="0" smtClean="0"/>
-              <a:t>What is ...?</a:t>
-            </a:r>
-            <a:br>
-              <a:rPr lang="en-US" dirty="0" smtClean="0"/>
-            </a:br>
-            <a:r>
-              <a:rPr lang="en-US" dirty="0" smtClean="0"/>
-              <a:t>______________________________</a:t>
-            </a:r>
-          </a:p>
-          <a:p>
-            <a:pPr marL="514350" indent="-514350">
-              <a:buFont typeface="+mj-lt"/>
-              <a:buAutoNum type="arabicPeriod"/>
-            </a:pPr>
-            <a:r>
-              <a:rPr lang="en-US" dirty="0" smtClean="0"/>
-              <a:t>Which is the correct answer?  </a:t>
-            </a:r>
-          </a:p>
-          <a:p>
-            <a:pPr marL="822325" lvl="1" indent="-514350">
-              <a:buFont typeface="+mj-lt"/>
-              <a:buAutoNum type="alphaLcPeriod"/>
-            </a:pPr>
-            <a:r>
-              <a:rPr lang="en-US" dirty="0" smtClean="0"/>
-              <a:t>answer</a:t>
-            </a:r>
-          </a:p>
-          <a:p>
-            <a:pPr marL="822325" lvl="1" indent="-514350">
-              <a:buFont typeface="+mj-lt"/>
-              <a:buAutoNum type="alphaLcPeriod"/>
-            </a:pPr>
-            <a:r>
-              <a:rPr lang="en-US" dirty="0" smtClean="0"/>
-              <a:t>answer</a:t>
-            </a:r>
-          </a:p>
-          <a:p>
-            <a:pPr marL="822325" lvl="1" indent="-514350">
-              <a:buFont typeface="+mj-lt"/>
-              <a:buAutoNum type="alphaLcPeriod"/>
-            </a:pPr>
-            <a:r>
-              <a:rPr lang="en-US" dirty="0" smtClean="0"/>
-              <a:t>answer</a:t>
-            </a:r>
-          </a:p>
-          <a:p>
-            <a:pPr marL="822325" lvl="1" indent="-514350">
-              <a:buFont typeface="+mj-lt"/>
-              <a:buAutoNum type="alphaLcPeriod"/>
-            </a:pPr>
-            <a:r>
-              <a:rPr lang="en-US" dirty="0" smtClean="0"/>
-              <a:t>answer</a:t>
-            </a:r>
-            <a:br>
-              <a:rPr lang="en-US" dirty="0" smtClean="0"/>
-            </a:br>
-            <a:endParaRPr lang="en-US" dirty="0" smtClean="0"/>
-          </a:p>
-          <a:p>
-            <a:pPr marL="514350" indent="-514350">
-              <a:buFont typeface="+mj-lt"/>
-              <a:buAutoNum type="arabicPeriod"/>
-            </a:pPr>
-            <a:r>
-              <a:rPr lang="en-US" dirty="0" smtClean="0"/>
-              <a:t>Capable of carrying on a conversation</a:t>
-            </a:r>
-          </a:p>
-          <a:p>
-            <a:pPr marL="514350" indent="-514350">
-              <a:buFont typeface="+mj-lt"/>
-              <a:buAutoNum type="arabicPeriod"/>
-            </a:pPr>
-            <a:r>
-              <a:rPr lang="en-US" dirty="0" smtClean="0"/>
-              <a:t>Explain</a:t>
-            </a:r>
-            <a:endParaRPr lang="en-US" dirty="0"/>
+              <a:t>What is </a:t>
+            </a:r>
+            <a:r>
+              <a:rPr lang="en-US" dirty="0" smtClean="0"/>
+              <a:t>the difference between </a:t>
+            </a:r>
+            <a:r>
+              <a:rPr lang="en-US" dirty="0"/>
+              <a:t>`</a:t>
+            </a:r>
+            <a:r>
+              <a:rPr lang="en-US" dirty="0" err="1"/>
+              <a:t>inspec</a:t>
+            </a:r>
+            <a:r>
+              <a:rPr lang="en-US" dirty="0"/>
+              <a:t> check</a:t>
+            </a:r>
+            <a:r>
+              <a:rPr lang="en-US" dirty="0" smtClean="0"/>
+              <a:t>` and  `</a:t>
+            </a:r>
+            <a:r>
+              <a:rPr lang="en-US" dirty="0" err="1"/>
+              <a:t>inspec</a:t>
+            </a:r>
+            <a:r>
+              <a:rPr lang="en-US" dirty="0"/>
+              <a:t> exec</a:t>
+            </a:r>
+            <a:r>
+              <a:rPr lang="en-US" dirty="0" smtClean="0"/>
+              <a:t>'? </a:t>
+            </a:r>
           </a:p>
         </p:txBody>
       </p:sp>
@@ -23415,6 +23634,18 @@
 </file>
 
 <file path=customXml/item1.xml><?xml version="1.0" encoding="utf-8"?>
+<p:properties xmlns:p="http://schemas.microsoft.com/office/2006/metadata/properties" xmlns:xsi="http://www.w3.org/2001/XMLSchema-instance" xmlns:pc="http://schemas.microsoft.com/office/infopath/2007/PartnerControls">
+  <documentManagement>
+    <_dlc_DocId xmlns="7bb5d761-a2ea-4873-95f7-7a6658fb3ef0">M4CWTKMW727E-592-73</_dlc_DocId>
+    <_dlc_DocIdUrl xmlns="7bb5d761-a2ea-4873-95f7-7a6658fb3ef0">
+      <Url>https://kms.vci.local/marketing/team/_layouts/DocIdRedir.aspx?ID=M4CWTKMW727E-592-73</Url>
+      <Description>M4CWTKMW727E-592-73</Description>
+    </_dlc_DocIdUrl>
+  </documentManagement>
+</p:properties>
+</file>
+
+<file path=customXml/item2.xml><?xml version="1.0" encoding="utf-8"?>
 <?mso-contentType ?>
 <FormTemplates xmlns="http://schemas.microsoft.com/sharepoint/v3/contenttype/forms">
   <Display>DocumentLibraryForm</Display>
@@ -23423,7 +23654,7 @@
 </FormTemplates>
 </file>
 
-<file path=customXml/item2.xml><?xml version="1.0" encoding="utf-8"?>
+<file path=customXml/item3.xml><?xml version="1.0" encoding="utf-8"?>
 <?mso-contentType ?>
 <spe:Receivers xmlns:spe="http://schemas.microsoft.com/sharepoint/events">
   <Receiver>
@@ -23469,7 +23700,7 @@
 </spe:Receivers>
 </file>
 
-<file path=customXml/item3.xml><?xml version="1.0" encoding="utf-8"?>
+<file path=customXml/item4.xml><?xml version="1.0" encoding="utf-8"?>
 <ct:contentTypeSchema xmlns:ct="http://schemas.microsoft.com/office/2006/metadata/contentType" xmlns:ma="http://schemas.microsoft.com/office/2006/metadata/properties/metaAttributes" ct:_="" ma:_="" ma:contentTypeName="Document" ma:contentTypeID="0x0101000812F700BE7F874999720E88173FE491" ma:contentTypeVersion="0" ma:contentTypeDescription="Create a new document." ma:contentTypeScope="" ma:versionID="3f79f408e2ca720b7aba6e0e32464d0c">
   <xsd:schema xmlns:xsd="http://www.w3.org/2001/XMLSchema" xmlns:xs="http://www.w3.org/2001/XMLSchema" xmlns:p="http://schemas.microsoft.com/office/2006/metadata/properties" xmlns:ns2="7bb5d761-a2ea-4873-95f7-7a6658fb3ef0" targetNamespace="http://schemas.microsoft.com/office/2006/metadata/properties" ma:root="true" ma:fieldsID="1e062cd38ba31e406bfc4340fbc7f87a" ns2:_="">
     <xsd:import namespace="7bb5d761-a2ea-4873-95f7-7a6658fb3ef0"/>
@@ -23614,19 +23845,23 @@
 </ct:contentTypeSchema>
 </file>
 
-<file path=customXml/item4.xml><?xml version="1.0" encoding="utf-8"?>
-<p:properties xmlns:p="http://schemas.microsoft.com/office/2006/metadata/properties" xmlns:xsi="http://www.w3.org/2001/XMLSchema-instance" xmlns:pc="http://schemas.microsoft.com/office/infopath/2007/PartnerControls">
-  <documentManagement>
-    <_dlc_DocId xmlns="7bb5d761-a2ea-4873-95f7-7a6658fb3ef0">M4CWTKMW727E-592-73</_dlc_DocId>
-    <_dlc_DocIdUrl xmlns="7bb5d761-a2ea-4873-95f7-7a6658fb3ef0">
-      <Url>https://kms.vci.local/marketing/team/_layouts/DocIdRedir.aspx?ID=M4CWTKMW727E-592-73</Url>
-      <Description>M4CWTKMW727E-592-73</Description>
-    </_dlc_DocIdUrl>
-  </documentManagement>
-</p:properties>
+<file path=customXml/itemProps1.xml><?xml version="1.0" encoding="utf-8"?>
+<ds:datastoreItem xmlns:ds="http://schemas.openxmlformats.org/officeDocument/2006/customXml" ds:itemID="{6921749B-AEB7-461B-845F-603CABD25259}">
+  <ds:schemaRefs>
+    <ds:schemaRef ds:uri="http://schemas.microsoft.com/office/2006/documentManagement/types"/>
+    <ds:schemaRef ds:uri="http://schemas.microsoft.com/office/infopath/2007/PartnerControls"/>
+    <ds:schemaRef ds:uri="http://purl.org/dc/elements/1.1/"/>
+    <ds:schemaRef ds:uri="http://schemas.microsoft.com/office/2006/metadata/properties"/>
+    <ds:schemaRef ds:uri="7bb5d761-a2ea-4873-95f7-7a6658fb3ef0"/>
+    <ds:schemaRef ds:uri="http://purl.org/dc/terms/"/>
+    <ds:schemaRef ds:uri="http://schemas.openxmlformats.org/package/2006/metadata/core-properties"/>
+    <ds:schemaRef ds:uri="http://www.w3.org/XML/1998/namespace"/>
+    <ds:schemaRef ds:uri="http://purl.org/dc/dcmitype/"/>
+  </ds:schemaRefs>
+</ds:datastoreItem>
 </file>
 
-<file path=customXml/itemProps1.xml><?xml version="1.0" encoding="utf-8"?>
+<file path=customXml/itemProps2.xml><?xml version="1.0" encoding="utf-8"?>
 <ds:datastoreItem xmlns:ds="http://schemas.openxmlformats.org/officeDocument/2006/customXml" ds:itemID="{5CDEB364-43EC-4510-9881-539C2A3FCE9E}">
   <ds:schemaRefs>
     <ds:schemaRef ds:uri="http://schemas.microsoft.com/sharepoint/v3/contenttype/forms"/>
@@ -23634,7 +23869,7 @@
 </ds:datastoreItem>
 </file>
 
-<file path=customXml/itemProps2.xml><?xml version="1.0" encoding="utf-8"?>
+<file path=customXml/itemProps3.xml><?xml version="1.0" encoding="utf-8"?>
 <ds:datastoreItem xmlns:ds="http://schemas.openxmlformats.org/officeDocument/2006/customXml" ds:itemID="{B13EBC30-FE27-4C6A-B723-23FC2188F7DC}">
   <ds:schemaRefs>
     <ds:schemaRef ds:uri="http://schemas.microsoft.com/sharepoint/events"/>
@@ -23642,7 +23877,7 @@
 </ds:datastoreItem>
 </file>
 
-<file path=customXml/itemProps3.xml><?xml version="1.0" encoding="utf-8"?>
+<file path=customXml/itemProps4.xml><?xml version="1.0" encoding="utf-8"?>
 <ds:datastoreItem xmlns:ds="http://schemas.openxmlformats.org/officeDocument/2006/customXml" ds:itemID="{164479E5-0B02-49AC-B79E-EC1D6164DDD3}">
   <ds:schemaRefs>
     <ds:schemaRef ds:uri="http://schemas.microsoft.com/office/2006/metadata/contentType"/>
@@ -23658,20 +23893,4 @@
     <ds:schemaRef ds:uri="http://schemas.microsoft.com/internal/obd"/>
   </ds:schemaRefs>
 </ds:datastoreItem>
-</file>
-
-<file path=customXml/itemProps4.xml><?xml version="1.0" encoding="utf-8"?>
-<ds:datastoreItem xmlns:ds="http://schemas.openxmlformats.org/officeDocument/2006/customXml" ds:itemID="{6921749B-AEB7-461B-845F-603CABD25259}">
-  <ds:schemaRefs>
-    <ds:schemaRef ds:uri="http://schemas.microsoft.com/office/2006/documentManagement/types"/>
-    <ds:schemaRef ds:uri="http://schemas.microsoft.com/office/infopath/2007/PartnerControls"/>
-    <ds:schemaRef ds:uri="http://purl.org/dc/elements/1.1/"/>
-    <ds:schemaRef ds:uri="http://schemas.microsoft.com/office/2006/metadata/properties"/>
-    <ds:schemaRef ds:uri="7bb5d761-a2ea-4873-95f7-7a6658fb3ef0"/>
-    <ds:schemaRef ds:uri="http://purl.org/dc/terms/"/>
-    <ds:schemaRef ds:uri="http://schemas.openxmlformats.org/package/2006/metadata/core-properties"/>
-    <ds:schemaRef ds:uri="http://www.w3.org/XML/1998/namespace"/>
-    <ds:schemaRef ds:uri="http://purl.org/dc/dcmitype/"/>
-  </ds:schemaRefs>
-</ds:datastoreItem>
 </file>
</xml_diff>